<commit_message>
material clase 8 actualizado
</commit_message>
<xml_diff>
--- a/clase_8/teoria/clase_8.pptx
+++ b/clase_8/teoria/clase_8.pptx
@@ -9,18 +9,17 @@
     <p:sldId id="357" r:id="rId3"/>
     <p:sldId id="334" r:id="rId4"/>
     <p:sldId id="359" r:id="rId5"/>
-    <p:sldId id="358" r:id="rId6"/>
-    <p:sldId id="360" r:id="rId7"/>
-    <p:sldId id="354" r:id="rId8"/>
+    <p:sldId id="361" r:id="rId6"/>
+    <p:sldId id="354" r:id="rId7"/>
+    <p:sldId id="358" r:id="rId8"/>
     <p:sldId id="323" r:id="rId9"/>
     <p:sldId id="332" r:id="rId10"/>
     <p:sldId id="355" r:id="rId11"/>
     <p:sldId id="350" r:id="rId12"/>
     <p:sldId id="347" r:id="rId13"/>
     <p:sldId id="351" r:id="rId14"/>
-    <p:sldId id="353" r:id="rId15"/>
-    <p:sldId id="348" r:id="rId16"/>
-    <p:sldId id="349" r:id="rId17"/>
+    <p:sldId id="348" r:id="rId15"/>
+    <p:sldId id="349" r:id="rId16"/>
   </p:sldIdLst>
   <p:sldSz cx="12192000" cy="6858000"/>
   <p:notesSz cx="6858000" cy="9144000"/>
@@ -544,30 +543,6 @@
     </pc:docChg>
   </pc:docChgLst>
   <pc:docChgLst>
-    <pc:chgData name="Marcos Maillot" userId="fa14b39d-e966-4ebb-a436-4f96f84b9577" providerId="ADAL" clId="{7011595B-F756-4AA4-8979-4594D887F2E6}"/>
-    <pc:docChg chg="modSld">
-      <pc:chgData name="Marcos Maillot" userId="fa14b39d-e966-4ebb-a436-4f96f84b9577" providerId="ADAL" clId="{7011595B-F756-4AA4-8979-4594D887F2E6}" dt="2022-10-13T23:51:53.653" v="2" actId="1076"/>
-      <pc:docMkLst>
-        <pc:docMk/>
-      </pc:docMkLst>
-      <pc:sldChg chg="modSp mod">
-        <pc:chgData name="Marcos Maillot" userId="fa14b39d-e966-4ebb-a436-4f96f84b9577" providerId="ADAL" clId="{7011595B-F756-4AA4-8979-4594D887F2E6}" dt="2022-10-13T23:51:53.653" v="2" actId="1076"/>
-        <pc:sldMkLst>
-          <pc:docMk/>
-          <pc:sldMk cId="1345289315" sldId="332"/>
-        </pc:sldMkLst>
-        <pc:picChg chg="mod">
-          <ac:chgData name="Marcos Maillot" userId="fa14b39d-e966-4ebb-a436-4f96f84b9577" providerId="ADAL" clId="{7011595B-F756-4AA4-8979-4594D887F2E6}" dt="2022-10-13T23:51:53.653" v="2" actId="1076"/>
-          <ac:picMkLst>
-            <pc:docMk/>
-            <pc:sldMk cId="1345289315" sldId="332"/>
-            <ac:picMk id="9" creationId="{3E8818A9-21A5-D270-0236-64EB72134CFF}"/>
-          </ac:picMkLst>
-        </pc:picChg>
-      </pc:sldChg>
-    </pc:docChg>
-  </pc:docChgLst>
-  <pc:docChgLst>
     <pc:chgData name="Marcos Maillot" userId="fa14b39d-e966-4ebb-a436-4f96f84b9577" providerId="ADAL" clId="{8DFE272B-93D9-42EB-821E-CBFEFC0180C8}"/>
     <pc:docChg chg="custSel addSld delSld modSld sldOrd">
       <pc:chgData name="Marcos Maillot" userId="fa14b39d-e966-4ebb-a436-4f96f84b9577" providerId="ADAL" clId="{8DFE272B-93D9-42EB-821E-CBFEFC0180C8}" dt="2022-12-13T23:24:21.091" v="745" actId="478"/>
@@ -1021,6 +996,30 @@
             <pc:docMk/>
             <pc:sldMk cId="1421392979" sldId="359"/>
             <ac:picMk id="9" creationId="{CAD75AC6-F426-A89B-6E22-7D517D91405C}"/>
+          </ac:picMkLst>
+        </pc:picChg>
+      </pc:sldChg>
+    </pc:docChg>
+  </pc:docChgLst>
+  <pc:docChgLst>
+    <pc:chgData name="Marcos Maillot" userId="fa14b39d-e966-4ebb-a436-4f96f84b9577" providerId="ADAL" clId="{7011595B-F756-4AA4-8979-4594D887F2E6}"/>
+    <pc:docChg chg="modSld">
+      <pc:chgData name="Marcos Maillot" userId="fa14b39d-e966-4ebb-a436-4f96f84b9577" providerId="ADAL" clId="{7011595B-F756-4AA4-8979-4594D887F2E6}" dt="2022-10-13T23:51:53.653" v="2" actId="1076"/>
+      <pc:docMkLst>
+        <pc:docMk/>
+      </pc:docMkLst>
+      <pc:sldChg chg="modSp mod">
+        <pc:chgData name="Marcos Maillot" userId="fa14b39d-e966-4ebb-a436-4f96f84b9577" providerId="ADAL" clId="{7011595B-F756-4AA4-8979-4594D887F2E6}" dt="2022-10-13T23:51:53.653" v="2" actId="1076"/>
+        <pc:sldMkLst>
+          <pc:docMk/>
+          <pc:sldMk cId="1345289315" sldId="332"/>
+        </pc:sldMkLst>
+        <pc:picChg chg="mod">
+          <ac:chgData name="Marcos Maillot" userId="fa14b39d-e966-4ebb-a436-4f96f84b9577" providerId="ADAL" clId="{7011595B-F756-4AA4-8979-4594D887F2E6}" dt="2022-10-13T23:51:53.653" v="2" actId="1076"/>
+          <ac:picMkLst>
+            <pc:docMk/>
+            <pc:sldMk cId="1345289315" sldId="332"/>
+            <ac:picMk id="9" creationId="{3E8818A9-21A5-D270-0236-64EB72134CFF}"/>
           </ac:picMkLst>
         </pc:picChg>
       </pc:sldChg>
@@ -1568,7 +1567,7 @@
           <a:noFill/>
           <a:extLst>
             <a:ext uri="{909E8E84-426E-40dd-AFC4-6F175D3DCCD1}">
-              <a14:hiddenFill xmlns:a14="http://schemas.microsoft.com/office/drawing/2010/main" xmlns="">
+              <a14:hiddenFill xmlns="" xmlns:a14="http://schemas.microsoft.com/office/drawing/2010/main">
                 <a:solidFill>
                   <a:srgbClr val="FFFFFF"/>
                 </a:solidFill>
@@ -1628,7 +1627,7 @@
             </a:ln>
             <a:extLst>
               <a:ext uri="{91240B29-F687-4f45-9708-019B960494DF}">
-                <a14:hiddenLine xmlns:a14="http://schemas.microsoft.com/office/drawing/2010/main" xmlns="" w="9525">
+                <a14:hiddenLine xmlns="" xmlns:a14="http://schemas.microsoft.com/office/drawing/2010/main" w="9525">
                   <a:solidFill>
                     <a:srgbClr val="000000"/>
                   </a:solidFill>
@@ -1718,7 +1717,7 @@
             </a:ln>
             <a:extLst>
               <a:ext uri="{91240B29-F687-4f45-9708-019B960494DF}">
-                <a14:hiddenLine xmlns:a14="http://schemas.microsoft.com/office/drawing/2010/main" xmlns="" w="9525">
+                <a14:hiddenLine xmlns="" xmlns:a14="http://schemas.microsoft.com/office/drawing/2010/main" w="9525">
                   <a:solidFill>
                     <a:srgbClr val="000000"/>
                   </a:solidFill>
@@ -1808,7 +1807,7 @@
             </a:ln>
             <a:extLst>
               <a:ext uri="{91240B29-F687-4f45-9708-019B960494DF}">
-                <a14:hiddenLine xmlns:a14="http://schemas.microsoft.com/office/drawing/2010/main" xmlns="" w="9525">
+                <a14:hiddenLine xmlns="" xmlns:a14="http://schemas.microsoft.com/office/drawing/2010/main" w="9525">
                   <a:solidFill>
                     <a:srgbClr val="000000"/>
                   </a:solidFill>
@@ -1842,7 +1841,7 @@
             </a:ln>
             <a:extLst>
               <a:ext uri="{91240B29-F687-4f45-9708-019B960494DF}">
-                <a14:hiddenLine xmlns:a14="http://schemas.microsoft.com/office/drawing/2010/main" xmlns="" w="9525">
+                <a14:hiddenLine xmlns="" xmlns:a14="http://schemas.microsoft.com/office/drawing/2010/main" w="9525">
                   <a:solidFill>
                     <a:srgbClr val="000000"/>
                   </a:solidFill>
@@ -1932,7 +1931,7 @@
             </a:ln>
             <a:extLst>
               <a:ext uri="{91240B29-F687-4f45-9708-019B960494DF}">
-                <a14:hiddenLine xmlns:a14="http://schemas.microsoft.com/office/drawing/2010/main" xmlns="" w="9525">
+                <a14:hiddenLine xmlns="" xmlns:a14="http://schemas.microsoft.com/office/drawing/2010/main" w="9525">
                   <a:solidFill>
                     <a:srgbClr val="000000"/>
                   </a:solidFill>
@@ -1994,7 +1993,7 @@
             </a:ln>
             <a:extLst>
               <a:ext uri="{91240B29-F687-4f45-9708-019B960494DF}">
-                <a14:hiddenLine xmlns:a14="http://schemas.microsoft.com/office/drawing/2010/main" xmlns="" w="9525">
+                <a14:hiddenLine xmlns="" xmlns:a14="http://schemas.microsoft.com/office/drawing/2010/main" w="9525">
                   <a:solidFill>
                     <a:srgbClr val="000000"/>
                   </a:solidFill>
@@ -2056,7 +2055,7 @@
             </a:ln>
             <a:extLst>
               <a:ext uri="{91240B29-F687-4f45-9708-019B960494DF}">
-                <a14:hiddenLine xmlns:a14="http://schemas.microsoft.com/office/drawing/2010/main" xmlns="" w="9525">
+                <a14:hiddenLine xmlns="" xmlns:a14="http://schemas.microsoft.com/office/drawing/2010/main" w="9525">
                   <a:solidFill>
                     <a:srgbClr val="000000"/>
                   </a:solidFill>
@@ -2146,7 +2145,7 @@
             </a:ln>
             <a:extLst>
               <a:ext uri="{91240B29-F687-4f45-9708-019B960494DF}">
-                <a14:hiddenLine xmlns:a14="http://schemas.microsoft.com/office/drawing/2010/main" xmlns="" w="9525">
+                <a14:hiddenLine xmlns="" xmlns:a14="http://schemas.microsoft.com/office/drawing/2010/main" w="9525">
                   <a:solidFill>
                     <a:srgbClr val="000000"/>
                   </a:solidFill>
@@ -2208,7 +2207,7 @@
             </a:ln>
             <a:extLst>
               <a:ext uri="{91240B29-F687-4f45-9708-019B960494DF}">
-                <a14:hiddenLine xmlns:a14="http://schemas.microsoft.com/office/drawing/2010/main" xmlns="" w="9525">
+                <a14:hiddenLine xmlns="" xmlns:a14="http://schemas.microsoft.com/office/drawing/2010/main" w="9525">
                   <a:solidFill>
                     <a:srgbClr val="000000"/>
                   </a:solidFill>
@@ -2270,7 +2269,7 @@
             </a:ln>
             <a:extLst>
               <a:ext uri="{91240B29-F687-4f45-9708-019B960494DF}">
-                <a14:hiddenLine xmlns:a14="http://schemas.microsoft.com/office/drawing/2010/main" xmlns="" w="9525">
+                <a14:hiddenLine xmlns="" xmlns:a14="http://schemas.microsoft.com/office/drawing/2010/main" w="9525">
                   <a:solidFill>
                     <a:srgbClr val="000000"/>
                   </a:solidFill>
@@ -2360,7 +2359,7 @@
             </a:ln>
             <a:extLst>
               <a:ext uri="{91240B29-F687-4f45-9708-019B960494DF}">
-                <a14:hiddenLine xmlns:a14="http://schemas.microsoft.com/office/drawing/2010/main" xmlns="" w="9525">
+                <a14:hiddenLine xmlns="" xmlns:a14="http://schemas.microsoft.com/office/drawing/2010/main" w="9525">
                   <a:solidFill>
                     <a:srgbClr val="000000"/>
                   </a:solidFill>
@@ -2450,7 +2449,7 @@
             </a:ln>
             <a:extLst>
               <a:ext uri="{91240B29-F687-4f45-9708-019B960494DF}">
-                <a14:hiddenLine xmlns:a14="http://schemas.microsoft.com/office/drawing/2010/main" xmlns="" w="9525">
+                <a14:hiddenLine xmlns="" xmlns:a14="http://schemas.microsoft.com/office/drawing/2010/main" w="9525">
                   <a:solidFill>
                     <a:srgbClr val="000000"/>
                   </a:solidFill>
@@ -2512,7 +2511,7 @@
             </a:ln>
             <a:extLst>
               <a:ext uri="{91240B29-F687-4f45-9708-019B960494DF}">
-                <a14:hiddenLine xmlns:a14="http://schemas.microsoft.com/office/drawing/2010/main" xmlns="" w="9525">
+                <a14:hiddenLine xmlns="" xmlns:a14="http://schemas.microsoft.com/office/drawing/2010/main" w="9525">
                   <a:solidFill>
                     <a:srgbClr val="000000"/>
                   </a:solidFill>
@@ -2622,7 +2621,7 @@
             </a:ln>
             <a:extLst>
               <a:ext uri="{91240B29-F687-4f45-9708-019B960494DF}">
-                <a14:hiddenLine xmlns:a14="http://schemas.microsoft.com/office/drawing/2010/main" xmlns="" w="9525">
+                <a14:hiddenLine xmlns="" xmlns:a14="http://schemas.microsoft.com/office/drawing/2010/main" w="9525">
                   <a:solidFill>
                     <a:srgbClr val="000000"/>
                   </a:solidFill>
@@ -2684,7 +2683,7 @@
             </a:ln>
             <a:extLst>
               <a:ext uri="{91240B29-F687-4f45-9708-019B960494DF}">
-                <a14:hiddenLine xmlns:a14="http://schemas.microsoft.com/office/drawing/2010/main" xmlns="" w="9525">
+                <a14:hiddenLine xmlns="" xmlns:a14="http://schemas.microsoft.com/office/drawing/2010/main" w="9525">
                   <a:solidFill>
                     <a:srgbClr val="000000"/>
                   </a:solidFill>
@@ -2774,7 +2773,7 @@
             </a:ln>
             <a:extLst>
               <a:ext uri="{91240B29-F687-4f45-9708-019B960494DF}">
-                <a14:hiddenLine xmlns:a14="http://schemas.microsoft.com/office/drawing/2010/main" xmlns="" w="9525">
+                <a14:hiddenLine xmlns="" xmlns:a14="http://schemas.microsoft.com/office/drawing/2010/main" w="9525">
                   <a:solidFill>
                     <a:srgbClr val="000000"/>
                   </a:solidFill>
@@ -2864,7 +2863,7 @@
             </a:ln>
             <a:extLst>
               <a:ext uri="{91240B29-F687-4f45-9708-019B960494DF}">
-                <a14:hiddenLine xmlns:a14="http://schemas.microsoft.com/office/drawing/2010/main" xmlns="" w="9525">
+                <a14:hiddenLine xmlns="" xmlns:a14="http://schemas.microsoft.com/office/drawing/2010/main" w="9525">
                   <a:solidFill>
                     <a:srgbClr val="000000"/>
                   </a:solidFill>
@@ -2926,7 +2925,7 @@
             </a:ln>
             <a:extLst>
               <a:ext uri="{91240B29-F687-4f45-9708-019B960494DF}">
-                <a14:hiddenLine xmlns:a14="http://schemas.microsoft.com/office/drawing/2010/main" xmlns="" w="9525">
+                <a14:hiddenLine xmlns="" xmlns:a14="http://schemas.microsoft.com/office/drawing/2010/main" w="9525">
                   <a:solidFill>
                     <a:srgbClr val="000000"/>
                   </a:solidFill>
@@ -3016,7 +3015,7 @@
             </a:ln>
             <a:extLst>
               <a:ext uri="{91240B29-F687-4f45-9708-019B960494DF}">
-                <a14:hiddenLine xmlns:a14="http://schemas.microsoft.com/office/drawing/2010/main" xmlns="" w="9525">
+                <a14:hiddenLine xmlns="" xmlns:a14="http://schemas.microsoft.com/office/drawing/2010/main" w="9525">
                   <a:solidFill>
                     <a:srgbClr val="000000"/>
                   </a:solidFill>
@@ -3106,7 +3105,7 @@
             </a:ln>
             <a:extLst>
               <a:ext uri="{91240B29-F687-4f45-9708-019B960494DF}">
-                <a14:hiddenLine xmlns:a14="http://schemas.microsoft.com/office/drawing/2010/main" xmlns="" w="9525">
+                <a14:hiddenLine xmlns="" xmlns:a14="http://schemas.microsoft.com/office/drawing/2010/main" w="9525">
                   <a:solidFill>
                     <a:srgbClr val="000000"/>
                   </a:solidFill>
@@ -3162,7 +3161,7 @@
             </a:ln>
             <a:extLst>
               <a:ext uri="{91240B29-F687-4f45-9708-019B960494DF}">
-                <a14:hiddenLine xmlns:a14="http://schemas.microsoft.com/office/drawing/2010/main" xmlns="" w="9525">
+                <a14:hiddenLine xmlns="" xmlns:a14="http://schemas.microsoft.com/office/drawing/2010/main" w="9525">
                   <a:solidFill>
                     <a:srgbClr val="000000"/>
                   </a:solidFill>
@@ -3252,7 +3251,7 @@
             </a:ln>
             <a:extLst>
               <a:ext uri="{91240B29-F687-4f45-9708-019B960494DF}">
-                <a14:hiddenLine xmlns:a14="http://schemas.microsoft.com/office/drawing/2010/main" xmlns="" w="9525">
+                <a14:hiddenLine xmlns="" xmlns:a14="http://schemas.microsoft.com/office/drawing/2010/main" w="9525">
                   <a:solidFill>
                     <a:srgbClr val="000000"/>
                   </a:solidFill>
@@ -3308,7 +3307,7 @@
             </a:ln>
             <a:extLst>
               <a:ext uri="{91240B29-F687-4f45-9708-019B960494DF}">
-                <a14:hiddenLine xmlns:a14="http://schemas.microsoft.com/office/drawing/2010/main" xmlns="" w="9525">
+                <a14:hiddenLine xmlns="" xmlns:a14="http://schemas.microsoft.com/office/drawing/2010/main" w="9525">
                   <a:solidFill>
                     <a:srgbClr val="000000"/>
                   </a:solidFill>
@@ -3398,7 +3397,7 @@
             </a:ln>
             <a:extLst>
               <a:ext uri="{91240B29-F687-4f45-9708-019B960494DF}">
-                <a14:hiddenLine xmlns:a14="http://schemas.microsoft.com/office/drawing/2010/main" xmlns="" w="9525">
+                <a14:hiddenLine xmlns="" xmlns:a14="http://schemas.microsoft.com/office/drawing/2010/main" w="9525">
                   <a:solidFill>
                     <a:srgbClr val="000000"/>
                   </a:solidFill>
@@ -3466,7 +3465,7 @@
             </a:ln>
             <a:extLst>
               <a:ext uri="{91240B29-F687-4f45-9708-019B960494DF}">
-                <a14:hiddenLine xmlns:a14="http://schemas.microsoft.com/office/drawing/2010/main" xmlns="" w="9525">
+                <a14:hiddenLine xmlns="" xmlns:a14="http://schemas.microsoft.com/office/drawing/2010/main" w="9525">
                   <a:solidFill>
                     <a:srgbClr val="000000"/>
                   </a:solidFill>
@@ -3556,7 +3555,7 @@
             </a:ln>
             <a:extLst>
               <a:ext uri="{91240B29-F687-4f45-9708-019B960494DF}">
-                <a14:hiddenLine xmlns:a14="http://schemas.microsoft.com/office/drawing/2010/main" xmlns="" w="9525">
+                <a14:hiddenLine xmlns="" xmlns:a14="http://schemas.microsoft.com/office/drawing/2010/main" w="9525">
                   <a:solidFill>
                     <a:srgbClr val="000000"/>
                   </a:solidFill>
@@ -3624,7 +3623,7 @@
             </a:ln>
             <a:extLst>
               <a:ext uri="{91240B29-F687-4f45-9708-019B960494DF}">
-                <a14:hiddenLine xmlns:a14="http://schemas.microsoft.com/office/drawing/2010/main" xmlns="" w="9525">
+                <a14:hiddenLine xmlns="" xmlns:a14="http://schemas.microsoft.com/office/drawing/2010/main" w="9525">
                   <a:solidFill>
                     <a:srgbClr val="000000"/>
                   </a:solidFill>
@@ -3714,7 +3713,7 @@
             </a:ln>
             <a:extLst>
               <a:ext uri="{91240B29-F687-4f45-9708-019B960494DF}">
-                <a14:hiddenLine xmlns:a14="http://schemas.microsoft.com/office/drawing/2010/main" xmlns="" w="9525">
+                <a14:hiddenLine xmlns="" xmlns:a14="http://schemas.microsoft.com/office/drawing/2010/main" w="9525">
                   <a:solidFill>
                     <a:srgbClr val="000000"/>
                   </a:solidFill>
@@ -3748,7 +3747,7 @@
             </a:ln>
             <a:extLst>
               <a:ext uri="{91240B29-F687-4f45-9708-019B960494DF}">
-                <a14:hiddenLine xmlns:a14="http://schemas.microsoft.com/office/drawing/2010/main" xmlns="" w="9525">
+                <a14:hiddenLine xmlns="" xmlns:a14="http://schemas.microsoft.com/office/drawing/2010/main" w="9525">
                   <a:solidFill>
                     <a:srgbClr val="000000"/>
                   </a:solidFill>
@@ -3838,7 +3837,7 @@
             </a:ln>
             <a:extLst>
               <a:ext uri="{91240B29-F687-4f45-9708-019B960494DF}">
-                <a14:hiddenLine xmlns:a14="http://schemas.microsoft.com/office/drawing/2010/main" xmlns="" w="9525">
+                <a14:hiddenLine xmlns="" xmlns:a14="http://schemas.microsoft.com/office/drawing/2010/main" w="9525">
                   <a:solidFill>
                     <a:srgbClr val="000000"/>
                   </a:solidFill>
@@ -3900,7 +3899,7 @@
             </a:ln>
             <a:extLst>
               <a:ext uri="{91240B29-F687-4f45-9708-019B960494DF}">
-                <a14:hiddenLine xmlns:a14="http://schemas.microsoft.com/office/drawing/2010/main" xmlns="" w="9525">
+                <a14:hiddenLine xmlns="" xmlns:a14="http://schemas.microsoft.com/office/drawing/2010/main" w="9525">
                   <a:solidFill>
                     <a:srgbClr val="000000"/>
                   </a:solidFill>
@@ -3962,7 +3961,7 @@
             </a:ln>
             <a:extLst>
               <a:ext uri="{91240B29-F687-4f45-9708-019B960494DF}">
-                <a14:hiddenLine xmlns:a14="http://schemas.microsoft.com/office/drawing/2010/main" xmlns="" w="9525">
+                <a14:hiddenLine xmlns="" xmlns:a14="http://schemas.microsoft.com/office/drawing/2010/main" w="9525">
                   <a:solidFill>
                     <a:srgbClr val="000000"/>
                   </a:solidFill>
@@ -4052,7 +4051,7 @@
             </a:ln>
             <a:extLst>
               <a:ext uri="{91240B29-F687-4f45-9708-019B960494DF}">
-                <a14:hiddenLine xmlns:a14="http://schemas.microsoft.com/office/drawing/2010/main" xmlns="" w="9525">
+                <a14:hiddenLine xmlns="" xmlns:a14="http://schemas.microsoft.com/office/drawing/2010/main" w="9525">
                   <a:solidFill>
                     <a:srgbClr val="000000"/>
                   </a:solidFill>
@@ -4120,7 +4119,7 @@
             </a:ln>
             <a:extLst>
               <a:ext uri="{91240B29-F687-4f45-9708-019B960494DF}">
-                <a14:hiddenLine xmlns:a14="http://schemas.microsoft.com/office/drawing/2010/main" xmlns="" w="9525">
+                <a14:hiddenLine xmlns="" xmlns:a14="http://schemas.microsoft.com/office/drawing/2010/main" w="9525">
                   <a:solidFill>
                     <a:srgbClr val="000000"/>
                   </a:solidFill>
@@ -4182,7 +4181,7 @@
             </a:ln>
             <a:extLst>
               <a:ext uri="{91240B29-F687-4f45-9708-019B960494DF}">
-                <a14:hiddenLine xmlns:a14="http://schemas.microsoft.com/office/drawing/2010/main" xmlns="" w="9525">
+                <a14:hiddenLine xmlns="" xmlns:a14="http://schemas.microsoft.com/office/drawing/2010/main" w="9525">
                   <a:solidFill>
                     <a:srgbClr val="000000"/>
                   </a:solidFill>
@@ -4272,7 +4271,7 @@
             </a:ln>
             <a:extLst>
               <a:ext uri="{91240B29-F687-4f45-9708-019B960494DF}">
-                <a14:hiddenLine xmlns:a14="http://schemas.microsoft.com/office/drawing/2010/main" xmlns="" w="9525">
+                <a14:hiddenLine xmlns="" xmlns:a14="http://schemas.microsoft.com/office/drawing/2010/main" w="9525">
                   <a:solidFill>
                     <a:srgbClr val="000000"/>
                   </a:solidFill>
@@ -4334,7 +4333,7 @@
             </a:ln>
             <a:extLst>
               <a:ext uri="{91240B29-F687-4f45-9708-019B960494DF}">
-                <a14:hiddenLine xmlns:a14="http://schemas.microsoft.com/office/drawing/2010/main" xmlns="" w="9525">
+                <a14:hiddenLine xmlns="" xmlns:a14="http://schemas.microsoft.com/office/drawing/2010/main" w="9525">
                   <a:solidFill>
                     <a:srgbClr val="000000"/>
                   </a:solidFill>
@@ -4424,7 +4423,7 @@
             </a:ln>
             <a:extLst>
               <a:ext uri="{91240B29-F687-4f45-9708-019B960494DF}">
-                <a14:hiddenLine xmlns:a14="http://schemas.microsoft.com/office/drawing/2010/main" xmlns="" w="9525">
+                <a14:hiddenLine xmlns="" xmlns:a14="http://schemas.microsoft.com/office/drawing/2010/main" w="9525">
                   <a:solidFill>
                     <a:srgbClr val="000000"/>
                   </a:solidFill>
@@ -4486,7 +4485,7 @@
             </a:ln>
             <a:extLst>
               <a:ext uri="{91240B29-F687-4f45-9708-019B960494DF}">
-                <a14:hiddenLine xmlns:a14="http://schemas.microsoft.com/office/drawing/2010/main" xmlns="" w="9525">
+                <a14:hiddenLine xmlns="" xmlns:a14="http://schemas.microsoft.com/office/drawing/2010/main" w="9525">
                   <a:solidFill>
                     <a:srgbClr val="000000"/>
                   </a:solidFill>
@@ -4576,7 +4575,7 @@
             </a:ln>
             <a:extLst>
               <a:ext uri="{91240B29-F687-4f45-9708-019B960494DF}">
-                <a14:hiddenLine xmlns:a14="http://schemas.microsoft.com/office/drawing/2010/main" xmlns="" w="9525">
+                <a14:hiddenLine xmlns="" xmlns:a14="http://schemas.microsoft.com/office/drawing/2010/main" w="9525">
                   <a:solidFill>
                     <a:srgbClr val="000000"/>
                   </a:solidFill>
@@ -4610,7 +4609,7 @@
             </a:ln>
             <a:extLst>
               <a:ext uri="{91240B29-F687-4f45-9708-019B960494DF}">
-                <a14:hiddenLine xmlns:a14="http://schemas.microsoft.com/office/drawing/2010/main" xmlns="" w="9525">
+                <a14:hiddenLine xmlns="" xmlns:a14="http://schemas.microsoft.com/office/drawing/2010/main" w="9525">
                   <a:solidFill>
                     <a:srgbClr val="000000"/>
                   </a:solidFill>
@@ -4675,7 +4674,7 @@
             </a:ln>
             <a:extLst>
               <a:ext uri="{91240B29-F687-4f45-9708-019B960494DF}">
-                <a14:hiddenLine xmlns:a14="http://schemas.microsoft.com/office/drawing/2010/main" xmlns="" w="9525">
+                <a14:hiddenLine xmlns="" xmlns:a14="http://schemas.microsoft.com/office/drawing/2010/main" w="9525">
                   <a:solidFill>
                     <a:srgbClr val="000000"/>
                   </a:solidFill>
@@ -4765,7 +4764,7 @@
             </a:ln>
             <a:extLst>
               <a:ext uri="{91240B29-F687-4f45-9708-019B960494DF}">
-                <a14:hiddenLine xmlns:a14="http://schemas.microsoft.com/office/drawing/2010/main" xmlns="" w="9525">
+                <a14:hiddenLine xmlns="" xmlns:a14="http://schemas.microsoft.com/office/drawing/2010/main" w="9525">
                   <a:solidFill>
                     <a:srgbClr val="000000"/>
                   </a:solidFill>
@@ -4827,7 +4826,7 @@
             </a:ln>
             <a:extLst>
               <a:ext uri="{91240B29-F687-4f45-9708-019B960494DF}">
-                <a14:hiddenLine xmlns:a14="http://schemas.microsoft.com/office/drawing/2010/main" xmlns="" w="9525">
+                <a14:hiddenLine xmlns="" xmlns:a14="http://schemas.microsoft.com/office/drawing/2010/main" w="9525">
                   <a:solidFill>
                     <a:srgbClr val="000000"/>
                   </a:solidFill>
@@ -4917,7 +4916,7 @@
             </a:ln>
             <a:extLst>
               <a:ext uri="{91240B29-F687-4f45-9708-019B960494DF}">
-                <a14:hiddenLine xmlns:a14="http://schemas.microsoft.com/office/drawing/2010/main" xmlns="" w="9525">
+                <a14:hiddenLine xmlns="" xmlns:a14="http://schemas.microsoft.com/office/drawing/2010/main" w="9525">
                   <a:solidFill>
                     <a:srgbClr val="000000"/>
                   </a:solidFill>
@@ -5007,7 +5006,7 @@
             </a:ln>
             <a:extLst>
               <a:ext uri="{91240B29-F687-4f45-9708-019B960494DF}">
-                <a14:hiddenLine xmlns:a14="http://schemas.microsoft.com/office/drawing/2010/main" xmlns="" w="9525">
+                <a14:hiddenLine xmlns="" xmlns:a14="http://schemas.microsoft.com/office/drawing/2010/main" w="9525">
                   <a:solidFill>
                     <a:srgbClr val="000000"/>
                   </a:solidFill>
@@ -5072,7 +5071,7 @@
             </a:ln>
             <a:extLst>
               <a:ext uri="{91240B29-F687-4f45-9708-019B960494DF}">
-                <a14:hiddenLine xmlns:a14="http://schemas.microsoft.com/office/drawing/2010/main" xmlns="" w="9525">
+                <a14:hiddenLine xmlns="" xmlns:a14="http://schemas.microsoft.com/office/drawing/2010/main" w="9525">
                   <a:solidFill>
                     <a:srgbClr val="000000"/>
                   </a:solidFill>
@@ -5134,7 +5133,7 @@
             </a:ln>
             <a:extLst>
               <a:ext uri="{91240B29-F687-4f45-9708-019B960494DF}">
-                <a14:hiddenLine xmlns:a14="http://schemas.microsoft.com/office/drawing/2010/main" xmlns="" w="9525">
+                <a14:hiddenLine xmlns="" xmlns:a14="http://schemas.microsoft.com/office/drawing/2010/main" w="9525">
                   <a:solidFill>
                     <a:srgbClr val="000000"/>
                   </a:solidFill>
@@ -5224,7 +5223,7 @@
             </a:ln>
             <a:extLst>
               <a:ext uri="{91240B29-F687-4f45-9708-019B960494DF}">
-                <a14:hiddenLine xmlns:a14="http://schemas.microsoft.com/office/drawing/2010/main" xmlns="" w="9525">
+                <a14:hiddenLine xmlns="" xmlns:a14="http://schemas.microsoft.com/office/drawing/2010/main" w="9525">
                   <a:solidFill>
                     <a:srgbClr val="000000"/>
                   </a:solidFill>
@@ -5314,7 +5313,7 @@
             </a:ln>
             <a:extLst>
               <a:ext uri="{91240B29-F687-4f45-9708-019B960494DF}">
-                <a14:hiddenLine xmlns:a14="http://schemas.microsoft.com/office/drawing/2010/main" xmlns="" w="9525">
+                <a14:hiddenLine xmlns="" xmlns:a14="http://schemas.microsoft.com/office/drawing/2010/main" w="9525">
                   <a:solidFill>
                     <a:srgbClr val="000000"/>
                   </a:solidFill>
@@ -5376,7 +5375,7 @@
             </a:ln>
             <a:extLst>
               <a:ext uri="{91240B29-F687-4f45-9708-019B960494DF}">
-                <a14:hiddenLine xmlns:a14="http://schemas.microsoft.com/office/drawing/2010/main" xmlns="" w="9525">
+                <a14:hiddenLine xmlns="" xmlns:a14="http://schemas.microsoft.com/office/drawing/2010/main" w="9525">
                   <a:solidFill>
                     <a:srgbClr val="000000"/>
                   </a:solidFill>
@@ -5496,7 +5495,7 @@
             </a:ln>
             <a:extLst>
               <a:ext uri="{91240B29-F687-4f45-9708-019B960494DF}">
-                <a14:hiddenLine xmlns:a14="http://schemas.microsoft.com/office/drawing/2010/main" xmlns="" w="9525">
+                <a14:hiddenLine xmlns="" xmlns:a14="http://schemas.microsoft.com/office/drawing/2010/main" w="9525">
                   <a:solidFill>
                     <a:srgbClr val="000000"/>
                   </a:solidFill>
@@ -5564,7 +5563,7 @@
             </a:ln>
             <a:extLst>
               <a:ext uri="{91240B29-F687-4f45-9708-019B960494DF}">
-                <a14:hiddenLine xmlns:a14="http://schemas.microsoft.com/office/drawing/2010/main" xmlns="" w="9525">
+                <a14:hiddenLine xmlns="" xmlns:a14="http://schemas.microsoft.com/office/drawing/2010/main" w="9525">
                   <a:solidFill>
                     <a:srgbClr val="000000"/>
                   </a:solidFill>
@@ -5654,7 +5653,7 @@
             </a:ln>
             <a:extLst>
               <a:ext uri="{91240B29-F687-4f45-9708-019B960494DF}">
-                <a14:hiddenLine xmlns:a14="http://schemas.microsoft.com/office/drawing/2010/main" xmlns="" w="9525">
+                <a14:hiddenLine xmlns="" xmlns:a14="http://schemas.microsoft.com/office/drawing/2010/main" w="9525">
                   <a:solidFill>
                     <a:srgbClr val="000000"/>
                   </a:solidFill>
@@ -5794,7 +5793,7 @@
           <a:p>
             <a:fld id="{849DE176-146E-4F1E-BCCE-E46272DCA095}" type="datetimeFigureOut">
               <a:rPr lang="es-AR" smtClean="0"/>
-              <a:t>21/4/2023</a:t>
+              <a:t>16/6/2023</a:t>
             </a:fld>
             <a:endParaRPr lang="es-AR"/>
           </a:p>
@@ -6061,7 +6060,7 @@
           <a:p>
             <a:fld id="{849DE176-146E-4F1E-BCCE-E46272DCA095}" type="datetimeFigureOut">
               <a:rPr lang="es-AR" smtClean="0"/>
-              <a:t>21/4/2023</a:t>
+              <a:t>16/6/2023</a:t>
             </a:fld>
             <a:endParaRPr lang="es-AR"/>
           </a:p>
@@ -6257,7 +6256,7 @@
           <a:p>
             <a:fld id="{849DE176-146E-4F1E-BCCE-E46272DCA095}" type="datetimeFigureOut">
               <a:rPr lang="es-AR" smtClean="0"/>
-              <a:t>21/4/2023</a:t>
+              <a:t>16/6/2023</a:t>
             </a:fld>
             <a:endParaRPr lang="es-AR"/>
           </a:p>
@@ -6520,7 +6519,7 @@
           <a:p>
             <a:fld id="{849DE176-146E-4F1E-BCCE-E46272DCA095}" type="datetimeFigureOut">
               <a:rPr lang="es-AR" smtClean="0"/>
-              <a:t>21/4/2023</a:t>
+              <a:t>16/6/2023</a:t>
             </a:fld>
             <a:endParaRPr lang="es-AR"/>
           </a:p>
@@ -6954,7 +6953,7 @@
           <a:p>
             <a:fld id="{849DE176-146E-4F1E-BCCE-E46272DCA095}" type="datetimeFigureOut">
               <a:rPr lang="es-AR" smtClean="0"/>
-              <a:t>21/4/2023</a:t>
+              <a:t>16/6/2023</a:t>
             </a:fld>
             <a:endParaRPr lang="es-AR"/>
           </a:p>
@@ -7500,7 +7499,7 @@
           <a:p>
             <a:fld id="{849DE176-146E-4F1E-BCCE-E46272DCA095}" type="datetimeFigureOut">
               <a:rPr lang="es-AR" smtClean="0"/>
-              <a:t>21/4/2023</a:t>
+              <a:t>16/6/2023</a:t>
             </a:fld>
             <a:endParaRPr lang="es-AR"/>
           </a:p>
@@ -8220,7 +8219,7 @@
           <a:p>
             <a:fld id="{849DE176-146E-4F1E-BCCE-E46272DCA095}" type="datetimeFigureOut">
               <a:rPr lang="es-AR" smtClean="0"/>
-              <a:t>21/4/2023</a:t>
+              <a:t>16/6/2023</a:t>
             </a:fld>
             <a:endParaRPr lang="es-AR"/>
           </a:p>
@@ -8390,7 +8389,7 @@
           <a:p>
             <a:fld id="{849DE176-146E-4F1E-BCCE-E46272DCA095}" type="datetimeFigureOut">
               <a:rPr lang="es-AR" smtClean="0"/>
-              <a:t>21/4/2023</a:t>
+              <a:t>16/6/2023</a:t>
             </a:fld>
             <a:endParaRPr lang="es-AR"/>
           </a:p>
@@ -8570,7 +8569,7 @@
           <a:p>
             <a:fld id="{849DE176-146E-4F1E-BCCE-E46272DCA095}" type="datetimeFigureOut">
               <a:rPr lang="es-AR" smtClean="0"/>
-              <a:t>21/4/2023</a:t>
+              <a:t>16/6/2023</a:t>
             </a:fld>
             <a:endParaRPr lang="es-AR"/>
           </a:p>
@@ -8740,7 +8739,7 @@
           <a:p>
             <a:fld id="{849DE176-146E-4F1E-BCCE-E46272DCA095}" type="datetimeFigureOut">
               <a:rPr lang="es-AR" smtClean="0"/>
-              <a:t>21/4/2023</a:t>
+              <a:t>16/6/2023</a:t>
             </a:fld>
             <a:endParaRPr lang="es-AR"/>
           </a:p>
@@ -8990,7 +8989,7 @@
           <a:p>
             <a:fld id="{849DE176-146E-4F1E-BCCE-E46272DCA095}" type="datetimeFigureOut">
               <a:rPr lang="es-AR" smtClean="0"/>
-              <a:t>21/4/2023</a:t>
+              <a:t>16/6/2023</a:t>
             </a:fld>
             <a:endParaRPr lang="es-AR"/>
           </a:p>
@@ -9222,7 +9221,7 @@
           <a:p>
             <a:fld id="{849DE176-146E-4F1E-BCCE-E46272DCA095}" type="datetimeFigureOut">
               <a:rPr lang="es-AR" smtClean="0"/>
-              <a:t>21/4/2023</a:t>
+              <a:t>16/6/2023</a:t>
             </a:fld>
             <a:endParaRPr lang="es-AR"/>
           </a:p>
@@ -9603,7 +9602,7 @@
           <a:p>
             <a:fld id="{849DE176-146E-4F1E-BCCE-E46272DCA095}" type="datetimeFigureOut">
               <a:rPr lang="es-AR" smtClean="0"/>
-              <a:t>21/4/2023</a:t>
+              <a:t>16/6/2023</a:t>
             </a:fld>
             <a:endParaRPr lang="es-AR"/>
           </a:p>
@@ -9721,7 +9720,7 @@
           <a:p>
             <a:fld id="{849DE176-146E-4F1E-BCCE-E46272DCA095}" type="datetimeFigureOut">
               <a:rPr lang="es-AR" smtClean="0"/>
-              <a:t>21/4/2023</a:t>
+              <a:t>16/6/2023</a:t>
             </a:fld>
             <a:endParaRPr lang="es-AR"/>
           </a:p>
@@ -9816,7 +9815,7 @@
           <a:p>
             <a:fld id="{849DE176-146E-4F1E-BCCE-E46272DCA095}" type="datetimeFigureOut">
               <a:rPr lang="es-AR" smtClean="0"/>
-              <a:t>21/4/2023</a:t>
+              <a:t>16/6/2023</a:t>
             </a:fld>
             <a:endParaRPr lang="es-AR"/>
           </a:p>
@@ -10065,7 +10064,7 @@
           <a:p>
             <a:fld id="{849DE176-146E-4F1E-BCCE-E46272DCA095}" type="datetimeFigureOut">
               <a:rPr lang="es-AR" smtClean="0"/>
-              <a:t>21/4/2023</a:t>
+              <a:t>16/6/2023</a:t>
             </a:fld>
             <a:endParaRPr lang="es-AR"/>
           </a:p>
@@ -10345,7 +10344,7 @@
           <a:p>
             <a:fld id="{849DE176-146E-4F1E-BCCE-E46272DCA095}" type="datetimeFigureOut">
               <a:rPr lang="es-AR" smtClean="0"/>
-              <a:t>21/4/2023</a:t>
+              <a:t>16/6/2023</a:t>
             </a:fld>
             <a:endParaRPr lang="es-AR"/>
           </a:p>
@@ -10485,7 +10484,7 @@
           <a:noFill/>
           <a:extLst>
             <a:ext uri="{909E8E84-426E-40dd-AFC4-6F175D3DCCD1}">
-              <a14:hiddenFill xmlns:a14="http://schemas.microsoft.com/office/drawing/2010/main" xmlns="">
+              <a14:hiddenFill xmlns="" xmlns:a14="http://schemas.microsoft.com/office/drawing/2010/main">
                 <a:solidFill>
                   <a:srgbClr val="FFFFFF"/>
                 </a:solidFill>
@@ -10559,7 +10558,7 @@
               </a:ln>
               <a:extLst>
                 <a:ext uri="{91240B29-F687-4f45-9708-019B960494DF}">
-                  <a14:hiddenLine xmlns:a14="http://schemas.microsoft.com/office/drawing/2010/main" xmlns="" w="9525">
+                  <a14:hiddenLine xmlns="" xmlns:a14="http://schemas.microsoft.com/office/drawing/2010/main" w="9525">
                     <a:solidFill>
                       <a:srgbClr val="000000"/>
                     </a:solidFill>
@@ -10649,7 +10648,7 @@
               </a:ln>
               <a:extLst>
                 <a:ext uri="{91240B29-F687-4f45-9708-019B960494DF}">
-                  <a14:hiddenLine xmlns:a14="http://schemas.microsoft.com/office/drawing/2010/main" xmlns="" w="9525">
+                  <a14:hiddenLine xmlns="" xmlns:a14="http://schemas.microsoft.com/office/drawing/2010/main" w="9525">
                     <a:solidFill>
                       <a:srgbClr val="000000"/>
                     </a:solidFill>
@@ -10739,7 +10738,7 @@
               </a:ln>
               <a:extLst>
                 <a:ext uri="{91240B29-F687-4f45-9708-019B960494DF}">
-                  <a14:hiddenLine xmlns:a14="http://schemas.microsoft.com/office/drawing/2010/main" xmlns="" w="9525">
+                  <a14:hiddenLine xmlns="" xmlns:a14="http://schemas.microsoft.com/office/drawing/2010/main" w="9525">
                     <a:solidFill>
                       <a:srgbClr val="000000"/>
                     </a:solidFill>
@@ -10801,7 +10800,7 @@
               </a:ln>
               <a:extLst>
                 <a:ext uri="{91240B29-F687-4f45-9708-019B960494DF}">
-                  <a14:hiddenLine xmlns:a14="http://schemas.microsoft.com/office/drawing/2010/main" xmlns="" w="9525">
+                  <a14:hiddenLine xmlns="" xmlns:a14="http://schemas.microsoft.com/office/drawing/2010/main" w="9525">
                     <a:solidFill>
                       <a:srgbClr val="000000"/>
                     </a:solidFill>
@@ -10891,7 +10890,7 @@
               </a:ln>
               <a:extLst>
                 <a:ext uri="{91240B29-F687-4f45-9708-019B960494DF}">
-                  <a14:hiddenLine xmlns:a14="http://schemas.microsoft.com/office/drawing/2010/main" xmlns="" w="9525">
+                  <a14:hiddenLine xmlns="" xmlns:a14="http://schemas.microsoft.com/office/drawing/2010/main" w="9525">
                     <a:solidFill>
                       <a:srgbClr val="000000"/>
                     </a:solidFill>
@@ -10953,7 +10952,7 @@
               </a:ln>
               <a:extLst>
                 <a:ext uri="{91240B29-F687-4f45-9708-019B960494DF}">
-                  <a14:hiddenLine xmlns:a14="http://schemas.microsoft.com/office/drawing/2010/main" xmlns="" w="9525">
+                  <a14:hiddenLine xmlns="" xmlns:a14="http://schemas.microsoft.com/office/drawing/2010/main" w="9525">
                     <a:solidFill>
                       <a:srgbClr val="000000"/>
                     </a:solidFill>
@@ -11015,7 +11014,7 @@
               </a:ln>
               <a:extLst>
                 <a:ext uri="{91240B29-F687-4f45-9708-019B960494DF}">
-                  <a14:hiddenLine xmlns:a14="http://schemas.microsoft.com/office/drawing/2010/main" xmlns="" w="9525">
+                  <a14:hiddenLine xmlns="" xmlns:a14="http://schemas.microsoft.com/office/drawing/2010/main" w="9525">
                     <a:solidFill>
                       <a:srgbClr val="000000"/>
                     </a:solidFill>
@@ -11105,7 +11104,7 @@
               </a:ln>
               <a:extLst>
                 <a:ext uri="{91240B29-F687-4f45-9708-019B960494DF}">
-                  <a14:hiddenLine xmlns:a14="http://schemas.microsoft.com/office/drawing/2010/main" xmlns="" w="9525">
+                  <a14:hiddenLine xmlns="" xmlns:a14="http://schemas.microsoft.com/office/drawing/2010/main" w="9525">
                     <a:solidFill>
                       <a:srgbClr val="000000"/>
                     </a:solidFill>
@@ -11195,7 +11194,7 @@
               </a:ln>
               <a:extLst>
                 <a:ext uri="{91240B29-F687-4f45-9708-019B960494DF}">
-                  <a14:hiddenLine xmlns:a14="http://schemas.microsoft.com/office/drawing/2010/main" xmlns="" w="9525">
+                  <a14:hiddenLine xmlns="" xmlns:a14="http://schemas.microsoft.com/office/drawing/2010/main" w="9525">
                     <a:solidFill>
                       <a:srgbClr val="000000"/>
                     </a:solidFill>
@@ -11257,7 +11256,7 @@
               </a:ln>
               <a:extLst>
                 <a:ext uri="{91240B29-F687-4f45-9708-019B960494DF}">
-                  <a14:hiddenLine xmlns:a14="http://schemas.microsoft.com/office/drawing/2010/main" xmlns="" w="9525">
+                  <a14:hiddenLine xmlns="" xmlns:a14="http://schemas.microsoft.com/office/drawing/2010/main" w="9525">
                     <a:solidFill>
                       <a:srgbClr val="000000"/>
                     </a:solidFill>
@@ -11367,7 +11366,7 @@
               </a:ln>
               <a:extLst>
                 <a:ext uri="{91240B29-F687-4f45-9708-019B960494DF}">
-                  <a14:hiddenLine xmlns:a14="http://schemas.microsoft.com/office/drawing/2010/main" xmlns="" w="9525">
+                  <a14:hiddenLine xmlns="" xmlns:a14="http://schemas.microsoft.com/office/drawing/2010/main" w="9525">
                     <a:solidFill>
                       <a:srgbClr val="000000"/>
                     </a:solidFill>
@@ -11451,7 +11450,7 @@
               </a:ln>
               <a:extLst>
                 <a:ext uri="{91240B29-F687-4f45-9708-019B960494DF}">
-                  <a14:hiddenLine xmlns:a14="http://schemas.microsoft.com/office/drawing/2010/main" xmlns="" w="9525">
+                  <a14:hiddenLine xmlns="" xmlns:a14="http://schemas.microsoft.com/office/drawing/2010/main" w="9525">
                     <a:solidFill>
                       <a:srgbClr val="000000"/>
                     </a:solidFill>
@@ -11513,7 +11512,7 @@
               </a:ln>
               <a:extLst>
                 <a:ext uri="{91240B29-F687-4f45-9708-019B960494DF}">
-                  <a14:hiddenLine xmlns:a14="http://schemas.microsoft.com/office/drawing/2010/main" xmlns="" w="9525">
+                  <a14:hiddenLine xmlns="" xmlns:a14="http://schemas.microsoft.com/office/drawing/2010/main" w="9525">
                     <a:solidFill>
                       <a:srgbClr val="000000"/>
                     </a:solidFill>
@@ -11575,7 +11574,7 @@
               </a:ln>
               <a:extLst>
                 <a:ext uri="{91240B29-F687-4f45-9708-019B960494DF}">
-                  <a14:hiddenLine xmlns:a14="http://schemas.microsoft.com/office/drawing/2010/main" xmlns="" w="9525">
+                  <a14:hiddenLine xmlns="" xmlns:a14="http://schemas.microsoft.com/office/drawing/2010/main" w="9525">
                     <a:solidFill>
                       <a:srgbClr val="000000"/>
                     </a:solidFill>
@@ -11665,7 +11664,7 @@
               </a:ln>
               <a:extLst>
                 <a:ext uri="{91240B29-F687-4f45-9708-019B960494DF}">
-                  <a14:hiddenLine xmlns:a14="http://schemas.microsoft.com/office/drawing/2010/main" xmlns="" w="9525">
+                  <a14:hiddenLine xmlns="" xmlns:a14="http://schemas.microsoft.com/office/drawing/2010/main" w="9525">
                     <a:solidFill>
                       <a:srgbClr val="000000"/>
                     </a:solidFill>
@@ -11699,7 +11698,7 @@
               </a:ln>
               <a:extLst>
                 <a:ext uri="{91240B29-F687-4f45-9708-019B960494DF}">
-                  <a14:hiddenLine xmlns:a14="http://schemas.microsoft.com/office/drawing/2010/main" xmlns="" w="9525">
+                  <a14:hiddenLine xmlns="" xmlns:a14="http://schemas.microsoft.com/office/drawing/2010/main" w="9525">
                     <a:solidFill>
                       <a:srgbClr val="000000"/>
                     </a:solidFill>
@@ -11764,7 +11763,7 @@
               </a:ln>
               <a:extLst>
                 <a:ext uri="{91240B29-F687-4f45-9708-019B960494DF}">
-                  <a14:hiddenLine xmlns:a14="http://schemas.microsoft.com/office/drawing/2010/main" xmlns="" w="9525">
+                  <a14:hiddenLine xmlns="" xmlns:a14="http://schemas.microsoft.com/office/drawing/2010/main" w="9525">
                     <a:solidFill>
                       <a:srgbClr val="000000"/>
                     </a:solidFill>
@@ -11854,7 +11853,7 @@
               </a:ln>
               <a:extLst>
                 <a:ext uri="{91240B29-F687-4f45-9708-019B960494DF}">
-                  <a14:hiddenLine xmlns:a14="http://schemas.microsoft.com/office/drawing/2010/main" xmlns="" w="9525">
+                  <a14:hiddenLine xmlns="" xmlns:a14="http://schemas.microsoft.com/office/drawing/2010/main" w="9525">
                     <a:solidFill>
                       <a:srgbClr val="000000"/>
                     </a:solidFill>
@@ -11916,7 +11915,7 @@
               </a:ln>
               <a:extLst>
                 <a:ext uri="{91240B29-F687-4f45-9708-019B960494DF}">
-                  <a14:hiddenLine xmlns:a14="http://schemas.microsoft.com/office/drawing/2010/main" xmlns="" w="9525">
+                  <a14:hiddenLine xmlns="" xmlns:a14="http://schemas.microsoft.com/office/drawing/2010/main" w="9525">
                     <a:solidFill>
                       <a:srgbClr val="000000"/>
                     </a:solidFill>
@@ -12006,7 +12005,7 @@
               </a:ln>
               <a:extLst>
                 <a:ext uri="{91240B29-F687-4f45-9708-019B960494DF}">
-                  <a14:hiddenLine xmlns:a14="http://schemas.microsoft.com/office/drawing/2010/main" xmlns="" w="9525">
+                  <a14:hiddenLine xmlns="" xmlns:a14="http://schemas.microsoft.com/office/drawing/2010/main" w="9525">
                     <a:solidFill>
                       <a:srgbClr val="000000"/>
                     </a:solidFill>
@@ -12071,7 +12070,7 @@
               </a:ln>
               <a:extLst>
                 <a:ext uri="{91240B29-F687-4f45-9708-019B960494DF}">
-                  <a14:hiddenLine xmlns:a14="http://schemas.microsoft.com/office/drawing/2010/main" xmlns="" w="9525">
+                  <a14:hiddenLine xmlns="" xmlns:a14="http://schemas.microsoft.com/office/drawing/2010/main" w="9525">
                     <a:solidFill>
                       <a:srgbClr val="000000"/>
                     </a:solidFill>
@@ -12133,7 +12132,7 @@
               </a:ln>
               <a:extLst>
                 <a:ext uri="{91240B29-F687-4f45-9708-019B960494DF}">
-                  <a14:hiddenLine xmlns:a14="http://schemas.microsoft.com/office/drawing/2010/main" xmlns="" w="9525">
+                  <a14:hiddenLine xmlns="" xmlns:a14="http://schemas.microsoft.com/office/drawing/2010/main" w="9525">
                     <a:solidFill>
                       <a:srgbClr val="000000"/>
                     </a:solidFill>
@@ -12223,7 +12222,7 @@
               </a:ln>
               <a:extLst>
                 <a:ext uri="{91240B29-F687-4f45-9708-019B960494DF}">
-                  <a14:hiddenLine xmlns:a14="http://schemas.microsoft.com/office/drawing/2010/main" xmlns="" w="9525">
+                  <a14:hiddenLine xmlns="" xmlns:a14="http://schemas.microsoft.com/office/drawing/2010/main" w="9525">
                     <a:solidFill>
                       <a:srgbClr val="000000"/>
                     </a:solidFill>
@@ -12313,7 +12312,7 @@
               </a:ln>
               <a:extLst>
                 <a:ext uri="{91240B29-F687-4f45-9708-019B960494DF}">
-                  <a14:hiddenLine xmlns:a14="http://schemas.microsoft.com/office/drawing/2010/main" xmlns="" w="9525">
+                  <a14:hiddenLine xmlns="" xmlns:a14="http://schemas.microsoft.com/office/drawing/2010/main" w="9525">
                     <a:solidFill>
                       <a:srgbClr val="000000"/>
                     </a:solidFill>
@@ -12378,7 +12377,7 @@
               </a:ln>
               <a:extLst>
                 <a:ext uri="{91240B29-F687-4f45-9708-019B960494DF}">
-                  <a14:hiddenLine xmlns:a14="http://schemas.microsoft.com/office/drawing/2010/main" xmlns="" w="9525">
+                  <a14:hiddenLine xmlns="" xmlns:a14="http://schemas.microsoft.com/office/drawing/2010/main" w="9525">
                     <a:solidFill>
                       <a:srgbClr val="000000"/>
                     </a:solidFill>
@@ -12498,7 +12497,7 @@
               </a:ln>
               <a:extLst>
                 <a:ext uri="{91240B29-F687-4f45-9708-019B960494DF}">
-                  <a14:hiddenLine xmlns:a14="http://schemas.microsoft.com/office/drawing/2010/main" xmlns="" w="9525">
+                  <a14:hiddenLine xmlns="" xmlns:a14="http://schemas.microsoft.com/office/drawing/2010/main" w="9525">
                     <a:solidFill>
                       <a:srgbClr val="000000"/>
                     </a:solidFill>
@@ -12596,7 +12595,7 @@
               </a:ln>
               <a:extLst>
                 <a:ext uri="{91240B29-F687-4f45-9708-019B960494DF}">
-                  <a14:hiddenLine xmlns:a14="http://schemas.microsoft.com/office/drawing/2010/main" xmlns="" w="9525">
+                  <a14:hiddenLine xmlns="" xmlns:a14="http://schemas.microsoft.com/office/drawing/2010/main" w="9525">
                     <a:solidFill>
                       <a:srgbClr val="000000"/>
                     </a:solidFill>
@@ -12711,7 +12710,7 @@
               </a:ln>
               <a:extLst>
                 <a:ext uri="{91240B29-F687-4f45-9708-019B960494DF}">
-                  <a14:hiddenLine xmlns:a14="http://schemas.microsoft.com/office/drawing/2010/main" xmlns="" w="9525">
+                  <a14:hiddenLine xmlns="" xmlns:a14="http://schemas.microsoft.com/office/drawing/2010/main" w="9525">
                     <a:solidFill>
                       <a:srgbClr val="000000"/>
                     </a:solidFill>
@@ -12801,7 +12800,7 @@
               </a:ln>
               <a:extLst>
                 <a:ext uri="{91240B29-F687-4f45-9708-019B960494DF}">
-                  <a14:hiddenLine xmlns:a14="http://schemas.microsoft.com/office/drawing/2010/main" xmlns="" w="9525">
+                  <a14:hiddenLine xmlns="" xmlns:a14="http://schemas.microsoft.com/office/drawing/2010/main" w="9525">
                     <a:solidFill>
                       <a:srgbClr val="000000"/>
                     </a:solidFill>
@@ -12866,7 +12865,7 @@
               </a:ln>
               <a:extLst>
                 <a:ext uri="{91240B29-F687-4f45-9708-019B960494DF}">
-                  <a14:hiddenLine xmlns:a14="http://schemas.microsoft.com/office/drawing/2010/main" xmlns="" w="9525">
+                  <a14:hiddenLine xmlns="" xmlns:a14="http://schemas.microsoft.com/office/drawing/2010/main" w="9525">
                     <a:solidFill>
                       <a:srgbClr val="000000"/>
                     </a:solidFill>
@@ -12956,7 +12955,7 @@
               </a:ln>
               <a:extLst>
                 <a:ext uri="{91240B29-F687-4f45-9708-019B960494DF}">
-                  <a14:hiddenLine xmlns:a14="http://schemas.microsoft.com/office/drawing/2010/main" xmlns="" w="9525">
+                  <a14:hiddenLine xmlns="" xmlns:a14="http://schemas.microsoft.com/office/drawing/2010/main" w="9525">
                     <a:solidFill>
                       <a:srgbClr val="000000"/>
                     </a:solidFill>
@@ -13024,7 +13023,7 @@
               </a:ln>
               <a:extLst>
                 <a:ext uri="{91240B29-F687-4f45-9708-019B960494DF}">
-                  <a14:hiddenLine xmlns:a14="http://schemas.microsoft.com/office/drawing/2010/main" xmlns="" w="9525">
+                  <a14:hiddenLine xmlns="" xmlns:a14="http://schemas.microsoft.com/office/drawing/2010/main" w="9525">
                     <a:solidFill>
                       <a:srgbClr val="000000"/>
                     </a:solidFill>
@@ -13114,7 +13113,7 @@
               </a:ln>
               <a:extLst>
                 <a:ext uri="{91240B29-F687-4f45-9708-019B960494DF}">
-                  <a14:hiddenLine xmlns:a14="http://schemas.microsoft.com/office/drawing/2010/main" xmlns="" w="9525">
+                  <a14:hiddenLine xmlns="" xmlns:a14="http://schemas.microsoft.com/office/drawing/2010/main" w="9525">
                     <a:solidFill>
                       <a:srgbClr val="000000"/>
                     </a:solidFill>
@@ -13182,7 +13181,7 @@
               </a:ln>
               <a:extLst>
                 <a:ext uri="{91240B29-F687-4f45-9708-019B960494DF}">
-                  <a14:hiddenLine xmlns:a14="http://schemas.microsoft.com/office/drawing/2010/main" xmlns="" w="9525">
+                  <a14:hiddenLine xmlns="" xmlns:a14="http://schemas.microsoft.com/office/drawing/2010/main" w="9525">
                     <a:solidFill>
                       <a:srgbClr val="000000"/>
                     </a:solidFill>
@@ -13272,7 +13271,7 @@
               </a:ln>
               <a:extLst>
                 <a:ext uri="{91240B29-F687-4f45-9708-019B960494DF}">
-                  <a14:hiddenLine xmlns:a14="http://schemas.microsoft.com/office/drawing/2010/main" xmlns="" w="9525">
+                  <a14:hiddenLine xmlns="" xmlns:a14="http://schemas.microsoft.com/office/drawing/2010/main" w="9525">
                     <a:solidFill>
                       <a:srgbClr val="000000"/>
                     </a:solidFill>
@@ -13306,7 +13305,7 @@
               </a:ln>
               <a:extLst>
                 <a:ext uri="{91240B29-F687-4f45-9708-019B960494DF}">
-                  <a14:hiddenLine xmlns:a14="http://schemas.microsoft.com/office/drawing/2010/main" xmlns="" w="9525">
+                  <a14:hiddenLine xmlns="" xmlns:a14="http://schemas.microsoft.com/office/drawing/2010/main" w="9525">
                     <a:solidFill>
                       <a:srgbClr val="000000"/>
                     </a:solidFill>
@@ -13446,7 +13445,7 @@
           <a:p>
             <a:fld id="{849DE176-146E-4F1E-BCCE-E46272DCA095}" type="datetimeFigureOut">
               <a:rPr lang="es-AR" smtClean="0"/>
-              <a:t>21/4/2023</a:t>
+              <a:t>16/6/2023</a:t>
             </a:fld>
             <a:endParaRPr lang="es-AR"/>
           </a:p>
@@ -19013,307 +19012,6 @@
       </p:grpSpPr>
       <p:sp>
         <p:nvSpPr>
-          <p:cNvPr id="6" name="Subtitle 1"/>
-          <p:cNvSpPr txBox="1">
-            <a:spLocks/>
-          </p:cNvSpPr>
-          <p:nvPr/>
-        </p:nvSpPr>
-        <p:spPr>
-          <a:xfrm>
-            <a:off x="0" y="0"/>
-            <a:ext cx="12511314" cy="1085871"/>
-          </a:xfrm>
-          <a:prstGeom prst="rect">
-            <a:avLst/>
-          </a:prstGeom>
-        </p:spPr>
-        <p:txBody>
-          <a:bodyPr vert="horz" lIns="91440" tIns="45720" rIns="91440" bIns="45720" rtlCol="0">
-            <a:noAutofit/>
-          </a:bodyPr>
-          <a:lstStyle>
-            <a:lvl1pPr marL="228600" indent="-228600" algn="l" defTabSz="914400" rtl="0" eaLnBrk="1" latinLnBrk="0" hangingPunct="1">
-              <a:lnSpc>
-                <a:spcPct val="120000"/>
-              </a:lnSpc>
-              <a:spcBef>
-                <a:spcPts val="1000"/>
-              </a:spcBef>
-              <a:buSzPct val="125000"/>
-              <a:buFont typeface="Arial" panose="020B0604020202020204" pitchFamily="34" charset="0"/>
-              <a:buChar char="•"/>
-              <a:defRPr sz="2400" kern="1200">
-                <a:solidFill>
-                  <a:schemeClr val="tx1"/>
-                </a:solidFill>
-                <a:latin typeface="+mn-lt"/>
-                <a:ea typeface="+mn-ea"/>
-                <a:cs typeface="+mn-cs"/>
-              </a:defRPr>
-            </a:lvl1pPr>
-            <a:lvl2pPr marL="685800" indent="-228600" algn="l" defTabSz="914400" rtl="0" eaLnBrk="1" latinLnBrk="0" hangingPunct="1">
-              <a:lnSpc>
-                <a:spcPct val="120000"/>
-              </a:lnSpc>
-              <a:spcBef>
-                <a:spcPts val="500"/>
-              </a:spcBef>
-              <a:buSzPct val="125000"/>
-              <a:buFont typeface="Arial" panose="020B0604020202020204" pitchFamily="34" charset="0"/>
-              <a:buChar char="•"/>
-              <a:defRPr sz="2000" kern="1200">
-                <a:solidFill>
-                  <a:schemeClr val="tx1"/>
-                </a:solidFill>
-                <a:latin typeface="+mn-lt"/>
-                <a:ea typeface="+mn-ea"/>
-                <a:cs typeface="+mn-cs"/>
-              </a:defRPr>
-            </a:lvl2pPr>
-            <a:lvl3pPr marL="1143000" indent="-228600" algn="l" defTabSz="914400" rtl="0" eaLnBrk="1" latinLnBrk="0" hangingPunct="1">
-              <a:lnSpc>
-                <a:spcPct val="120000"/>
-              </a:lnSpc>
-              <a:spcBef>
-                <a:spcPts val="500"/>
-              </a:spcBef>
-              <a:buSzPct val="125000"/>
-              <a:buFont typeface="Arial" panose="020B0604020202020204" pitchFamily="34" charset="0"/>
-              <a:buChar char="•"/>
-              <a:defRPr sz="1800" kern="1200">
-                <a:solidFill>
-                  <a:schemeClr val="tx1"/>
-                </a:solidFill>
-                <a:latin typeface="+mn-lt"/>
-                <a:ea typeface="+mn-ea"/>
-                <a:cs typeface="+mn-cs"/>
-              </a:defRPr>
-            </a:lvl3pPr>
-            <a:lvl4pPr marL="1600200" indent="-228600" algn="l" defTabSz="914400" rtl="0" eaLnBrk="1" latinLnBrk="0" hangingPunct="1">
-              <a:lnSpc>
-                <a:spcPct val="120000"/>
-              </a:lnSpc>
-              <a:spcBef>
-                <a:spcPts val="500"/>
-              </a:spcBef>
-              <a:buSzPct val="125000"/>
-              <a:buFont typeface="Arial" panose="020B0604020202020204" pitchFamily="34" charset="0"/>
-              <a:buChar char="•"/>
-              <a:defRPr sz="1600" kern="1200">
-                <a:solidFill>
-                  <a:schemeClr val="tx1"/>
-                </a:solidFill>
-                <a:latin typeface="+mn-lt"/>
-                <a:ea typeface="+mn-ea"/>
-                <a:cs typeface="+mn-cs"/>
-              </a:defRPr>
-            </a:lvl4pPr>
-            <a:lvl5pPr marL="2057400" indent="-228600" algn="l" defTabSz="914400" rtl="0" eaLnBrk="1" latinLnBrk="0" hangingPunct="1">
-              <a:lnSpc>
-                <a:spcPct val="120000"/>
-              </a:lnSpc>
-              <a:spcBef>
-                <a:spcPts val="500"/>
-              </a:spcBef>
-              <a:buSzPct val="125000"/>
-              <a:buFont typeface="Arial" panose="020B0604020202020204" pitchFamily="34" charset="0"/>
-              <a:buChar char="•"/>
-              <a:defRPr sz="1600" kern="1200">
-                <a:solidFill>
-                  <a:schemeClr val="tx1"/>
-                </a:solidFill>
-                <a:latin typeface="+mn-lt"/>
-                <a:ea typeface="+mn-ea"/>
-                <a:cs typeface="+mn-cs"/>
-              </a:defRPr>
-            </a:lvl5pPr>
-            <a:lvl6pPr marL="2514600" indent="-228600" algn="l" defTabSz="914400" rtl="0" eaLnBrk="1" latinLnBrk="0" hangingPunct="1">
-              <a:lnSpc>
-                <a:spcPct val="120000"/>
-              </a:lnSpc>
-              <a:spcBef>
-                <a:spcPts val="500"/>
-              </a:spcBef>
-              <a:buSzPct val="125000"/>
-              <a:buFont typeface="Arial" panose="020B0604020202020204" pitchFamily="34" charset="0"/>
-              <a:buChar char="•"/>
-              <a:defRPr sz="1400" kern="1200">
-                <a:solidFill>
-                  <a:schemeClr val="tx1"/>
-                </a:solidFill>
-                <a:latin typeface="+mn-lt"/>
-                <a:ea typeface="+mn-ea"/>
-                <a:cs typeface="+mn-cs"/>
-              </a:defRPr>
-            </a:lvl6pPr>
-            <a:lvl7pPr marL="2971800" indent="-228600" algn="l" defTabSz="914400" rtl="0" eaLnBrk="1" latinLnBrk="0" hangingPunct="1">
-              <a:lnSpc>
-                <a:spcPct val="120000"/>
-              </a:lnSpc>
-              <a:spcBef>
-                <a:spcPts val="500"/>
-              </a:spcBef>
-              <a:buSzPct val="125000"/>
-              <a:buFont typeface="Arial" panose="020B0604020202020204" pitchFamily="34" charset="0"/>
-              <a:buChar char="•"/>
-              <a:defRPr sz="1400" kern="1200">
-                <a:solidFill>
-                  <a:schemeClr val="tx1"/>
-                </a:solidFill>
-                <a:latin typeface="+mn-lt"/>
-                <a:ea typeface="+mn-ea"/>
-                <a:cs typeface="+mn-cs"/>
-              </a:defRPr>
-            </a:lvl7pPr>
-            <a:lvl8pPr marL="3429000" indent="-228600" algn="l" defTabSz="914400" rtl="0" eaLnBrk="1" latinLnBrk="0" hangingPunct="1">
-              <a:lnSpc>
-                <a:spcPct val="120000"/>
-              </a:lnSpc>
-              <a:spcBef>
-                <a:spcPts val="500"/>
-              </a:spcBef>
-              <a:buSzPct val="125000"/>
-              <a:buFont typeface="Arial" panose="020B0604020202020204" pitchFamily="34" charset="0"/>
-              <a:buChar char="•"/>
-              <a:defRPr sz="1400" kern="1200">
-                <a:solidFill>
-                  <a:schemeClr val="tx1"/>
-                </a:solidFill>
-                <a:latin typeface="+mn-lt"/>
-                <a:ea typeface="+mn-ea"/>
-                <a:cs typeface="+mn-cs"/>
-              </a:defRPr>
-            </a:lvl8pPr>
-            <a:lvl9pPr marL="3886200" indent="-228600" algn="l" defTabSz="914400" rtl="0" eaLnBrk="1" latinLnBrk="0" hangingPunct="1">
-              <a:lnSpc>
-                <a:spcPct val="120000"/>
-              </a:lnSpc>
-              <a:spcBef>
-                <a:spcPts val="500"/>
-              </a:spcBef>
-              <a:buSzPct val="125000"/>
-              <a:buFont typeface="Arial" panose="020B0604020202020204" pitchFamily="34" charset="0"/>
-              <a:buChar char="•"/>
-              <a:defRPr sz="1400" kern="1200">
-                <a:solidFill>
-                  <a:schemeClr val="tx1"/>
-                </a:solidFill>
-                <a:latin typeface="+mn-lt"/>
-                <a:ea typeface="+mn-ea"/>
-                <a:cs typeface="+mn-cs"/>
-              </a:defRPr>
-            </a:lvl9pPr>
-          </a:lstStyle>
-          <a:p>
-            <a:pPr marL="0" indent="0" algn="ctr">
-              <a:buNone/>
-            </a:pPr>
-            <a:r>
-              <a:rPr lang="es-AR" sz="3200" dirty="0">
-                <a:solidFill>
-                  <a:schemeClr val="bg1"/>
-                </a:solidFill>
-              </a:rPr>
-              <a:t>Generative Adversarial Network (GAN) - Valor optimo del costo</a:t>
-            </a:r>
-          </a:p>
-        </p:txBody>
-      </p:sp>
-      <p:pic>
-        <p:nvPicPr>
-          <p:cNvPr id="3" name="Picture 2"/>
-          <p:cNvPicPr>
-            <a:picLocks noChangeAspect="1"/>
-          </p:cNvPicPr>
-          <p:nvPr/>
-        </p:nvPicPr>
-        <p:blipFill rotWithShape="1">
-          <a:blip r:embed="rId2"/>
-          <a:srcRect r="1318"/>
-          <a:stretch/>
-        </p:blipFill>
-        <p:spPr>
-          <a:xfrm>
-            <a:off x="960843" y="1221270"/>
-            <a:ext cx="10270314" cy="3483251"/>
-          </a:xfrm>
-          <a:prstGeom prst="rect">
-            <a:avLst/>
-          </a:prstGeom>
-        </p:spPr>
-      </p:pic>
-      <p:sp>
-        <p:nvSpPr>
-          <p:cNvPr id="4" name="CuadroTexto 3">
-            <a:extLst>
-              <a:ext uri="{FF2B5EF4-FFF2-40B4-BE49-F238E27FC236}">
-                <a16:creationId xmlns:a16="http://schemas.microsoft.com/office/drawing/2014/main" id="{E16C6773-B006-915F-DED4-D42F9BA91C1D}"/>
-              </a:ext>
-            </a:extLst>
-          </p:cNvPr>
-          <p:cNvSpPr txBox="1"/>
-          <p:nvPr/>
-        </p:nvSpPr>
-        <p:spPr>
-          <a:xfrm>
-            <a:off x="960843" y="6172885"/>
-            <a:ext cx="10153650" cy="369332"/>
-          </a:xfrm>
-          <a:prstGeom prst="rect">
-            <a:avLst/>
-          </a:prstGeom>
-          <a:noFill/>
-        </p:spPr>
-        <p:txBody>
-          <a:bodyPr wrap="square">
-            <a:spAutoFit/>
-          </a:bodyPr>
-          <a:lstStyle/>
-          <a:p>
-            <a:r>
-              <a:rPr lang="es-AR" dirty="0">
-                <a:solidFill>
-                  <a:schemeClr val="bg1"/>
-                </a:solidFill>
-              </a:rPr>
-              <a:t>https://lilianweng.github.io/posts/2017-08-20-gan/#kullbackleibler-and-jensenshannon-divergence</a:t>
-            </a:r>
-          </a:p>
-        </p:txBody>
-      </p:sp>
-    </p:spTree>
-    <p:extLst>
-      <p:ext uri="{BB962C8B-B14F-4D97-AF65-F5344CB8AC3E}">
-        <p14:creationId xmlns:p14="http://schemas.microsoft.com/office/powerpoint/2010/main" val="2815013244"/>
-      </p:ext>
-    </p:extLst>
-  </p:cSld>
-  <p:clrMapOvr>
-    <a:masterClrMapping/>
-  </p:clrMapOvr>
-</p:sld>
-</file>
-
-<file path=ppt/slides/slide15.xml><?xml version="1.0" encoding="utf-8"?>
-<p:sld xmlns:a="http://schemas.openxmlformats.org/drawingml/2006/main" xmlns:r="http://schemas.openxmlformats.org/officeDocument/2006/relationships" xmlns:p="http://schemas.openxmlformats.org/presentationml/2006/main">
-  <p:cSld>
-    <p:spTree>
-      <p:nvGrpSpPr>
-        <p:cNvPr id="1" name=""/>
-        <p:cNvGrpSpPr/>
-        <p:nvPr/>
-      </p:nvGrpSpPr>
-      <p:grpSpPr>
-        <a:xfrm>
-          <a:off x="0" y="0"/>
-          <a:ext cx="0" cy="0"/>
-          <a:chOff x="0" y="0"/>
-          <a:chExt cx="0" cy="0"/>
-        </a:xfrm>
-      </p:grpSpPr>
-      <p:sp>
-        <p:nvSpPr>
           <p:cNvPr id="5" name="Subtitle 1"/>
           <p:cNvSpPr txBox="1">
             <a:spLocks/>
@@ -19884,7 +19582,7 @@
 </p:sld>
 </file>
 
-<file path=ppt/slides/slide16.xml><?xml version="1.0" encoding="utf-8"?>
+<file path=ppt/slides/slide15.xml><?xml version="1.0" encoding="utf-8"?>
 <p:sld xmlns:a="http://schemas.openxmlformats.org/drawingml/2006/main" xmlns:r="http://schemas.openxmlformats.org/officeDocument/2006/relationships" xmlns:p="http://schemas.openxmlformats.org/presentationml/2006/main">
   <p:cSld>
     <p:spTree>
@@ -21986,7 +21684,7 @@
         </p:blipFill>
         <p:spPr>
           <a:xfrm>
-            <a:off x="1041220" y="619095"/>
+            <a:off x="1041219" y="1291203"/>
             <a:ext cx="10109559" cy="5145602"/>
           </a:xfrm>
           <a:prstGeom prst="rect">
@@ -22266,7 +21964,7 @@
         </p:nvSpPr>
         <p:spPr>
           <a:xfrm>
-            <a:off x="8918713" y="3193774"/>
+            <a:off x="8918713" y="3854391"/>
             <a:ext cx="450573" cy="1340461"/>
           </a:xfrm>
           <a:prstGeom prst="rect">
@@ -22587,6 +22285,19 @@
               </a:rPr>
               <a:t>Learning</a:t>
             </a:r>
+            <a:r>
+              <a:rPr lang="es-AR" sz="3200" dirty="0">
+                <a:solidFill>
+                  <a:schemeClr val="bg1"/>
+                </a:solidFill>
+              </a:rPr>
+              <a:t> - ¿Qué estrategia usar?</a:t>
+            </a:r>
+          </a:p>
+          <a:p>
+            <a:pPr marL="0" indent="0" algn="ctr">
+              <a:buNone/>
+            </a:pPr>
             <a:endParaRPr lang="es-AR" sz="3200" dirty="0">
               <a:solidFill>
                 <a:schemeClr val="bg1"/>
@@ -22595,231 +22306,873 @@
           </a:p>
         </p:txBody>
       </p:sp>
-      <p:sp>
-        <p:nvSpPr>
-          <p:cNvPr id="12" name="Subtitle 1">
+      <p:cxnSp>
+        <p:nvCxnSpPr>
+          <p:cNvPr id="3" name="Conector recto de flecha 2">
             <a:extLst>
               <a:ext uri="{FF2B5EF4-FFF2-40B4-BE49-F238E27FC236}">
-                <a16:creationId xmlns:a16="http://schemas.microsoft.com/office/drawing/2014/main" id="{173875A2-756C-C285-A3FC-2C04FCABF78E}"/>
+                <a16:creationId xmlns:a16="http://schemas.microsoft.com/office/drawing/2014/main" id="{5EBC6E99-81D6-E402-C1F3-2B06ADD13C83}"/>
               </a:ext>
             </a:extLst>
           </p:cNvPr>
-          <p:cNvSpPr txBox="1">
-            <a:spLocks/>
-          </p:cNvSpPr>
+          <p:cNvCxnSpPr/>
+          <p:nvPr/>
+        </p:nvCxnSpPr>
+        <p:spPr>
+          <a:xfrm>
+            <a:off x="1219200" y="3710609"/>
+            <a:ext cx="9236765" cy="0"/>
+          </a:xfrm>
+          <a:prstGeom prst="straightConnector1">
+            <a:avLst/>
+          </a:prstGeom>
+          <a:ln w="76200">
+            <a:headEnd type="triangle"/>
+            <a:tailEnd type="triangle"/>
+          </a:ln>
+        </p:spPr>
+        <p:style>
+          <a:lnRef idx="1">
+            <a:schemeClr val="accent2"/>
+          </a:lnRef>
+          <a:fillRef idx="0">
+            <a:schemeClr val="accent2"/>
+          </a:fillRef>
+          <a:effectRef idx="0">
+            <a:schemeClr val="accent2"/>
+          </a:effectRef>
+          <a:fontRef idx="minor">
+            <a:schemeClr val="tx1"/>
+          </a:fontRef>
+        </p:style>
+      </p:cxnSp>
+      <p:cxnSp>
+        <p:nvCxnSpPr>
+          <p:cNvPr id="5" name="Conector recto de flecha 4">
+            <a:extLst>
+              <a:ext uri="{FF2B5EF4-FFF2-40B4-BE49-F238E27FC236}">
+                <a16:creationId xmlns:a16="http://schemas.microsoft.com/office/drawing/2014/main" id="{79E2AA7B-0C05-90F6-2742-E9A887A241AB}"/>
+              </a:ext>
+            </a:extLst>
+          </p:cNvPr>
+          <p:cNvCxnSpPr>
+            <a:cxnSpLocks/>
+          </p:cNvCxnSpPr>
+          <p:nvPr/>
+        </p:nvCxnSpPr>
+        <p:spPr>
+          <a:xfrm>
+            <a:off x="5605670" y="1085871"/>
+            <a:ext cx="0" cy="5006083"/>
+          </a:xfrm>
+          <a:prstGeom prst="straightConnector1">
+            <a:avLst/>
+          </a:prstGeom>
+          <a:ln w="76200">
+            <a:headEnd type="triangle"/>
+            <a:tailEnd type="triangle"/>
+          </a:ln>
+        </p:spPr>
+        <p:style>
+          <a:lnRef idx="1">
+            <a:schemeClr val="accent2"/>
+          </a:lnRef>
+          <a:fillRef idx="0">
+            <a:schemeClr val="accent2"/>
+          </a:fillRef>
+          <a:effectRef idx="0">
+            <a:schemeClr val="accent2"/>
+          </a:effectRef>
+          <a:fontRef idx="minor">
+            <a:schemeClr val="tx1"/>
+          </a:fontRef>
+        </p:style>
+      </p:cxnSp>
+      <p:sp>
+        <p:nvSpPr>
+          <p:cNvPr id="9" name="CuadroTexto 8">
+            <a:extLst>
+              <a:ext uri="{FF2B5EF4-FFF2-40B4-BE49-F238E27FC236}">
+                <a16:creationId xmlns:a16="http://schemas.microsoft.com/office/drawing/2014/main" id="{3CC4C91B-D1B6-4B85-0C60-474E765AA993}"/>
+              </a:ext>
+            </a:extLst>
+          </p:cNvPr>
+          <p:cNvSpPr txBox="1"/>
           <p:nvPr/>
         </p:nvSpPr>
         <p:spPr>
           <a:xfrm>
-            <a:off x="2418522" y="842925"/>
-            <a:ext cx="7354956" cy="525127"/>
+            <a:off x="58885" y="3284452"/>
+            <a:ext cx="1789040" cy="830997"/>
           </a:xfrm>
           <a:prstGeom prst="rect">
             <a:avLst/>
           </a:prstGeom>
+          <a:noFill/>
         </p:spPr>
         <p:txBody>
-          <a:bodyPr vert="horz" lIns="91440" tIns="45720" rIns="91440" bIns="45720" rtlCol="0">
-            <a:noAutofit/>
+          <a:bodyPr wrap="square">
+            <a:spAutoFit/>
           </a:bodyPr>
-          <a:lstStyle>
-            <a:lvl1pPr marL="0" indent="0" algn="ctr" defTabSz="914400" rtl="0" eaLnBrk="1" latinLnBrk="0" hangingPunct="1">
-              <a:lnSpc>
-                <a:spcPct val="90000"/>
-              </a:lnSpc>
-              <a:spcBef>
-                <a:spcPts val="1000"/>
-              </a:spcBef>
-              <a:buFont typeface="Arial" panose="020B0604020202020204" pitchFamily="34" charset="0"/>
-              <a:buNone/>
-              <a:defRPr sz="2400" kern="1200">
-                <a:solidFill>
-                  <a:schemeClr val="tx1"/>
-                </a:solidFill>
-                <a:latin typeface="+mn-lt"/>
-                <a:ea typeface="+mn-ea"/>
-                <a:cs typeface="+mn-cs"/>
-              </a:defRPr>
-            </a:lvl1pPr>
-            <a:lvl2pPr marL="457200" indent="0" algn="ctr" defTabSz="914400" rtl="0" eaLnBrk="1" latinLnBrk="0" hangingPunct="1">
-              <a:lnSpc>
-                <a:spcPct val="90000"/>
-              </a:lnSpc>
-              <a:spcBef>
-                <a:spcPts val="500"/>
-              </a:spcBef>
-              <a:buFont typeface="Arial" panose="020B0604020202020204" pitchFamily="34" charset="0"/>
-              <a:buNone/>
-              <a:defRPr sz="2000" kern="1200">
-                <a:solidFill>
-                  <a:schemeClr val="tx1"/>
-                </a:solidFill>
-                <a:latin typeface="+mn-lt"/>
-                <a:ea typeface="+mn-ea"/>
-                <a:cs typeface="+mn-cs"/>
-              </a:defRPr>
-            </a:lvl2pPr>
-            <a:lvl3pPr marL="914400" indent="0" algn="ctr" defTabSz="914400" rtl="0" eaLnBrk="1" latinLnBrk="0" hangingPunct="1">
-              <a:lnSpc>
-                <a:spcPct val="90000"/>
-              </a:lnSpc>
-              <a:spcBef>
-                <a:spcPts val="500"/>
-              </a:spcBef>
-              <a:buFont typeface="Arial" panose="020B0604020202020204" pitchFamily="34" charset="0"/>
-              <a:buNone/>
-              <a:defRPr sz="1800" kern="1200">
-                <a:solidFill>
-                  <a:schemeClr val="tx1"/>
-                </a:solidFill>
-                <a:latin typeface="+mn-lt"/>
-                <a:ea typeface="+mn-ea"/>
-                <a:cs typeface="+mn-cs"/>
-              </a:defRPr>
-            </a:lvl3pPr>
-            <a:lvl4pPr marL="1371600" indent="0" algn="ctr" defTabSz="914400" rtl="0" eaLnBrk="1" latinLnBrk="0" hangingPunct="1">
-              <a:lnSpc>
-                <a:spcPct val="90000"/>
-              </a:lnSpc>
-              <a:spcBef>
-                <a:spcPts val="500"/>
-              </a:spcBef>
-              <a:buFont typeface="Arial" panose="020B0604020202020204" pitchFamily="34" charset="0"/>
-              <a:buNone/>
-              <a:defRPr sz="1600" kern="1200">
-                <a:solidFill>
-                  <a:schemeClr val="tx1"/>
-                </a:solidFill>
-                <a:latin typeface="+mn-lt"/>
-                <a:ea typeface="+mn-ea"/>
-                <a:cs typeface="+mn-cs"/>
-              </a:defRPr>
-            </a:lvl4pPr>
-            <a:lvl5pPr marL="1828800" indent="0" algn="ctr" defTabSz="914400" rtl="0" eaLnBrk="1" latinLnBrk="0" hangingPunct="1">
-              <a:lnSpc>
-                <a:spcPct val="90000"/>
-              </a:lnSpc>
-              <a:spcBef>
-                <a:spcPts val="500"/>
-              </a:spcBef>
-              <a:buFont typeface="Arial" panose="020B0604020202020204" pitchFamily="34" charset="0"/>
-              <a:buNone/>
-              <a:defRPr sz="1600" kern="1200">
-                <a:solidFill>
-                  <a:schemeClr val="tx1"/>
-                </a:solidFill>
-                <a:latin typeface="+mn-lt"/>
-                <a:ea typeface="+mn-ea"/>
-                <a:cs typeface="+mn-cs"/>
-              </a:defRPr>
-            </a:lvl5pPr>
-            <a:lvl6pPr marL="2286000" indent="0" algn="ctr" defTabSz="914400" rtl="0" eaLnBrk="1" latinLnBrk="0" hangingPunct="1">
-              <a:lnSpc>
-                <a:spcPct val="90000"/>
-              </a:lnSpc>
-              <a:spcBef>
-                <a:spcPts val="500"/>
-              </a:spcBef>
-              <a:buFont typeface="Arial" panose="020B0604020202020204" pitchFamily="34" charset="0"/>
-              <a:buNone/>
-              <a:defRPr sz="1600" kern="1200">
-                <a:solidFill>
-                  <a:schemeClr val="tx1"/>
-                </a:solidFill>
-                <a:latin typeface="+mn-lt"/>
-                <a:ea typeface="+mn-ea"/>
-                <a:cs typeface="+mn-cs"/>
-              </a:defRPr>
-            </a:lvl6pPr>
-            <a:lvl7pPr marL="2743200" indent="0" algn="ctr" defTabSz="914400" rtl="0" eaLnBrk="1" latinLnBrk="0" hangingPunct="1">
-              <a:lnSpc>
-                <a:spcPct val="90000"/>
-              </a:lnSpc>
-              <a:spcBef>
-                <a:spcPts val="500"/>
-              </a:spcBef>
-              <a:buFont typeface="Arial" panose="020B0604020202020204" pitchFamily="34" charset="0"/>
-              <a:buNone/>
-              <a:defRPr sz="1600" kern="1200">
-                <a:solidFill>
-                  <a:schemeClr val="tx1"/>
-                </a:solidFill>
-                <a:latin typeface="+mn-lt"/>
-                <a:ea typeface="+mn-ea"/>
-                <a:cs typeface="+mn-cs"/>
-              </a:defRPr>
-            </a:lvl7pPr>
-            <a:lvl8pPr marL="3200400" indent="0" algn="ctr" defTabSz="914400" rtl="0" eaLnBrk="1" latinLnBrk="0" hangingPunct="1">
-              <a:lnSpc>
-                <a:spcPct val="90000"/>
-              </a:lnSpc>
-              <a:spcBef>
-                <a:spcPts val="500"/>
-              </a:spcBef>
-              <a:buFont typeface="Arial" panose="020B0604020202020204" pitchFamily="34" charset="0"/>
-              <a:buNone/>
-              <a:defRPr sz="1600" kern="1200">
-                <a:solidFill>
-                  <a:schemeClr val="tx1"/>
-                </a:solidFill>
-                <a:latin typeface="+mn-lt"/>
-                <a:ea typeface="+mn-ea"/>
-                <a:cs typeface="+mn-cs"/>
-              </a:defRPr>
-            </a:lvl8pPr>
-            <a:lvl9pPr marL="3657600" indent="0" algn="ctr" defTabSz="914400" rtl="0" eaLnBrk="1" latinLnBrk="0" hangingPunct="1">
-              <a:lnSpc>
-                <a:spcPct val="90000"/>
-              </a:lnSpc>
-              <a:spcBef>
-                <a:spcPts val="500"/>
-              </a:spcBef>
-              <a:buFont typeface="Arial" panose="020B0604020202020204" pitchFamily="34" charset="0"/>
-              <a:buNone/>
-              <a:defRPr sz="1600" kern="1200">
-                <a:solidFill>
-                  <a:schemeClr val="tx1"/>
-                </a:solidFill>
-                <a:latin typeface="+mn-lt"/>
-                <a:ea typeface="+mn-ea"/>
-                <a:cs typeface="+mn-cs"/>
-              </a:defRPr>
-            </a:lvl9pPr>
-          </a:lstStyle>
+          <a:lstStyle/>
           <a:p>
             <a:r>
-              <a:rPr lang="es-AR" sz="2800" dirty="0">
+              <a:rPr lang="es-AR" sz="2400" dirty="0" err="1">
                 <a:solidFill>
                   <a:schemeClr val="bg1"/>
                 </a:solidFill>
               </a:rPr>
-              <a:t>Se reentrena la nueva arquitectura con el </a:t>
-            </a:r>
-            <a:r>
-              <a:rPr lang="es-AR" sz="2800" dirty="0" err="1">
+              <a:t>Dataset</a:t>
+            </a:r>
+            <a:r>
+              <a:rPr lang="es-AR" sz="2400" dirty="0">
                 <a:solidFill>
                   <a:schemeClr val="bg1"/>
                 </a:solidFill>
               </a:rPr>
-              <a:t>dataset</a:t>
-            </a:r>
-            <a:r>
-              <a:rPr lang="es-AR" sz="2800" dirty="0">
-                <a:solidFill>
-                  <a:schemeClr val="bg1"/>
-                </a:solidFill>
-              </a:rPr>
-              <a:t> específico bajo la tarea específica a cumplir.</a:t>
-            </a:r>
+              <a:t> pequeño </a:t>
+            </a:r>
+            <a:endParaRPr lang="es-AR" sz="2400" dirty="0"/>
           </a:p>
         </p:txBody>
       </p:sp>
+      <p:sp>
+        <p:nvSpPr>
+          <p:cNvPr id="10" name="CuadroTexto 9">
+            <a:extLst>
+              <a:ext uri="{FF2B5EF4-FFF2-40B4-BE49-F238E27FC236}">
+                <a16:creationId xmlns:a16="http://schemas.microsoft.com/office/drawing/2014/main" id="{9241FF65-4241-DE52-6A64-75594F8D8931}"/>
+              </a:ext>
+            </a:extLst>
+          </p:cNvPr>
+          <p:cNvSpPr txBox="1"/>
+          <p:nvPr/>
+        </p:nvSpPr>
+        <p:spPr>
+          <a:xfrm>
+            <a:off x="10520489" y="3199901"/>
+            <a:ext cx="1689648" cy="830997"/>
+          </a:xfrm>
+          <a:prstGeom prst="rect">
+            <a:avLst/>
+          </a:prstGeom>
+          <a:noFill/>
+        </p:spPr>
+        <p:txBody>
+          <a:bodyPr wrap="square">
+            <a:spAutoFit/>
+          </a:bodyPr>
+          <a:lstStyle/>
+          <a:p>
+            <a:r>
+              <a:rPr lang="es-AR" sz="2400" dirty="0" err="1">
+                <a:solidFill>
+                  <a:schemeClr val="bg1"/>
+                </a:solidFill>
+              </a:rPr>
+              <a:t>Dataset</a:t>
+            </a:r>
+            <a:r>
+              <a:rPr lang="es-AR" sz="2400" dirty="0">
+                <a:solidFill>
+                  <a:schemeClr val="bg1"/>
+                </a:solidFill>
+              </a:rPr>
+              <a:t> grande</a:t>
+            </a:r>
+            <a:endParaRPr lang="es-AR" sz="2400" dirty="0"/>
+          </a:p>
+        </p:txBody>
+      </p:sp>
+      <p:sp>
+        <p:nvSpPr>
+          <p:cNvPr id="11" name="CuadroTexto 10">
+            <a:extLst>
+              <a:ext uri="{FF2B5EF4-FFF2-40B4-BE49-F238E27FC236}">
+                <a16:creationId xmlns:a16="http://schemas.microsoft.com/office/drawing/2014/main" id="{786610DA-0C4D-A6B8-BCDC-9E16E3D907EF}"/>
+              </a:ext>
+            </a:extLst>
+          </p:cNvPr>
+          <p:cNvSpPr txBox="1"/>
+          <p:nvPr/>
+        </p:nvSpPr>
+        <p:spPr>
+          <a:xfrm>
+            <a:off x="5117076" y="629685"/>
+            <a:ext cx="2548961" cy="830997"/>
+          </a:xfrm>
+          <a:prstGeom prst="rect">
+            <a:avLst/>
+          </a:prstGeom>
+          <a:noFill/>
+        </p:spPr>
+        <p:txBody>
+          <a:bodyPr wrap="square">
+            <a:spAutoFit/>
+          </a:bodyPr>
+          <a:lstStyle/>
+          <a:p>
+            <a:pPr algn="ctr"/>
+            <a:r>
+              <a:rPr lang="es-AR" sz="2400" dirty="0" err="1">
+                <a:solidFill>
+                  <a:schemeClr val="bg1"/>
+                </a:solidFill>
+              </a:rPr>
+              <a:t>Dataset</a:t>
+            </a:r>
+            <a:r>
+              <a:rPr lang="es-AR" sz="2400" dirty="0">
+                <a:solidFill>
+                  <a:schemeClr val="bg1"/>
+                </a:solidFill>
+              </a:rPr>
+              <a:t> semejante al </a:t>
+            </a:r>
+            <a:r>
+              <a:rPr lang="es-AR" sz="2400" dirty="0" err="1">
+                <a:solidFill>
+                  <a:schemeClr val="bg1"/>
+                </a:solidFill>
+              </a:rPr>
+              <a:t>generic</a:t>
+            </a:r>
+            <a:endParaRPr lang="es-AR" sz="2400" dirty="0"/>
+          </a:p>
+        </p:txBody>
+      </p:sp>
+      <p:sp>
+        <p:nvSpPr>
+          <p:cNvPr id="13" name="CuadroTexto 12">
+            <a:extLst>
+              <a:ext uri="{FF2B5EF4-FFF2-40B4-BE49-F238E27FC236}">
+                <a16:creationId xmlns:a16="http://schemas.microsoft.com/office/drawing/2014/main" id="{7CEE8649-6685-48ED-332D-9CAB11E68EEF}"/>
+              </a:ext>
+            </a:extLst>
+          </p:cNvPr>
+          <p:cNvSpPr txBox="1"/>
+          <p:nvPr/>
+        </p:nvSpPr>
+        <p:spPr>
+          <a:xfrm>
+            <a:off x="4978269" y="6091954"/>
+            <a:ext cx="2198343" cy="830997"/>
+          </a:xfrm>
+          <a:prstGeom prst="rect">
+            <a:avLst/>
+          </a:prstGeom>
+          <a:noFill/>
+        </p:spPr>
+        <p:txBody>
+          <a:bodyPr wrap="square">
+            <a:spAutoFit/>
+          </a:bodyPr>
+          <a:lstStyle/>
+          <a:p>
+            <a:pPr algn="ctr"/>
+            <a:r>
+              <a:rPr lang="es-AR" sz="2400" dirty="0" err="1">
+                <a:solidFill>
+                  <a:schemeClr val="bg1"/>
+                </a:solidFill>
+              </a:rPr>
+              <a:t>Dataset</a:t>
+            </a:r>
+            <a:r>
+              <a:rPr lang="es-AR" sz="2400" dirty="0">
+                <a:solidFill>
+                  <a:schemeClr val="bg1"/>
+                </a:solidFill>
+              </a:rPr>
+              <a:t> distinto al </a:t>
+            </a:r>
+            <a:r>
+              <a:rPr lang="es-AR" sz="2400" dirty="0" err="1">
+                <a:solidFill>
+                  <a:schemeClr val="bg1"/>
+                </a:solidFill>
+              </a:rPr>
+              <a:t>generic</a:t>
+            </a:r>
+            <a:endParaRPr lang="es-AR" sz="2400" dirty="0"/>
+          </a:p>
+        </p:txBody>
+      </p:sp>
+      <p:sp>
+        <p:nvSpPr>
+          <p:cNvPr id="15" name="CuadroTexto 14">
+            <a:extLst>
+              <a:ext uri="{FF2B5EF4-FFF2-40B4-BE49-F238E27FC236}">
+                <a16:creationId xmlns:a16="http://schemas.microsoft.com/office/drawing/2014/main" id="{55F7F7D5-E549-29DA-B389-E677AFFEF69F}"/>
+              </a:ext>
+            </a:extLst>
+          </p:cNvPr>
+          <p:cNvSpPr txBox="1"/>
+          <p:nvPr/>
+        </p:nvSpPr>
+        <p:spPr>
+          <a:xfrm>
+            <a:off x="1859419" y="773083"/>
+            <a:ext cx="1994454" cy="369332"/>
+          </a:xfrm>
+          <a:prstGeom prst="rect">
+            <a:avLst/>
+          </a:prstGeom>
+          <a:noFill/>
+        </p:spPr>
+        <p:txBody>
+          <a:bodyPr wrap="square">
+            <a:spAutoFit/>
+          </a:bodyPr>
+          <a:lstStyle/>
+          <a:p>
+            <a:r>
+              <a:rPr lang="es-AR" sz="1800" dirty="0" err="1">
+                <a:solidFill>
+                  <a:srgbClr val="FF0000"/>
+                </a:solidFill>
+                <a:sym typeface="Wingdings" panose="05000000000000000000" pitchFamily="2" charset="2"/>
+              </a:rPr>
+              <a:t>feature</a:t>
+            </a:r>
+            <a:r>
+              <a:rPr lang="es-AR" sz="1800" dirty="0">
+                <a:solidFill>
+                  <a:srgbClr val="FF0000"/>
+                </a:solidFill>
+                <a:sym typeface="Wingdings" panose="05000000000000000000" pitchFamily="2" charset="2"/>
+              </a:rPr>
+              <a:t> extractor</a:t>
+            </a:r>
+            <a:endParaRPr lang="es-AR" dirty="0">
+              <a:solidFill>
+                <a:srgbClr val="FF0000"/>
+              </a:solidFill>
+            </a:endParaRPr>
+          </a:p>
+        </p:txBody>
+      </p:sp>
+      <p:sp>
+        <p:nvSpPr>
+          <p:cNvPr id="17" name="CuadroTexto 16">
+            <a:extLst>
+              <a:ext uri="{FF2B5EF4-FFF2-40B4-BE49-F238E27FC236}">
+                <a16:creationId xmlns:a16="http://schemas.microsoft.com/office/drawing/2014/main" id="{B377829B-A29D-FDCC-45F1-E09CEB0E7CDD}"/>
+              </a:ext>
+            </a:extLst>
+          </p:cNvPr>
+          <p:cNvSpPr txBox="1"/>
+          <p:nvPr/>
+        </p:nvSpPr>
+        <p:spPr>
+          <a:xfrm>
+            <a:off x="8604911" y="710996"/>
+            <a:ext cx="1643269" cy="369332"/>
+          </a:xfrm>
+          <a:prstGeom prst="rect">
+            <a:avLst/>
+          </a:prstGeom>
+          <a:noFill/>
+        </p:spPr>
+        <p:txBody>
+          <a:bodyPr wrap="square">
+            <a:spAutoFit/>
+          </a:bodyPr>
+          <a:lstStyle/>
+          <a:p>
+            <a:r>
+              <a:rPr lang="es-AR" sz="1800" dirty="0">
+                <a:solidFill>
+                  <a:srgbClr val="FF0000"/>
+                </a:solidFill>
+                <a:sym typeface="Wingdings" panose="05000000000000000000" pitchFamily="2" charset="2"/>
+              </a:rPr>
+              <a:t>fine </a:t>
+            </a:r>
+            <a:r>
+              <a:rPr lang="es-AR" sz="1800" dirty="0" err="1">
+                <a:solidFill>
+                  <a:srgbClr val="FF0000"/>
+                </a:solidFill>
+                <a:sym typeface="Wingdings" panose="05000000000000000000" pitchFamily="2" charset="2"/>
+              </a:rPr>
+              <a:t>tunning</a:t>
+            </a:r>
+            <a:endParaRPr lang="es-AR" dirty="0">
+              <a:solidFill>
+                <a:srgbClr val="FF0000"/>
+              </a:solidFill>
+            </a:endParaRPr>
+          </a:p>
+        </p:txBody>
+      </p:sp>
+      <p:sp>
+        <p:nvSpPr>
+          <p:cNvPr id="19" name="CuadroTexto 18">
+            <a:extLst>
+              <a:ext uri="{FF2B5EF4-FFF2-40B4-BE49-F238E27FC236}">
+                <a16:creationId xmlns:a16="http://schemas.microsoft.com/office/drawing/2014/main" id="{0EE19F03-CC19-C315-698F-ED1617A7B088}"/>
+              </a:ext>
+            </a:extLst>
+          </p:cNvPr>
+          <p:cNvSpPr txBox="1"/>
+          <p:nvPr/>
+        </p:nvSpPr>
+        <p:spPr>
+          <a:xfrm>
+            <a:off x="380128" y="6084917"/>
+            <a:ext cx="2411901" cy="646331"/>
+          </a:xfrm>
+          <a:prstGeom prst="rect">
+            <a:avLst/>
+          </a:prstGeom>
+          <a:noFill/>
+        </p:spPr>
+        <p:txBody>
+          <a:bodyPr wrap="square">
+            <a:spAutoFit/>
+          </a:bodyPr>
+          <a:lstStyle/>
+          <a:p>
+            <a:r>
+              <a:rPr lang="es-AR" sz="1800" dirty="0" err="1">
+                <a:solidFill>
+                  <a:srgbClr val="FF0000"/>
+                </a:solidFill>
+                <a:sym typeface="Wingdings" panose="05000000000000000000" pitchFamily="2" charset="2"/>
+              </a:rPr>
+              <a:t>feature</a:t>
+            </a:r>
+            <a:r>
+              <a:rPr lang="es-AR" sz="1800" dirty="0">
+                <a:solidFill>
+                  <a:srgbClr val="FF0000"/>
+                </a:solidFill>
+                <a:sym typeface="Wingdings" panose="05000000000000000000" pitchFamily="2" charset="2"/>
+              </a:rPr>
+              <a:t> extractor desde menor profundidad</a:t>
+            </a:r>
+            <a:endParaRPr lang="es-AR" dirty="0">
+              <a:solidFill>
+                <a:srgbClr val="FF0000"/>
+              </a:solidFill>
+            </a:endParaRPr>
+          </a:p>
+        </p:txBody>
+      </p:sp>
+      <p:sp>
+        <p:nvSpPr>
+          <p:cNvPr id="21" name="CuadroTexto 20">
+            <a:extLst>
+              <a:ext uri="{FF2B5EF4-FFF2-40B4-BE49-F238E27FC236}">
+                <a16:creationId xmlns:a16="http://schemas.microsoft.com/office/drawing/2014/main" id="{E8F43549-4D83-6AA4-3046-86BFC31F5C71}"/>
+              </a:ext>
+            </a:extLst>
+          </p:cNvPr>
+          <p:cNvSpPr txBox="1"/>
+          <p:nvPr/>
+        </p:nvSpPr>
+        <p:spPr>
+          <a:xfrm>
+            <a:off x="9095002" y="6027923"/>
+            <a:ext cx="2850973" cy="646331"/>
+          </a:xfrm>
+          <a:prstGeom prst="rect">
+            <a:avLst/>
+          </a:prstGeom>
+          <a:noFill/>
+        </p:spPr>
+        <p:txBody>
+          <a:bodyPr wrap="square">
+            <a:spAutoFit/>
+          </a:bodyPr>
+          <a:lstStyle/>
+          <a:p>
+            <a:r>
+              <a:rPr lang="es-AR" sz="1800" dirty="0">
+                <a:solidFill>
+                  <a:srgbClr val="FF0000"/>
+                </a:solidFill>
+                <a:sym typeface="Wingdings" panose="05000000000000000000" pitchFamily="2" charset="2"/>
+              </a:rPr>
+              <a:t>fine </a:t>
+            </a:r>
+            <a:r>
+              <a:rPr lang="es-AR" sz="1800" dirty="0" err="1">
+                <a:solidFill>
+                  <a:srgbClr val="FF0000"/>
+                </a:solidFill>
+                <a:sym typeface="Wingdings" panose="05000000000000000000" pitchFamily="2" charset="2"/>
+              </a:rPr>
+              <a:t>tunning</a:t>
+            </a:r>
+            <a:r>
+              <a:rPr lang="es-AR" sz="1800" dirty="0">
+                <a:solidFill>
+                  <a:srgbClr val="FF0000"/>
+                </a:solidFill>
+                <a:sym typeface="Wingdings" panose="05000000000000000000" pitchFamily="2" charset="2"/>
+              </a:rPr>
+              <a:t> (</a:t>
+            </a:r>
+            <a:r>
+              <a:rPr lang="es-AR" sz="1800" dirty="0" err="1">
+                <a:solidFill>
+                  <a:srgbClr val="FF0000"/>
+                </a:solidFill>
+                <a:sym typeface="Wingdings" panose="05000000000000000000" pitchFamily="2" charset="2"/>
+              </a:rPr>
+              <a:t>from</a:t>
+            </a:r>
+            <a:r>
+              <a:rPr lang="es-AR" sz="1800" dirty="0">
+                <a:solidFill>
+                  <a:srgbClr val="FF0000"/>
+                </a:solidFill>
+                <a:sym typeface="Wingdings" panose="05000000000000000000" pitchFamily="2" charset="2"/>
+              </a:rPr>
+              <a:t> </a:t>
+            </a:r>
+            <a:r>
+              <a:rPr lang="es-AR" sz="1800" dirty="0" err="1">
+                <a:solidFill>
+                  <a:srgbClr val="FF0000"/>
+                </a:solidFill>
+                <a:sym typeface="Wingdings" panose="05000000000000000000" pitchFamily="2" charset="2"/>
+              </a:rPr>
+              <a:t>pre-trained</a:t>
+            </a:r>
+            <a:r>
+              <a:rPr lang="es-AR" sz="1800" dirty="0">
+                <a:solidFill>
+                  <a:srgbClr val="FF0000"/>
+                </a:solidFill>
+                <a:sym typeface="Wingdings" panose="05000000000000000000" pitchFamily="2" charset="2"/>
+              </a:rPr>
+              <a:t> </a:t>
+            </a:r>
+            <a:r>
+              <a:rPr lang="es-AR" sz="1800" dirty="0" err="1">
+                <a:solidFill>
+                  <a:srgbClr val="FF0000"/>
+                </a:solidFill>
+                <a:sym typeface="Wingdings" panose="05000000000000000000" pitchFamily="2" charset="2"/>
+              </a:rPr>
+              <a:t>models</a:t>
+            </a:r>
+            <a:r>
+              <a:rPr lang="es-AR" sz="1800" dirty="0">
+                <a:solidFill>
+                  <a:srgbClr val="FF0000"/>
+                </a:solidFill>
+                <a:sym typeface="Wingdings" panose="05000000000000000000" pitchFamily="2" charset="2"/>
+              </a:rPr>
+              <a:t>)</a:t>
+            </a:r>
+            <a:endParaRPr lang="es-AR" dirty="0">
+              <a:solidFill>
+                <a:srgbClr val="FF0000"/>
+              </a:solidFill>
+            </a:endParaRPr>
+          </a:p>
+        </p:txBody>
+      </p:sp>
+      <p:grpSp>
+        <p:nvGrpSpPr>
+          <p:cNvPr id="25" name="Grupo 24">
+            <a:extLst>
+              <a:ext uri="{FF2B5EF4-FFF2-40B4-BE49-F238E27FC236}">
+                <a16:creationId xmlns:a16="http://schemas.microsoft.com/office/drawing/2014/main" id="{D52FDF2A-438C-37A9-7060-FB2E1F25DF1D}"/>
+              </a:ext>
+            </a:extLst>
+          </p:cNvPr>
+          <p:cNvGrpSpPr/>
+          <p:nvPr/>
+        </p:nvGrpSpPr>
+        <p:grpSpPr>
+          <a:xfrm>
+            <a:off x="7617003" y="1008130"/>
+            <a:ext cx="3130163" cy="2532006"/>
+            <a:chOff x="989692" y="2516687"/>
+            <a:chExt cx="4698135" cy="4095829"/>
+          </a:xfrm>
+        </p:grpSpPr>
+        <p:pic>
+          <p:nvPicPr>
+            <p:cNvPr id="22" name="Picture 1">
+              <a:extLst>
+                <a:ext uri="{FF2B5EF4-FFF2-40B4-BE49-F238E27FC236}">
+                  <a16:creationId xmlns:a16="http://schemas.microsoft.com/office/drawing/2014/main" id="{E8D21AA1-915D-899A-6121-C43BFEA2208B}"/>
+                </a:ext>
+              </a:extLst>
+            </p:cNvPr>
+            <p:cNvPicPr>
+              <a:picLocks noChangeAspect="1"/>
+            </p:cNvPicPr>
+            <p:nvPr/>
+          </p:nvPicPr>
+          <p:blipFill>
+            <a:blip r:embed="rId2" cstate="print">
+              <a:extLst>
+                <a:ext uri="{28A0092B-C50C-407E-A947-70E740481C1C}">
+                  <a14:useLocalDpi xmlns:a14="http://schemas.microsoft.com/office/drawing/2010/main" val="0"/>
+                </a:ext>
+              </a:extLst>
+            </a:blip>
+            <a:stretch>
+              <a:fillRect/>
+            </a:stretch>
+          </p:blipFill>
+          <p:spPr>
+            <a:xfrm>
+              <a:off x="989692" y="2516687"/>
+              <a:ext cx="4698135" cy="3107773"/>
+            </a:xfrm>
+            <a:prstGeom prst="rect">
+              <a:avLst/>
+            </a:prstGeom>
+          </p:spPr>
+        </p:pic>
+        <p:sp>
+          <p:nvSpPr>
+            <p:cNvPr id="23" name="Abrir llave 22">
+              <a:extLst>
+                <a:ext uri="{FF2B5EF4-FFF2-40B4-BE49-F238E27FC236}">
+                  <a16:creationId xmlns:a16="http://schemas.microsoft.com/office/drawing/2014/main" id="{DC039523-941B-5322-DBB4-73B26FEC1732}"/>
+                </a:ext>
+              </a:extLst>
+            </p:cNvPr>
+            <p:cNvSpPr/>
+            <p:nvPr/>
+          </p:nvSpPr>
+          <p:spPr>
+            <a:xfrm rot="16200000">
+              <a:off x="3115799" y="4850874"/>
+              <a:ext cx="466924" cy="1861478"/>
+            </a:xfrm>
+            <a:prstGeom prst="leftBrace">
+              <a:avLst/>
+            </a:prstGeom>
+            <a:ln>
+              <a:solidFill>
+                <a:srgbClr val="FF0000"/>
+              </a:solidFill>
+            </a:ln>
+          </p:spPr>
+          <p:style>
+            <a:lnRef idx="3">
+              <a:schemeClr val="accent3"/>
+            </a:lnRef>
+            <a:fillRef idx="0">
+              <a:schemeClr val="accent3"/>
+            </a:fillRef>
+            <a:effectRef idx="2">
+              <a:schemeClr val="accent3"/>
+            </a:effectRef>
+            <a:fontRef idx="minor">
+              <a:schemeClr val="tx1"/>
+            </a:fontRef>
+          </p:style>
+          <p:txBody>
+            <a:bodyPr rtlCol="0" anchor="ctr"/>
+            <a:lstStyle/>
+            <a:p>
+              <a:pPr algn="ctr"/>
+              <a:endParaRPr lang="es-AR"/>
+            </a:p>
+          </p:txBody>
+        </p:sp>
+        <p:sp>
+          <p:nvSpPr>
+            <p:cNvPr id="24" name="CuadroTexto 23">
+              <a:extLst>
+                <a:ext uri="{FF2B5EF4-FFF2-40B4-BE49-F238E27FC236}">
+                  <a16:creationId xmlns:a16="http://schemas.microsoft.com/office/drawing/2014/main" id="{6E2B53E6-3217-AD41-6EDD-C03F9659A0B2}"/>
+                </a:ext>
+              </a:extLst>
+            </p:cNvPr>
+            <p:cNvSpPr txBox="1"/>
+            <p:nvPr/>
+          </p:nvSpPr>
+          <p:spPr>
+            <a:xfrm>
+              <a:off x="2763762" y="6015076"/>
+              <a:ext cx="2095092" cy="597440"/>
+            </a:xfrm>
+            <a:prstGeom prst="rect">
+              <a:avLst/>
+            </a:prstGeom>
+            <a:noFill/>
+          </p:spPr>
+          <p:txBody>
+            <a:bodyPr wrap="square">
+              <a:spAutoFit/>
+            </a:bodyPr>
+            <a:lstStyle/>
+            <a:p>
+              <a:r>
+                <a:rPr lang="es-AR" dirty="0">
+                  <a:solidFill>
+                    <a:srgbClr val="FF0000"/>
+                  </a:solidFill>
+                </a:rPr>
+                <a:t>reentrenar</a:t>
+              </a:r>
+            </a:p>
+          </p:txBody>
+        </p:sp>
+      </p:grpSp>
+      <p:grpSp>
+        <p:nvGrpSpPr>
+          <p:cNvPr id="29" name="Grupo 28">
+            <a:extLst>
+              <a:ext uri="{FF2B5EF4-FFF2-40B4-BE49-F238E27FC236}">
+                <a16:creationId xmlns:a16="http://schemas.microsoft.com/office/drawing/2014/main" id="{384B1848-A929-1009-E6D8-9785B1B07B87}"/>
+              </a:ext>
+            </a:extLst>
+          </p:cNvPr>
+          <p:cNvGrpSpPr/>
+          <p:nvPr/>
+        </p:nvGrpSpPr>
+        <p:grpSpPr>
+          <a:xfrm>
+            <a:off x="1139447" y="1128223"/>
+            <a:ext cx="3093641" cy="2411912"/>
+            <a:chOff x="1139447" y="1128222"/>
+            <a:chExt cx="4698135" cy="4214431"/>
+          </a:xfrm>
+        </p:grpSpPr>
+        <p:pic>
+          <p:nvPicPr>
+            <p:cNvPr id="26" name="Picture 1">
+              <a:extLst>
+                <a:ext uri="{FF2B5EF4-FFF2-40B4-BE49-F238E27FC236}">
+                  <a16:creationId xmlns:a16="http://schemas.microsoft.com/office/drawing/2014/main" id="{771742FB-A9D8-D697-4538-6F1AF6BFE63B}"/>
+                </a:ext>
+              </a:extLst>
+            </p:cNvPr>
+            <p:cNvPicPr>
+              <a:picLocks noChangeAspect="1"/>
+            </p:cNvPicPr>
+            <p:nvPr/>
+          </p:nvPicPr>
+          <p:blipFill>
+            <a:blip r:embed="rId3" cstate="print">
+              <a:extLst>
+                <a:ext uri="{28A0092B-C50C-407E-A947-70E740481C1C}">
+                  <a14:useLocalDpi xmlns:a14="http://schemas.microsoft.com/office/drawing/2010/main" val="0"/>
+                </a:ext>
+              </a:extLst>
+            </a:blip>
+            <a:stretch>
+              <a:fillRect/>
+            </a:stretch>
+          </p:blipFill>
+          <p:spPr>
+            <a:xfrm>
+              <a:off x="1139447" y="1128222"/>
+              <a:ext cx="4698135" cy="3107773"/>
+            </a:xfrm>
+            <a:prstGeom prst="rect">
+              <a:avLst/>
+            </a:prstGeom>
+          </p:spPr>
+        </p:pic>
+        <p:sp>
+          <p:nvSpPr>
+            <p:cNvPr id="27" name="Abrir llave 26">
+              <a:extLst>
+                <a:ext uri="{FF2B5EF4-FFF2-40B4-BE49-F238E27FC236}">
+                  <a16:creationId xmlns:a16="http://schemas.microsoft.com/office/drawing/2014/main" id="{8CA25993-34E2-9A60-2763-1F875DE8F142}"/>
+                </a:ext>
+              </a:extLst>
+            </p:cNvPr>
+            <p:cNvSpPr/>
+            <p:nvPr/>
+          </p:nvSpPr>
+          <p:spPr>
+            <a:xfrm rot="16200000">
+              <a:off x="3866949" y="3979243"/>
+              <a:ext cx="466924" cy="827809"/>
+            </a:xfrm>
+            <a:prstGeom prst="leftBrace">
+              <a:avLst/>
+            </a:prstGeom>
+            <a:ln>
+              <a:solidFill>
+                <a:srgbClr val="FF0000"/>
+              </a:solidFill>
+            </a:ln>
+          </p:spPr>
+          <p:style>
+            <a:lnRef idx="3">
+              <a:schemeClr val="accent3"/>
+            </a:lnRef>
+            <a:fillRef idx="0">
+              <a:schemeClr val="accent3"/>
+            </a:fillRef>
+            <a:effectRef idx="2">
+              <a:schemeClr val="accent3"/>
+            </a:effectRef>
+            <a:fontRef idx="minor">
+              <a:schemeClr val="tx1"/>
+            </a:fontRef>
+          </p:style>
+          <p:txBody>
+            <a:bodyPr rtlCol="0" anchor="ctr"/>
+            <a:lstStyle/>
+            <a:p>
+              <a:pPr algn="ctr"/>
+              <a:endParaRPr lang="es-AR"/>
+            </a:p>
+          </p:txBody>
+        </p:sp>
+        <p:sp>
+          <p:nvSpPr>
+            <p:cNvPr id="28" name="CuadroTexto 27">
+              <a:extLst>
+                <a:ext uri="{FF2B5EF4-FFF2-40B4-BE49-F238E27FC236}">
+                  <a16:creationId xmlns:a16="http://schemas.microsoft.com/office/drawing/2014/main" id="{24249022-FA09-7788-9E2A-20CF32BC6F22}"/>
+                </a:ext>
+              </a:extLst>
+            </p:cNvPr>
+            <p:cNvSpPr txBox="1"/>
+            <p:nvPr/>
+          </p:nvSpPr>
+          <p:spPr>
+            <a:xfrm>
+              <a:off x="2916734" y="4626610"/>
+              <a:ext cx="2168460" cy="716043"/>
+            </a:xfrm>
+            <a:prstGeom prst="rect">
+              <a:avLst/>
+            </a:prstGeom>
+            <a:noFill/>
+          </p:spPr>
+          <p:txBody>
+            <a:bodyPr wrap="square">
+              <a:spAutoFit/>
+            </a:bodyPr>
+            <a:lstStyle/>
+            <a:p>
+              <a:r>
+                <a:rPr lang="es-AR" dirty="0">
+                  <a:solidFill>
+                    <a:srgbClr val="FF0000"/>
+                  </a:solidFill>
+                </a:rPr>
+                <a:t>reentrenar</a:t>
+              </a:r>
+            </a:p>
+          </p:txBody>
+        </p:sp>
+      </p:grpSp>
       <p:pic>
         <p:nvPicPr>
-          <p:cNvPr id="13" name="Picture 1">
+          <p:cNvPr id="31" name="Imagen 30">
             <a:extLst>
               <a:ext uri="{FF2B5EF4-FFF2-40B4-BE49-F238E27FC236}">
-                <a16:creationId xmlns:a16="http://schemas.microsoft.com/office/drawing/2014/main" id="{C9A2F921-87F9-F696-BC27-AD71E9B14985}"/>
+                <a16:creationId xmlns:a16="http://schemas.microsoft.com/office/drawing/2014/main" id="{CD46A953-1561-8618-5E56-CCF894E5D979}"/>
               </a:ext>
             </a:extLst>
           </p:cNvPr>
@@ -22829,7 +23182,7 @@
           <p:nvPr/>
         </p:nvPicPr>
         <p:blipFill>
-          <a:blip r:embed="rId2">
+          <a:blip r:embed="rId4">
             <a:extLst>
               <a:ext uri="{28A0092B-C50C-407E-A947-70E740481C1C}">
                 <a14:useLocalDpi xmlns:a14="http://schemas.microsoft.com/office/drawing/2010/main" val="0"/>
@@ -22842,44 +23195,8 @@
         </p:blipFill>
         <p:spPr>
           <a:xfrm>
-            <a:off x="989692" y="2516687"/>
-            <a:ext cx="4698135" cy="3107773"/>
-          </a:xfrm>
-          <a:prstGeom prst="rect">
-            <a:avLst/>
-          </a:prstGeom>
-        </p:spPr>
-      </p:pic>
-      <p:pic>
-        <p:nvPicPr>
-          <p:cNvPr id="15" name="Picture 1">
-            <a:extLst>
-              <a:ext uri="{FF2B5EF4-FFF2-40B4-BE49-F238E27FC236}">
-                <a16:creationId xmlns:a16="http://schemas.microsoft.com/office/drawing/2014/main" id="{264D80DE-3DD3-6902-30C6-7B7D7BCA6D7F}"/>
-              </a:ext>
-            </a:extLst>
-          </p:cNvPr>
-          <p:cNvPicPr>
-            <a:picLocks noChangeAspect="1"/>
-          </p:cNvPicPr>
-          <p:nvPr/>
-        </p:nvPicPr>
-        <p:blipFill>
-          <a:blip r:embed="rId2">
-            <a:extLst>
-              <a:ext uri="{28A0092B-C50C-407E-A947-70E740481C1C}">
-                <a14:useLocalDpi xmlns:a14="http://schemas.microsoft.com/office/drawing/2010/main" val="0"/>
-              </a:ext>
-            </a:extLst>
-          </a:blip>
-          <a:stretch>
-            <a:fillRect/>
-          </a:stretch>
-        </p:blipFill>
-        <p:spPr>
-          <a:xfrm>
-            <a:off x="6504175" y="2516687"/>
-            <a:ext cx="4698135" cy="3107773"/>
+            <a:off x="2079836" y="3934158"/>
+            <a:ext cx="3170737" cy="2096674"/>
           </a:xfrm>
           <a:prstGeom prst="rect">
             <a:avLst/>
@@ -22888,437 +23205,10 @@
       </p:pic>
       <p:sp>
         <p:nvSpPr>
-          <p:cNvPr id="16" name="Subtitle 1">
+          <p:cNvPr id="32" name="Abrir llave 31">
             <a:extLst>
               <a:ext uri="{FF2B5EF4-FFF2-40B4-BE49-F238E27FC236}">
-                <a16:creationId xmlns:a16="http://schemas.microsoft.com/office/drawing/2014/main" id="{AD0B28E0-D22E-F3BE-B975-F36DBFA0ECA1}"/>
-              </a:ext>
-            </a:extLst>
-          </p:cNvPr>
-          <p:cNvSpPr txBox="1">
-            <a:spLocks/>
-          </p:cNvSpPr>
-          <p:nvPr/>
-        </p:nvSpPr>
-        <p:spPr>
-          <a:xfrm>
-            <a:off x="2155339" y="1991560"/>
-            <a:ext cx="2366839" cy="525127"/>
-          </a:xfrm>
-          <a:prstGeom prst="rect">
-            <a:avLst/>
-          </a:prstGeom>
-        </p:spPr>
-        <p:txBody>
-          <a:bodyPr vert="horz" lIns="91440" tIns="45720" rIns="91440" bIns="45720" rtlCol="0">
-            <a:noAutofit/>
-          </a:bodyPr>
-          <a:lstStyle>
-            <a:lvl1pPr marL="0" indent="0" algn="ctr" defTabSz="914400" rtl="0" eaLnBrk="1" latinLnBrk="0" hangingPunct="1">
-              <a:lnSpc>
-                <a:spcPct val="90000"/>
-              </a:lnSpc>
-              <a:spcBef>
-                <a:spcPts val="1000"/>
-              </a:spcBef>
-              <a:buFont typeface="Arial" panose="020B0604020202020204" pitchFamily="34" charset="0"/>
-              <a:buNone/>
-              <a:defRPr sz="2400" kern="1200">
-                <a:solidFill>
-                  <a:schemeClr val="tx1"/>
-                </a:solidFill>
-                <a:latin typeface="+mn-lt"/>
-                <a:ea typeface="+mn-ea"/>
-                <a:cs typeface="+mn-cs"/>
-              </a:defRPr>
-            </a:lvl1pPr>
-            <a:lvl2pPr marL="457200" indent="0" algn="ctr" defTabSz="914400" rtl="0" eaLnBrk="1" latinLnBrk="0" hangingPunct="1">
-              <a:lnSpc>
-                <a:spcPct val="90000"/>
-              </a:lnSpc>
-              <a:spcBef>
-                <a:spcPts val="500"/>
-              </a:spcBef>
-              <a:buFont typeface="Arial" panose="020B0604020202020204" pitchFamily="34" charset="0"/>
-              <a:buNone/>
-              <a:defRPr sz="2000" kern="1200">
-                <a:solidFill>
-                  <a:schemeClr val="tx1"/>
-                </a:solidFill>
-                <a:latin typeface="+mn-lt"/>
-                <a:ea typeface="+mn-ea"/>
-                <a:cs typeface="+mn-cs"/>
-              </a:defRPr>
-            </a:lvl2pPr>
-            <a:lvl3pPr marL="914400" indent="0" algn="ctr" defTabSz="914400" rtl="0" eaLnBrk="1" latinLnBrk="0" hangingPunct="1">
-              <a:lnSpc>
-                <a:spcPct val="90000"/>
-              </a:lnSpc>
-              <a:spcBef>
-                <a:spcPts val="500"/>
-              </a:spcBef>
-              <a:buFont typeface="Arial" panose="020B0604020202020204" pitchFamily="34" charset="0"/>
-              <a:buNone/>
-              <a:defRPr sz="1800" kern="1200">
-                <a:solidFill>
-                  <a:schemeClr val="tx1"/>
-                </a:solidFill>
-                <a:latin typeface="+mn-lt"/>
-                <a:ea typeface="+mn-ea"/>
-                <a:cs typeface="+mn-cs"/>
-              </a:defRPr>
-            </a:lvl3pPr>
-            <a:lvl4pPr marL="1371600" indent="0" algn="ctr" defTabSz="914400" rtl="0" eaLnBrk="1" latinLnBrk="0" hangingPunct="1">
-              <a:lnSpc>
-                <a:spcPct val="90000"/>
-              </a:lnSpc>
-              <a:spcBef>
-                <a:spcPts val="500"/>
-              </a:spcBef>
-              <a:buFont typeface="Arial" panose="020B0604020202020204" pitchFamily="34" charset="0"/>
-              <a:buNone/>
-              <a:defRPr sz="1600" kern="1200">
-                <a:solidFill>
-                  <a:schemeClr val="tx1"/>
-                </a:solidFill>
-                <a:latin typeface="+mn-lt"/>
-                <a:ea typeface="+mn-ea"/>
-                <a:cs typeface="+mn-cs"/>
-              </a:defRPr>
-            </a:lvl4pPr>
-            <a:lvl5pPr marL="1828800" indent="0" algn="ctr" defTabSz="914400" rtl="0" eaLnBrk="1" latinLnBrk="0" hangingPunct="1">
-              <a:lnSpc>
-                <a:spcPct val="90000"/>
-              </a:lnSpc>
-              <a:spcBef>
-                <a:spcPts val="500"/>
-              </a:spcBef>
-              <a:buFont typeface="Arial" panose="020B0604020202020204" pitchFamily="34" charset="0"/>
-              <a:buNone/>
-              <a:defRPr sz="1600" kern="1200">
-                <a:solidFill>
-                  <a:schemeClr val="tx1"/>
-                </a:solidFill>
-                <a:latin typeface="+mn-lt"/>
-                <a:ea typeface="+mn-ea"/>
-                <a:cs typeface="+mn-cs"/>
-              </a:defRPr>
-            </a:lvl5pPr>
-            <a:lvl6pPr marL="2286000" indent="0" algn="ctr" defTabSz="914400" rtl="0" eaLnBrk="1" latinLnBrk="0" hangingPunct="1">
-              <a:lnSpc>
-                <a:spcPct val="90000"/>
-              </a:lnSpc>
-              <a:spcBef>
-                <a:spcPts val="500"/>
-              </a:spcBef>
-              <a:buFont typeface="Arial" panose="020B0604020202020204" pitchFamily="34" charset="0"/>
-              <a:buNone/>
-              <a:defRPr sz="1600" kern="1200">
-                <a:solidFill>
-                  <a:schemeClr val="tx1"/>
-                </a:solidFill>
-                <a:latin typeface="+mn-lt"/>
-                <a:ea typeface="+mn-ea"/>
-                <a:cs typeface="+mn-cs"/>
-              </a:defRPr>
-            </a:lvl6pPr>
-            <a:lvl7pPr marL="2743200" indent="0" algn="ctr" defTabSz="914400" rtl="0" eaLnBrk="1" latinLnBrk="0" hangingPunct="1">
-              <a:lnSpc>
-                <a:spcPct val="90000"/>
-              </a:lnSpc>
-              <a:spcBef>
-                <a:spcPts val="500"/>
-              </a:spcBef>
-              <a:buFont typeface="Arial" panose="020B0604020202020204" pitchFamily="34" charset="0"/>
-              <a:buNone/>
-              <a:defRPr sz="1600" kern="1200">
-                <a:solidFill>
-                  <a:schemeClr val="tx1"/>
-                </a:solidFill>
-                <a:latin typeface="+mn-lt"/>
-                <a:ea typeface="+mn-ea"/>
-                <a:cs typeface="+mn-cs"/>
-              </a:defRPr>
-            </a:lvl7pPr>
-            <a:lvl8pPr marL="3200400" indent="0" algn="ctr" defTabSz="914400" rtl="0" eaLnBrk="1" latinLnBrk="0" hangingPunct="1">
-              <a:lnSpc>
-                <a:spcPct val="90000"/>
-              </a:lnSpc>
-              <a:spcBef>
-                <a:spcPts val="500"/>
-              </a:spcBef>
-              <a:buFont typeface="Arial" panose="020B0604020202020204" pitchFamily="34" charset="0"/>
-              <a:buNone/>
-              <a:defRPr sz="1600" kern="1200">
-                <a:solidFill>
-                  <a:schemeClr val="tx1"/>
-                </a:solidFill>
-                <a:latin typeface="+mn-lt"/>
-                <a:ea typeface="+mn-ea"/>
-                <a:cs typeface="+mn-cs"/>
-              </a:defRPr>
-            </a:lvl8pPr>
-            <a:lvl9pPr marL="3657600" indent="0" algn="ctr" defTabSz="914400" rtl="0" eaLnBrk="1" latinLnBrk="0" hangingPunct="1">
-              <a:lnSpc>
-                <a:spcPct val="90000"/>
-              </a:lnSpc>
-              <a:spcBef>
-                <a:spcPts val="500"/>
-              </a:spcBef>
-              <a:buFont typeface="Arial" panose="020B0604020202020204" pitchFamily="34" charset="0"/>
-              <a:buNone/>
-              <a:defRPr sz="1600" kern="1200">
-                <a:solidFill>
-                  <a:schemeClr val="tx1"/>
-                </a:solidFill>
-                <a:latin typeface="+mn-lt"/>
-                <a:ea typeface="+mn-ea"/>
-                <a:cs typeface="+mn-cs"/>
-              </a:defRPr>
-            </a:lvl9pPr>
-          </a:lstStyle>
-          <a:p>
-            <a:r>
-              <a:rPr lang="es-AR" sz="2800" dirty="0">
-                <a:solidFill>
-                  <a:schemeClr val="bg1"/>
-                </a:solidFill>
-              </a:rPr>
-              <a:t>Fine </a:t>
-            </a:r>
-            <a:r>
-              <a:rPr lang="es-AR" sz="2800" dirty="0" err="1">
-                <a:solidFill>
-                  <a:schemeClr val="bg1"/>
-                </a:solidFill>
-              </a:rPr>
-              <a:t>tuning</a:t>
-            </a:r>
-            <a:endParaRPr lang="es-AR" sz="2800" dirty="0">
-              <a:solidFill>
-                <a:schemeClr val="bg1"/>
-              </a:solidFill>
-            </a:endParaRPr>
-          </a:p>
-        </p:txBody>
-      </p:sp>
-      <p:sp>
-        <p:nvSpPr>
-          <p:cNvPr id="17" name="Subtitle 1">
-            <a:extLst>
-              <a:ext uri="{FF2B5EF4-FFF2-40B4-BE49-F238E27FC236}">
-                <a16:creationId xmlns:a16="http://schemas.microsoft.com/office/drawing/2014/main" id="{6E44B1AE-5F03-28EE-5C2B-ABADEC460FE2}"/>
-              </a:ext>
-            </a:extLst>
-          </p:cNvPr>
-          <p:cNvSpPr txBox="1">
-            <a:spLocks/>
-          </p:cNvSpPr>
-          <p:nvPr/>
-        </p:nvSpPr>
-        <p:spPr>
-          <a:xfrm>
-            <a:off x="7481639" y="1991560"/>
-            <a:ext cx="2968284" cy="525127"/>
-          </a:xfrm>
-          <a:prstGeom prst="rect">
-            <a:avLst/>
-          </a:prstGeom>
-        </p:spPr>
-        <p:txBody>
-          <a:bodyPr vert="horz" lIns="91440" tIns="45720" rIns="91440" bIns="45720" rtlCol="0">
-            <a:noAutofit/>
-          </a:bodyPr>
-          <a:lstStyle>
-            <a:lvl1pPr marL="0" indent="0" algn="ctr" defTabSz="914400" rtl="0" eaLnBrk="1" latinLnBrk="0" hangingPunct="1">
-              <a:lnSpc>
-                <a:spcPct val="90000"/>
-              </a:lnSpc>
-              <a:spcBef>
-                <a:spcPts val="1000"/>
-              </a:spcBef>
-              <a:buFont typeface="Arial" panose="020B0604020202020204" pitchFamily="34" charset="0"/>
-              <a:buNone/>
-              <a:defRPr sz="2400" kern="1200">
-                <a:solidFill>
-                  <a:schemeClr val="tx1"/>
-                </a:solidFill>
-                <a:latin typeface="+mn-lt"/>
-                <a:ea typeface="+mn-ea"/>
-                <a:cs typeface="+mn-cs"/>
-              </a:defRPr>
-            </a:lvl1pPr>
-            <a:lvl2pPr marL="457200" indent="0" algn="ctr" defTabSz="914400" rtl="0" eaLnBrk="1" latinLnBrk="0" hangingPunct="1">
-              <a:lnSpc>
-                <a:spcPct val="90000"/>
-              </a:lnSpc>
-              <a:spcBef>
-                <a:spcPts val="500"/>
-              </a:spcBef>
-              <a:buFont typeface="Arial" panose="020B0604020202020204" pitchFamily="34" charset="0"/>
-              <a:buNone/>
-              <a:defRPr sz="2000" kern="1200">
-                <a:solidFill>
-                  <a:schemeClr val="tx1"/>
-                </a:solidFill>
-                <a:latin typeface="+mn-lt"/>
-                <a:ea typeface="+mn-ea"/>
-                <a:cs typeface="+mn-cs"/>
-              </a:defRPr>
-            </a:lvl2pPr>
-            <a:lvl3pPr marL="914400" indent="0" algn="ctr" defTabSz="914400" rtl="0" eaLnBrk="1" latinLnBrk="0" hangingPunct="1">
-              <a:lnSpc>
-                <a:spcPct val="90000"/>
-              </a:lnSpc>
-              <a:spcBef>
-                <a:spcPts val="500"/>
-              </a:spcBef>
-              <a:buFont typeface="Arial" panose="020B0604020202020204" pitchFamily="34" charset="0"/>
-              <a:buNone/>
-              <a:defRPr sz="1800" kern="1200">
-                <a:solidFill>
-                  <a:schemeClr val="tx1"/>
-                </a:solidFill>
-                <a:latin typeface="+mn-lt"/>
-                <a:ea typeface="+mn-ea"/>
-                <a:cs typeface="+mn-cs"/>
-              </a:defRPr>
-            </a:lvl3pPr>
-            <a:lvl4pPr marL="1371600" indent="0" algn="ctr" defTabSz="914400" rtl="0" eaLnBrk="1" latinLnBrk="0" hangingPunct="1">
-              <a:lnSpc>
-                <a:spcPct val="90000"/>
-              </a:lnSpc>
-              <a:spcBef>
-                <a:spcPts val="500"/>
-              </a:spcBef>
-              <a:buFont typeface="Arial" panose="020B0604020202020204" pitchFamily="34" charset="0"/>
-              <a:buNone/>
-              <a:defRPr sz="1600" kern="1200">
-                <a:solidFill>
-                  <a:schemeClr val="tx1"/>
-                </a:solidFill>
-                <a:latin typeface="+mn-lt"/>
-                <a:ea typeface="+mn-ea"/>
-                <a:cs typeface="+mn-cs"/>
-              </a:defRPr>
-            </a:lvl4pPr>
-            <a:lvl5pPr marL="1828800" indent="0" algn="ctr" defTabSz="914400" rtl="0" eaLnBrk="1" latinLnBrk="0" hangingPunct="1">
-              <a:lnSpc>
-                <a:spcPct val="90000"/>
-              </a:lnSpc>
-              <a:spcBef>
-                <a:spcPts val="500"/>
-              </a:spcBef>
-              <a:buFont typeface="Arial" panose="020B0604020202020204" pitchFamily="34" charset="0"/>
-              <a:buNone/>
-              <a:defRPr sz="1600" kern="1200">
-                <a:solidFill>
-                  <a:schemeClr val="tx1"/>
-                </a:solidFill>
-                <a:latin typeface="+mn-lt"/>
-                <a:ea typeface="+mn-ea"/>
-                <a:cs typeface="+mn-cs"/>
-              </a:defRPr>
-            </a:lvl5pPr>
-            <a:lvl6pPr marL="2286000" indent="0" algn="ctr" defTabSz="914400" rtl="0" eaLnBrk="1" latinLnBrk="0" hangingPunct="1">
-              <a:lnSpc>
-                <a:spcPct val="90000"/>
-              </a:lnSpc>
-              <a:spcBef>
-                <a:spcPts val="500"/>
-              </a:spcBef>
-              <a:buFont typeface="Arial" panose="020B0604020202020204" pitchFamily="34" charset="0"/>
-              <a:buNone/>
-              <a:defRPr sz="1600" kern="1200">
-                <a:solidFill>
-                  <a:schemeClr val="tx1"/>
-                </a:solidFill>
-                <a:latin typeface="+mn-lt"/>
-                <a:ea typeface="+mn-ea"/>
-                <a:cs typeface="+mn-cs"/>
-              </a:defRPr>
-            </a:lvl6pPr>
-            <a:lvl7pPr marL="2743200" indent="0" algn="ctr" defTabSz="914400" rtl="0" eaLnBrk="1" latinLnBrk="0" hangingPunct="1">
-              <a:lnSpc>
-                <a:spcPct val="90000"/>
-              </a:lnSpc>
-              <a:spcBef>
-                <a:spcPts val="500"/>
-              </a:spcBef>
-              <a:buFont typeface="Arial" panose="020B0604020202020204" pitchFamily="34" charset="0"/>
-              <a:buNone/>
-              <a:defRPr sz="1600" kern="1200">
-                <a:solidFill>
-                  <a:schemeClr val="tx1"/>
-                </a:solidFill>
-                <a:latin typeface="+mn-lt"/>
-                <a:ea typeface="+mn-ea"/>
-                <a:cs typeface="+mn-cs"/>
-              </a:defRPr>
-            </a:lvl7pPr>
-            <a:lvl8pPr marL="3200400" indent="0" algn="ctr" defTabSz="914400" rtl="0" eaLnBrk="1" latinLnBrk="0" hangingPunct="1">
-              <a:lnSpc>
-                <a:spcPct val="90000"/>
-              </a:lnSpc>
-              <a:spcBef>
-                <a:spcPts val="500"/>
-              </a:spcBef>
-              <a:buFont typeface="Arial" panose="020B0604020202020204" pitchFamily="34" charset="0"/>
-              <a:buNone/>
-              <a:defRPr sz="1600" kern="1200">
-                <a:solidFill>
-                  <a:schemeClr val="tx1"/>
-                </a:solidFill>
-                <a:latin typeface="+mn-lt"/>
-                <a:ea typeface="+mn-ea"/>
-                <a:cs typeface="+mn-cs"/>
-              </a:defRPr>
-            </a:lvl8pPr>
-            <a:lvl9pPr marL="3657600" indent="0" algn="ctr" defTabSz="914400" rtl="0" eaLnBrk="1" latinLnBrk="0" hangingPunct="1">
-              <a:lnSpc>
-                <a:spcPct val="90000"/>
-              </a:lnSpc>
-              <a:spcBef>
-                <a:spcPts val="500"/>
-              </a:spcBef>
-              <a:buFont typeface="Arial" panose="020B0604020202020204" pitchFamily="34" charset="0"/>
-              <a:buNone/>
-              <a:defRPr sz="1600" kern="1200">
-                <a:solidFill>
-                  <a:schemeClr val="tx1"/>
-                </a:solidFill>
-                <a:latin typeface="+mn-lt"/>
-                <a:ea typeface="+mn-ea"/>
-                <a:cs typeface="+mn-cs"/>
-              </a:defRPr>
-            </a:lvl9pPr>
-          </a:lstStyle>
-          <a:p>
-            <a:r>
-              <a:rPr lang="es-AR" sz="2800" dirty="0" err="1">
-                <a:solidFill>
-                  <a:schemeClr val="bg1"/>
-                </a:solidFill>
-              </a:rPr>
-              <a:t>Feature</a:t>
-            </a:r>
-            <a:r>
-              <a:rPr lang="es-AR" sz="2800" dirty="0">
-                <a:solidFill>
-                  <a:schemeClr val="bg1"/>
-                </a:solidFill>
-              </a:rPr>
-              <a:t> extractor</a:t>
-            </a:r>
-          </a:p>
-        </p:txBody>
-      </p:sp>
-      <p:sp>
-        <p:nvSpPr>
-          <p:cNvPr id="18" name="Abrir llave 17">
-            <a:extLst>
-              <a:ext uri="{FF2B5EF4-FFF2-40B4-BE49-F238E27FC236}">
-                <a16:creationId xmlns:a16="http://schemas.microsoft.com/office/drawing/2014/main" id="{E6AB87E9-25D4-491A-8C3E-94BD21E70872}"/>
+                <a16:creationId xmlns:a16="http://schemas.microsoft.com/office/drawing/2014/main" id="{6B9115E1-08DB-5990-8730-9030B27874B5}"/>
               </a:ext>
             </a:extLst>
           </p:cNvPr>
@@ -23327,8 +23217,8 @@
         </p:nvSpPr>
         <p:spPr>
           <a:xfrm rot="16200000">
-            <a:off x="3115799" y="4850874"/>
-            <a:ext cx="466924" cy="1861478"/>
+            <a:off x="3643162" y="5767534"/>
+            <a:ext cx="267220" cy="545098"/>
           </a:xfrm>
           <a:prstGeom prst="leftBrace">
             <a:avLst/>
@@ -23364,10 +23254,10 @@
       </p:sp>
       <p:sp>
         <p:nvSpPr>
-          <p:cNvPr id="20" name="CuadroTexto 19">
+          <p:cNvPr id="33" name="CuadroTexto 32">
             <a:extLst>
               <a:ext uri="{FF2B5EF4-FFF2-40B4-BE49-F238E27FC236}">
-                <a16:creationId xmlns:a16="http://schemas.microsoft.com/office/drawing/2014/main" id="{D36B6539-D238-981E-9681-58849C1CF412}"/>
+                <a16:creationId xmlns:a16="http://schemas.microsoft.com/office/drawing/2014/main" id="{6C8E394D-12A5-0177-516B-D96CCB3330D1}"/>
               </a:ext>
             </a:extLst>
           </p:cNvPr>
@@ -23376,8 +23266,8 @@
         </p:nvSpPr>
         <p:spPr>
           <a:xfrm>
-            <a:off x="2763763" y="6015075"/>
-            <a:ext cx="1758415" cy="461665"/>
+            <a:off x="2997341" y="6173693"/>
+            <a:ext cx="1427894" cy="409790"/>
           </a:xfrm>
           <a:prstGeom prst="rect">
             <a:avLst/>
@@ -23391,7 +23281,7 @@
           <a:lstStyle/>
           <a:p>
             <a:r>
-              <a:rPr lang="es-AR" sz="2400" dirty="0">
+              <a:rPr lang="es-AR" dirty="0">
                 <a:solidFill>
                   <a:srgbClr val="FF0000"/>
                 </a:solidFill>
@@ -23401,98 +23291,229 @@
           </a:p>
         </p:txBody>
       </p:sp>
-      <p:sp>
-        <p:nvSpPr>
-          <p:cNvPr id="21" name="Abrir llave 20">
+      <p:grpSp>
+        <p:nvGrpSpPr>
+          <p:cNvPr id="34" name="Grupo 33">
             <a:extLst>
               <a:ext uri="{FF2B5EF4-FFF2-40B4-BE49-F238E27FC236}">
-                <a16:creationId xmlns:a16="http://schemas.microsoft.com/office/drawing/2014/main" id="{E7BBE94A-759F-D4E2-7414-EB5CF7FFCA42}"/>
+                <a16:creationId xmlns:a16="http://schemas.microsoft.com/office/drawing/2014/main" id="{50EC2E31-2A2E-E2D9-8E84-E39DBF3135D8}"/>
               </a:ext>
             </a:extLst>
           </p:cNvPr>
-          <p:cNvSpPr/>
+          <p:cNvGrpSpPr/>
           <p:nvPr/>
-        </p:nvSpPr>
+        </p:nvGrpSpPr>
+        <p:grpSpPr>
+          <a:xfrm>
+            <a:off x="6215124" y="4001354"/>
+            <a:ext cx="3130163" cy="2532006"/>
+            <a:chOff x="989692" y="2516687"/>
+            <a:chExt cx="4698135" cy="4095829"/>
+          </a:xfrm>
+        </p:grpSpPr>
+        <p:pic>
+          <p:nvPicPr>
+            <p:cNvPr id="35" name="Picture 1">
+              <a:extLst>
+                <a:ext uri="{FF2B5EF4-FFF2-40B4-BE49-F238E27FC236}">
+                  <a16:creationId xmlns:a16="http://schemas.microsoft.com/office/drawing/2014/main" id="{07D7F926-21EF-D4A1-1719-B697983EDD9D}"/>
+                </a:ext>
+              </a:extLst>
+            </p:cNvPr>
+            <p:cNvPicPr>
+              <a:picLocks noChangeAspect="1"/>
+            </p:cNvPicPr>
+            <p:nvPr/>
+          </p:nvPicPr>
+          <p:blipFill>
+            <a:blip r:embed="rId2" cstate="print">
+              <a:extLst>
+                <a:ext uri="{28A0092B-C50C-407E-A947-70E740481C1C}">
+                  <a14:useLocalDpi xmlns:a14="http://schemas.microsoft.com/office/drawing/2010/main" val="0"/>
+                </a:ext>
+              </a:extLst>
+            </a:blip>
+            <a:stretch>
+              <a:fillRect/>
+            </a:stretch>
+          </p:blipFill>
+          <p:spPr>
+            <a:xfrm>
+              <a:off x="989692" y="2516687"/>
+              <a:ext cx="4698135" cy="3107773"/>
+            </a:xfrm>
+            <a:prstGeom prst="rect">
+              <a:avLst/>
+            </a:prstGeom>
+          </p:spPr>
+        </p:pic>
+        <p:sp>
+          <p:nvSpPr>
+            <p:cNvPr id="36" name="Abrir llave 35">
+              <a:extLst>
+                <a:ext uri="{FF2B5EF4-FFF2-40B4-BE49-F238E27FC236}">
+                  <a16:creationId xmlns:a16="http://schemas.microsoft.com/office/drawing/2014/main" id="{46F80C90-9CC8-14A9-77A3-F86B90B9C29F}"/>
+                </a:ext>
+              </a:extLst>
+            </p:cNvPr>
+            <p:cNvSpPr/>
+            <p:nvPr/>
+          </p:nvSpPr>
+          <p:spPr>
+            <a:xfrm rot="16200000">
+              <a:off x="3115799" y="4850874"/>
+              <a:ext cx="466924" cy="1861478"/>
+            </a:xfrm>
+            <a:prstGeom prst="leftBrace">
+              <a:avLst/>
+            </a:prstGeom>
+            <a:ln>
+              <a:solidFill>
+                <a:srgbClr val="FF0000"/>
+              </a:solidFill>
+            </a:ln>
+          </p:spPr>
+          <p:style>
+            <a:lnRef idx="3">
+              <a:schemeClr val="accent3"/>
+            </a:lnRef>
+            <a:fillRef idx="0">
+              <a:schemeClr val="accent3"/>
+            </a:fillRef>
+            <a:effectRef idx="2">
+              <a:schemeClr val="accent3"/>
+            </a:effectRef>
+            <a:fontRef idx="minor">
+              <a:schemeClr val="tx1"/>
+            </a:fontRef>
+          </p:style>
+          <p:txBody>
+            <a:bodyPr rtlCol="0" anchor="ctr"/>
+            <a:lstStyle/>
+            <a:p>
+              <a:pPr algn="ctr"/>
+              <a:endParaRPr lang="es-AR"/>
+            </a:p>
+          </p:txBody>
+        </p:sp>
+        <p:sp>
+          <p:nvSpPr>
+            <p:cNvPr id="37" name="CuadroTexto 36">
+              <a:extLst>
+                <a:ext uri="{FF2B5EF4-FFF2-40B4-BE49-F238E27FC236}">
+                  <a16:creationId xmlns:a16="http://schemas.microsoft.com/office/drawing/2014/main" id="{149CAEF8-DFA3-250B-CA28-0ACF027BA330}"/>
+                </a:ext>
+              </a:extLst>
+            </p:cNvPr>
+            <p:cNvSpPr txBox="1"/>
+            <p:nvPr/>
+          </p:nvSpPr>
+          <p:spPr>
+            <a:xfrm>
+              <a:off x="2763762" y="6015076"/>
+              <a:ext cx="2095092" cy="597440"/>
+            </a:xfrm>
+            <a:prstGeom prst="rect">
+              <a:avLst/>
+            </a:prstGeom>
+            <a:noFill/>
+          </p:spPr>
+          <p:txBody>
+            <a:bodyPr wrap="square">
+              <a:spAutoFit/>
+            </a:bodyPr>
+            <a:lstStyle/>
+            <a:p>
+              <a:r>
+                <a:rPr lang="es-AR" dirty="0">
+                  <a:solidFill>
+                    <a:srgbClr val="FF0000"/>
+                  </a:solidFill>
+                </a:rPr>
+                <a:t>reentrenar</a:t>
+              </a:r>
+            </a:p>
+          </p:txBody>
+        </p:sp>
+      </p:grpSp>
+      <p:pic>
+        <p:nvPicPr>
+          <p:cNvPr id="39" name="Imagen 38" descr="Imagen que contiene Gráfico de líneas&#10;&#10;Descripción generada automáticamente">
+            <a:extLst>
+              <a:ext uri="{FF2B5EF4-FFF2-40B4-BE49-F238E27FC236}">
+                <a16:creationId xmlns:a16="http://schemas.microsoft.com/office/drawing/2014/main" id="{CA4E3869-5994-DB70-6479-C3774F3DBEEE}"/>
+              </a:ext>
+            </a:extLst>
+          </p:cNvPr>
+          <p:cNvPicPr>
+            <a:picLocks noChangeAspect="1"/>
+          </p:cNvPicPr>
+          <p:nvPr/>
+        </p:nvPicPr>
+        <p:blipFill rotWithShape="1">
+          <a:blip r:embed="rId5">
+            <a:extLst>
+              <a:ext uri="{28A0092B-C50C-407E-A947-70E740481C1C}">
+                <a14:useLocalDpi xmlns:a14="http://schemas.microsoft.com/office/drawing/2010/main" val="0"/>
+              </a:ext>
+            </a:extLst>
+          </a:blip>
+          <a:srcRect l="21184" r="25224"/>
+          <a:stretch/>
+        </p:blipFill>
         <p:spPr>
-          <a:xfrm rot="16200000">
-            <a:off x="9231677" y="5367708"/>
-            <a:ext cx="466924" cy="827809"/>
+          <a:xfrm>
+            <a:off x="9800541" y="4266153"/>
+            <a:ext cx="2323923" cy="1526515"/>
           </a:xfrm>
-          <a:prstGeom prst="leftBrace">
+          <a:prstGeom prst="rect">
             <a:avLst/>
           </a:prstGeom>
-          <a:ln>
-            <a:solidFill>
-              <a:srgbClr val="FF0000"/>
-            </a:solidFill>
-          </a:ln>
+        </p:spPr>
+      </p:pic>
+      <p:cxnSp>
+        <p:nvCxnSpPr>
+          <p:cNvPr id="41" name="Conector recto 40">
+            <a:extLst>
+              <a:ext uri="{FF2B5EF4-FFF2-40B4-BE49-F238E27FC236}">
+                <a16:creationId xmlns:a16="http://schemas.microsoft.com/office/drawing/2014/main" id="{2305497B-CEE7-1195-8B1E-AB4A2C35B986}"/>
+              </a:ext>
+            </a:extLst>
+          </p:cNvPr>
+          <p:cNvCxnSpPr>
+            <a:cxnSpLocks/>
+          </p:cNvCxnSpPr>
+          <p:nvPr/>
+        </p:nvCxnSpPr>
+        <p:spPr>
+          <a:xfrm>
+            <a:off x="10455965" y="4810539"/>
+            <a:ext cx="0" cy="726622"/>
+          </a:xfrm>
+          <a:prstGeom prst="line">
+            <a:avLst/>
+          </a:prstGeom>
+          <a:ln w="28575"/>
         </p:spPr>
         <p:style>
-          <a:lnRef idx="3">
-            <a:schemeClr val="accent3"/>
+          <a:lnRef idx="1">
+            <a:schemeClr val="accent2"/>
           </a:lnRef>
           <a:fillRef idx="0">
-            <a:schemeClr val="accent3"/>
+            <a:schemeClr val="accent2"/>
           </a:fillRef>
-          <a:effectRef idx="2">
-            <a:schemeClr val="accent3"/>
+          <a:effectRef idx="0">
+            <a:schemeClr val="accent2"/>
           </a:effectRef>
           <a:fontRef idx="minor">
             <a:schemeClr val="tx1"/>
           </a:fontRef>
         </p:style>
-        <p:txBody>
-          <a:bodyPr rtlCol="0" anchor="ctr"/>
-          <a:lstStyle/>
-          <a:p>
-            <a:pPr algn="ctr"/>
-            <a:endParaRPr lang="es-AR"/>
-          </a:p>
-        </p:txBody>
-      </p:sp>
-      <p:sp>
-        <p:nvSpPr>
-          <p:cNvPr id="22" name="CuadroTexto 21">
-            <a:extLst>
-              <a:ext uri="{FF2B5EF4-FFF2-40B4-BE49-F238E27FC236}">
-                <a16:creationId xmlns:a16="http://schemas.microsoft.com/office/drawing/2014/main" id="{0F152222-1E01-75F9-8635-810DDAA0A9B0}"/>
-              </a:ext>
-            </a:extLst>
-          </p:cNvPr>
-          <p:cNvSpPr txBox="1"/>
-          <p:nvPr/>
-        </p:nvSpPr>
-        <p:spPr>
-          <a:xfrm>
-            <a:off x="8822805" y="6015075"/>
-            <a:ext cx="1627118" cy="461665"/>
-          </a:xfrm>
-          <a:prstGeom prst="rect">
-            <a:avLst/>
-          </a:prstGeom>
-          <a:noFill/>
-        </p:spPr>
-        <p:txBody>
-          <a:bodyPr wrap="square">
-            <a:spAutoFit/>
-          </a:bodyPr>
-          <a:lstStyle/>
-          <a:p>
-            <a:r>
-              <a:rPr lang="es-AR" sz="2400" dirty="0">
-                <a:solidFill>
-                  <a:srgbClr val="FF0000"/>
-                </a:solidFill>
-              </a:rPr>
-              <a:t>reentrenar</a:t>
-            </a:r>
-          </a:p>
-        </p:txBody>
-      </p:sp>
+      </p:cxnSp>
     </p:spTree>
     <p:extLst>
       <p:ext uri="{BB962C8B-B14F-4D97-AF65-F5344CB8AC3E}">
-        <p14:creationId xmlns:p14="http://schemas.microsoft.com/office/powerpoint/2010/main" val="3761876668"/>
+        <p14:creationId xmlns:p14="http://schemas.microsoft.com/office/powerpoint/2010/main" val="2528944947"/>
       </p:ext>
     </p:extLst>
   </p:cSld>
@@ -23743,13 +23764,7 @@
       </p:sp>
       <p:sp>
         <p:nvSpPr>
-          <p:cNvPr id="12" name="Subtitle 1">
-            <a:extLst>
-              <a:ext uri="{FF2B5EF4-FFF2-40B4-BE49-F238E27FC236}">
-                <a16:creationId xmlns:a16="http://schemas.microsoft.com/office/drawing/2014/main" id="{173875A2-756C-C285-A3FC-2C04FCABF78E}"/>
-              </a:ext>
-            </a:extLst>
-          </p:cNvPr>
+          <p:cNvPr id="5" name="Subtitle 1"/>
           <p:cNvSpPr txBox="1">
             <a:spLocks/>
           </p:cNvSpPr>
@@ -23757,8 +23772,8 @@
         </p:nvSpPr>
         <p:spPr>
           <a:xfrm>
-            <a:off x="390939" y="935691"/>
-            <a:ext cx="11410122" cy="5663892"/>
+            <a:off x="335003" y="852121"/>
+            <a:ext cx="11521994" cy="1092590"/>
           </a:xfrm>
           <a:prstGeom prst="rect">
             <a:avLst/>
@@ -23933,16 +23948,18 @@
             </a:lvl9pPr>
           </a:lstStyle>
           <a:p>
+            <a:pPr algn="l"/>
             <a:r>
               <a:rPr lang="es-AR" sz="2800" dirty="0">
                 <a:solidFill>
                   <a:schemeClr val="bg1"/>
                 </a:solidFill>
               </a:rPr>
-              <a:t>¿Qué estrategia usar?</a:t>
+              <a:t>Ventajas:</a:t>
             </a:r>
           </a:p>
           <a:p>
+            <a:pPr algn="l"/>
             <a:endParaRPr lang="es-AR" sz="2800" dirty="0">
               <a:solidFill>
                 <a:schemeClr val="bg1"/>
@@ -23950,298 +23967,189 @@
             </a:endParaRPr>
           </a:p>
           <a:p>
-            <a:pPr marL="457200" indent="-457200" algn="l">
-              <a:buFont typeface="Arial" panose="020B0604020202020204" pitchFamily="34" charset="0"/>
-              <a:buChar char="•"/>
-            </a:pPr>
-            <a:r>
-              <a:rPr lang="es-AR" sz="2800" dirty="0" err="1">
+            <a:pPr algn="l"/>
+            <a:r>
+              <a:rPr lang="es-AR" sz="2800" dirty="0">
                 <a:solidFill>
                   <a:schemeClr val="bg1"/>
                 </a:solidFill>
               </a:rPr>
-              <a:t>Dataset</a:t>
-            </a:r>
-            <a:r>
-              <a:rPr lang="es-AR" sz="2800" dirty="0">
+              <a:t>	</a:t>
+            </a:r>
+          </a:p>
+        </p:txBody>
+      </p:sp>
+      <p:pic>
+        <p:nvPicPr>
+          <p:cNvPr id="6" name="Picture 5"/>
+          <p:cNvPicPr>
+            <a:picLocks noChangeAspect="1"/>
+          </p:cNvPicPr>
+          <p:nvPr/>
+        </p:nvPicPr>
+        <p:blipFill>
+          <a:blip r:embed="rId2"/>
+          <a:stretch>
+            <a:fillRect/>
+          </a:stretch>
+        </p:blipFill>
+        <p:spPr>
+          <a:xfrm>
+            <a:off x="4405133" y="1721974"/>
+            <a:ext cx="7096122" cy="3444046"/>
+          </a:xfrm>
+          <a:prstGeom prst="rect">
+            <a:avLst/>
+          </a:prstGeom>
+        </p:spPr>
+      </p:pic>
+      <p:sp>
+        <p:nvSpPr>
+          <p:cNvPr id="7" name="Rectangle 6"/>
+          <p:cNvSpPr/>
+          <p:nvPr/>
+        </p:nvSpPr>
+        <p:spPr>
+          <a:xfrm>
+            <a:off x="335003" y="2196393"/>
+            <a:ext cx="4803667" cy="1938992"/>
+          </a:xfrm>
+          <a:prstGeom prst="rect">
+            <a:avLst/>
+          </a:prstGeom>
+        </p:spPr>
+        <p:txBody>
+          <a:bodyPr wrap="square">
+            <a:spAutoFit/>
+          </a:bodyPr>
+          <a:lstStyle/>
+          <a:p>
+            <a:r>
+              <a:rPr lang="es-AR" sz="2400" dirty="0">
                 <a:solidFill>
                   <a:schemeClr val="bg1"/>
                 </a:solidFill>
               </a:rPr>
-              <a:t> propio pequeño y semejante al original </a:t>
-            </a:r>
-            <a:r>
-              <a:rPr lang="es-AR" sz="2800" dirty="0">
-                <a:solidFill>
-                  <a:schemeClr val="bg1"/>
-                </a:solidFill>
-                <a:sym typeface="Wingdings" panose="05000000000000000000" pitchFamily="2" charset="2"/>
-              </a:rPr>
-              <a:t> </a:t>
-            </a:r>
-            <a:r>
-              <a:rPr lang="es-AR" sz="2800" dirty="0" err="1">
-                <a:solidFill>
-                  <a:schemeClr val="bg1"/>
-                </a:solidFill>
-                <a:sym typeface="Wingdings" panose="05000000000000000000" pitchFamily="2" charset="2"/>
-              </a:rPr>
-              <a:t>feature</a:t>
-            </a:r>
-            <a:r>
-              <a:rPr lang="es-AR" sz="2800" dirty="0">
-                <a:solidFill>
-                  <a:schemeClr val="bg1"/>
-                </a:solidFill>
-                <a:sym typeface="Wingdings" panose="05000000000000000000" pitchFamily="2" charset="2"/>
-              </a:rPr>
-              <a:t> extractor.</a:t>
+              <a:t>- pocos datos</a:t>
             </a:r>
           </a:p>
           <a:p>
-            <a:pPr marL="457200" indent="-457200" algn="l">
-              <a:buFont typeface="Arial" panose="020B0604020202020204" pitchFamily="34" charset="0"/>
-              <a:buChar char="•"/>
-            </a:pPr>
-            <a:endParaRPr lang="es-AR" sz="2800" dirty="0">
+            <a:r>
+              <a:rPr lang="es-AR" sz="2400" dirty="0">
+                <a:solidFill>
+                  <a:schemeClr val="bg1"/>
+                </a:solidFill>
+              </a:rPr>
+              <a:t>- </a:t>
+            </a:r>
+            <a:r>
+              <a:rPr lang="es-AR" sz="2400" dirty="0" err="1">
+                <a:solidFill>
+                  <a:schemeClr val="bg1"/>
+                </a:solidFill>
+              </a:rPr>
+              <a:t>pre-trained</a:t>
+            </a:r>
+            <a:r>
+              <a:rPr lang="es-AR" sz="2400" dirty="0">
+                <a:solidFill>
+                  <a:schemeClr val="bg1"/>
+                </a:solidFill>
+              </a:rPr>
+              <a:t> </a:t>
+            </a:r>
+            <a:r>
+              <a:rPr lang="es-AR" sz="2400" dirty="0" err="1">
+                <a:solidFill>
+                  <a:schemeClr val="bg1"/>
+                </a:solidFill>
+              </a:rPr>
+              <a:t>models</a:t>
+            </a:r>
+            <a:endParaRPr lang="es-AR" sz="2400" dirty="0">
               <a:solidFill>
                 <a:schemeClr val="bg1"/>
               </a:solidFill>
             </a:endParaRPr>
           </a:p>
           <a:p>
-            <a:pPr marL="457200" indent="-457200" algn="l">
-              <a:buFont typeface="Arial" panose="020B0604020202020204" pitchFamily="34" charset="0"/>
-              <a:buChar char="•"/>
-            </a:pPr>
-            <a:r>
-              <a:rPr lang="es-AR" sz="2800" dirty="0" err="1">
+            <a:r>
+              <a:rPr lang="es-AR" sz="2400" dirty="0">
                 <a:solidFill>
                   <a:schemeClr val="bg1"/>
                 </a:solidFill>
               </a:rPr>
-              <a:t>Dataset</a:t>
-            </a:r>
-            <a:r>
-              <a:rPr lang="es-AR" sz="2800" dirty="0">
+              <a:t>- </a:t>
+            </a:r>
+            <a:r>
+              <a:rPr lang="es-AR" sz="2400" dirty="0" err="1">
                 <a:solidFill>
                   <a:schemeClr val="bg1"/>
                 </a:solidFill>
               </a:rPr>
-              <a:t> propio grande y semejante al original </a:t>
-            </a:r>
-            <a:r>
-              <a:rPr lang="es-AR" sz="2800" dirty="0">
+              <a:t>pre-trained</a:t>
+            </a:r>
+            <a:r>
+              <a:rPr lang="es-AR" sz="2400" dirty="0">
                 <a:solidFill>
                   <a:schemeClr val="bg1"/>
                 </a:solidFill>
-                <a:sym typeface="Wingdings" panose="05000000000000000000" pitchFamily="2" charset="2"/>
-              </a:rPr>
-              <a:t> fine </a:t>
-            </a:r>
-            <a:r>
-              <a:rPr lang="es-AR" sz="2800" dirty="0" err="1">
-                <a:solidFill>
-                  <a:schemeClr val="bg1"/>
-                </a:solidFill>
-                <a:sym typeface="Wingdings" panose="05000000000000000000" pitchFamily="2" charset="2"/>
-              </a:rPr>
-              <a:t>tunning</a:t>
-            </a:r>
-            <a:r>
-              <a:rPr lang="es-AR" sz="2800" dirty="0">
-                <a:solidFill>
-                  <a:schemeClr val="bg1"/>
-                </a:solidFill>
-                <a:sym typeface="Wingdings" panose="05000000000000000000" pitchFamily="2" charset="2"/>
-              </a:rPr>
-              <a:t>.</a:t>
-            </a:r>
-          </a:p>
-          <a:p>
-            <a:pPr marL="457200" indent="-457200" algn="l">
-              <a:buFont typeface="Arial" panose="020B0604020202020204" pitchFamily="34" charset="0"/>
-              <a:buChar char="•"/>
-            </a:pPr>
-            <a:endParaRPr lang="es-AR" sz="2800" dirty="0">
-              <a:solidFill>
-                <a:schemeClr val="bg1"/>
-              </a:solidFill>
-              <a:sym typeface="Wingdings" panose="05000000000000000000" pitchFamily="2" charset="2"/>
-            </a:endParaRPr>
-          </a:p>
-          <a:p>
-            <a:pPr marL="457200" indent="-457200" algn="l">
-              <a:buFont typeface="Arial" panose="020B0604020202020204" pitchFamily="34" charset="0"/>
-              <a:buChar char="•"/>
-            </a:pPr>
-            <a:r>
-              <a:rPr lang="es-AR" sz="2800" dirty="0" err="1">
-                <a:solidFill>
-                  <a:schemeClr val="bg1"/>
-                </a:solidFill>
-                <a:sym typeface="Wingdings" panose="05000000000000000000" pitchFamily="2" charset="2"/>
-              </a:rPr>
-              <a:t>Dataset</a:t>
-            </a:r>
-            <a:r>
-              <a:rPr lang="es-AR" sz="2800" dirty="0">
-                <a:solidFill>
-                  <a:schemeClr val="bg1"/>
-                </a:solidFill>
-                <a:sym typeface="Wingdings" panose="05000000000000000000" pitchFamily="2" charset="2"/>
-              </a:rPr>
-              <a:t> propio pequeño y distinto al original  </a:t>
-            </a:r>
-            <a:r>
-              <a:rPr lang="es-AR" sz="2800" dirty="0" err="1">
-                <a:solidFill>
-                  <a:schemeClr val="bg1"/>
-                </a:solidFill>
-                <a:sym typeface="Wingdings" panose="05000000000000000000" pitchFamily="2" charset="2"/>
-              </a:rPr>
-              <a:t>feature</a:t>
-            </a:r>
-            <a:r>
-              <a:rPr lang="es-AR" sz="2800" dirty="0">
-                <a:solidFill>
-                  <a:schemeClr val="bg1"/>
-                </a:solidFill>
-                <a:sym typeface="Wingdings" panose="05000000000000000000" pitchFamily="2" charset="2"/>
-              </a:rPr>
-              <a:t> extractor desde menor profundidad.</a:t>
-            </a:r>
-          </a:p>
-          <a:p>
-            <a:pPr marL="457200" indent="-457200" algn="l">
-              <a:buFont typeface="Arial" panose="020B0604020202020204" pitchFamily="34" charset="0"/>
-              <a:buChar char="•"/>
-            </a:pPr>
-            <a:endParaRPr lang="es-AR" sz="2800" dirty="0">
-              <a:solidFill>
-                <a:schemeClr val="bg1"/>
-              </a:solidFill>
-              <a:sym typeface="Wingdings" panose="05000000000000000000" pitchFamily="2" charset="2"/>
-            </a:endParaRPr>
-          </a:p>
-          <a:p>
-            <a:pPr marL="457200" indent="-457200" algn="l">
-              <a:buFont typeface="Arial" panose="020B0604020202020204" pitchFamily="34" charset="0"/>
-              <a:buChar char="•"/>
-            </a:pPr>
-            <a:r>
-              <a:rPr lang="es-AR" sz="2800" dirty="0" err="1">
-                <a:solidFill>
-                  <a:schemeClr val="bg1"/>
-                </a:solidFill>
-                <a:sym typeface="Wingdings" panose="05000000000000000000" pitchFamily="2" charset="2"/>
-              </a:rPr>
-              <a:t>Dataset</a:t>
-            </a:r>
-            <a:r>
-              <a:rPr lang="es-AR" sz="2800" dirty="0">
-                <a:solidFill>
-                  <a:schemeClr val="bg1"/>
-                </a:solidFill>
-                <a:sym typeface="Wingdings" panose="05000000000000000000" pitchFamily="2" charset="2"/>
-              </a:rPr>
-              <a:t> propio grande y distinto al original  fine </a:t>
-            </a:r>
-            <a:r>
-              <a:rPr lang="es-AR" sz="2800" dirty="0" err="1">
-                <a:solidFill>
-                  <a:schemeClr val="bg1"/>
-                </a:solidFill>
-                <a:sym typeface="Wingdings" panose="05000000000000000000" pitchFamily="2" charset="2"/>
-              </a:rPr>
-              <a:t>tunning</a:t>
-            </a:r>
-            <a:r>
-              <a:rPr lang="es-AR" sz="2800" dirty="0">
-                <a:solidFill>
-                  <a:schemeClr val="bg1"/>
-                </a:solidFill>
-                <a:sym typeface="Wingdings" panose="05000000000000000000" pitchFamily="2" charset="2"/>
-              </a:rPr>
-              <a:t> (</a:t>
-            </a:r>
-            <a:r>
-              <a:rPr lang="es-AR" sz="2800" dirty="0" err="1">
-                <a:solidFill>
-                  <a:schemeClr val="bg1"/>
-                </a:solidFill>
-                <a:sym typeface="Wingdings" panose="05000000000000000000" pitchFamily="2" charset="2"/>
-              </a:rPr>
-              <a:t>from</a:t>
-            </a:r>
-            <a:r>
-              <a:rPr lang="es-AR" sz="2800" dirty="0">
-                <a:solidFill>
-                  <a:schemeClr val="bg1"/>
-                </a:solidFill>
-                <a:sym typeface="Wingdings" panose="05000000000000000000" pitchFamily="2" charset="2"/>
               </a:rPr>
               <a:t> </a:t>
             </a:r>
             <a:r>
-              <a:rPr lang="es-AR" sz="2800" dirty="0" err="1">
+              <a:rPr lang="es-AR" sz="2400" dirty="0" err="1">
                 <a:solidFill>
                   <a:schemeClr val="bg1"/>
                 </a:solidFill>
-                <a:sym typeface="Wingdings" panose="05000000000000000000" pitchFamily="2" charset="2"/>
               </a:rPr>
-              <a:t>pre-trained</a:t>
-            </a:r>
-            <a:r>
-              <a:rPr lang="es-AR" sz="2800" dirty="0">
-                <a:solidFill>
-                  <a:schemeClr val="bg1"/>
-                </a:solidFill>
-                <a:sym typeface="Wingdings" panose="05000000000000000000" pitchFamily="2" charset="2"/>
-              </a:rPr>
-              <a:t> </a:t>
-            </a:r>
-            <a:r>
-              <a:rPr lang="es-AR" sz="2800" dirty="0" err="1">
-                <a:solidFill>
-                  <a:schemeClr val="bg1"/>
-                </a:solidFill>
-                <a:sym typeface="Wingdings" panose="05000000000000000000" pitchFamily="2" charset="2"/>
-              </a:rPr>
-              <a:t>models</a:t>
-            </a:r>
-            <a:r>
-              <a:rPr lang="es-AR" sz="2800" dirty="0">
-                <a:solidFill>
-                  <a:schemeClr val="bg1"/>
-                </a:solidFill>
-                <a:sym typeface="Wingdings" panose="05000000000000000000" pitchFamily="2" charset="2"/>
-              </a:rPr>
-              <a:t>)</a:t>
-            </a:r>
-            <a:endParaRPr lang="es-AR" sz="2800" dirty="0">
+              <a:t>embeddings</a:t>
+            </a:r>
+            <a:endParaRPr lang="es-AR" sz="2400" dirty="0">
               <a:solidFill>
                 <a:schemeClr val="bg1"/>
               </a:solidFill>
             </a:endParaRPr>
           </a:p>
           <a:p>
-            <a:pPr marL="457200" indent="-457200" algn="l">
-              <a:buFont typeface="Arial" panose="020B0604020202020204" pitchFamily="34" charset="0"/>
-              <a:buChar char="•"/>
-            </a:pPr>
-            <a:endParaRPr lang="es-AR" sz="2800" dirty="0">
+            <a:r>
+              <a:rPr lang="es-AR" sz="2400" dirty="0">
+                <a:solidFill>
+                  <a:schemeClr val="bg1"/>
+                </a:solidFill>
+              </a:rPr>
+              <a:t>- </a:t>
+            </a:r>
+            <a:r>
+              <a:rPr lang="es-AR" sz="2400" dirty="0" err="1">
+                <a:solidFill>
+                  <a:schemeClr val="bg1"/>
+                </a:solidFill>
+              </a:rPr>
+              <a:t>Simulations</a:t>
+            </a:r>
+            <a:endParaRPr lang="es-AR" sz="2400" dirty="0">
               <a:solidFill>
                 <a:schemeClr val="bg1"/>
               </a:solidFill>
             </a:endParaRPr>
+          </a:p>
+          <a:p>
+            <a:r>
+              <a:rPr lang="es-AR" sz="2400" dirty="0">
+                <a:solidFill>
+                  <a:schemeClr val="bg1"/>
+                </a:solidFill>
+              </a:rPr>
+              <a:t>- Cambio de dominio</a:t>
+            </a:r>
           </a:p>
         </p:txBody>
       </p:sp>
     </p:spTree>
     <p:extLst>
       <p:ext uri="{BB962C8B-B14F-4D97-AF65-F5344CB8AC3E}">
-        <p14:creationId xmlns:p14="http://schemas.microsoft.com/office/powerpoint/2010/main" val="2958760871"/>
+        <p14:creationId xmlns:p14="http://schemas.microsoft.com/office/powerpoint/2010/main" val="2145966389"/>
       </p:ext>
     </p:extLst>
   </p:cSld>
@@ -24492,7 +24400,13 @@
       </p:sp>
       <p:sp>
         <p:nvSpPr>
-          <p:cNvPr id="5" name="Subtitle 1"/>
+          <p:cNvPr id="12" name="Subtitle 1">
+            <a:extLst>
+              <a:ext uri="{FF2B5EF4-FFF2-40B4-BE49-F238E27FC236}">
+                <a16:creationId xmlns:a16="http://schemas.microsoft.com/office/drawing/2014/main" id="{173875A2-756C-C285-A3FC-2C04FCABF78E}"/>
+              </a:ext>
+            </a:extLst>
+          </p:cNvPr>
           <p:cNvSpPr txBox="1">
             <a:spLocks/>
           </p:cNvSpPr>
@@ -24500,8 +24414,8 @@
         </p:nvSpPr>
         <p:spPr>
           <a:xfrm>
-            <a:off x="335003" y="852121"/>
-            <a:ext cx="11521994" cy="1092590"/>
+            <a:off x="151313" y="1052969"/>
+            <a:ext cx="2647776" cy="525127"/>
           </a:xfrm>
           <a:prstGeom prst="rect">
             <a:avLst/>
@@ -24676,101 +24590,23 @@
             </a:lvl9pPr>
           </a:lstStyle>
           <a:p>
-            <a:pPr algn="l"/>
             <a:r>
               <a:rPr lang="es-AR" sz="2800" dirty="0">
                 <a:solidFill>
-                  <a:schemeClr val="bg1"/>
+                  <a:srgbClr val="FF0000"/>
                 </a:solidFill>
               </a:rPr>
-              <a:t>Ventajas:</a:t>
-            </a:r>
-          </a:p>
-          <a:p>
-            <a:pPr algn="l"/>
+              <a:t>Ver </a:t>
+            </a:r>
+            <a:r>
+              <a:rPr lang="es-AR" sz="2800" dirty="0" err="1">
+                <a:solidFill>
+                  <a:srgbClr val="FF0000"/>
+                </a:solidFill>
+              </a:rPr>
+              <a:t>Colab</a:t>
+            </a:r>
             <a:endParaRPr lang="es-AR" sz="2800" dirty="0">
-              <a:solidFill>
-                <a:schemeClr val="bg1"/>
-              </a:solidFill>
-            </a:endParaRPr>
-          </a:p>
-          <a:p>
-            <a:pPr algn="l"/>
-            <a:r>
-              <a:rPr lang="es-AR" sz="2800" dirty="0">
-                <a:solidFill>
-                  <a:schemeClr val="bg1"/>
-                </a:solidFill>
-              </a:rPr>
-              <a:t>	</a:t>
-            </a:r>
-          </a:p>
-        </p:txBody>
-      </p:sp>
-      <p:sp>
-        <p:nvSpPr>
-          <p:cNvPr id="3" name="Rectangle 2"/>
-          <p:cNvSpPr/>
-          <p:nvPr/>
-        </p:nvSpPr>
-        <p:spPr>
-          <a:xfrm>
-            <a:off x="335003" y="5802123"/>
-            <a:ext cx="6096000" cy="830997"/>
-          </a:xfrm>
-          <a:prstGeom prst="rect">
-            <a:avLst/>
-          </a:prstGeom>
-        </p:spPr>
-        <p:txBody>
-          <a:bodyPr>
-            <a:spAutoFit/>
-          </a:bodyPr>
-          <a:lstStyle/>
-          <a:p>
-            <a:r>
-              <a:rPr lang="es-AR" sz="2400" dirty="0">
-                <a:solidFill>
-                  <a:schemeClr val="bg1"/>
-                </a:solidFill>
-              </a:rPr>
-              <a:t>Transfer </a:t>
-            </a:r>
-            <a:r>
-              <a:rPr lang="es-AR" sz="2400" dirty="0" err="1">
-                <a:solidFill>
-                  <a:schemeClr val="bg1"/>
-                </a:solidFill>
-              </a:rPr>
-              <a:t>learning</a:t>
-            </a:r>
-            <a:r>
-              <a:rPr lang="es-AR" sz="2400" dirty="0">
-                <a:solidFill>
-                  <a:schemeClr val="bg1"/>
-                </a:solidFill>
-              </a:rPr>
-              <a:t> básico:</a:t>
-            </a:r>
-          </a:p>
-          <a:p>
-            <a:r>
-              <a:rPr lang="es-AR" sz="2400" dirty="0">
-                <a:solidFill>
-                  <a:schemeClr val="bg1"/>
-                </a:solidFill>
-              </a:rPr>
-              <a:t>	- ver </a:t>
-            </a:r>
-            <a:r>
-              <a:rPr lang="es-AR" sz="2400" dirty="0" err="1">
-                <a:solidFill>
-                  <a:schemeClr val="bg1"/>
-                </a:solidFill>
-              </a:rPr>
-              <a:t>colab</a:t>
-            </a:r>
-            <a:endParaRPr lang="es-AR" sz="2400" dirty="0">
               <a:solidFill>
                 <a:schemeClr val="bg1"/>
               </a:solidFill>
@@ -24778,177 +24614,727 @@
           </a:p>
         </p:txBody>
       </p:sp>
-      <p:pic>
-        <p:nvPicPr>
-          <p:cNvPr id="6" name="Picture 5"/>
-          <p:cNvPicPr>
-            <a:picLocks noChangeAspect="1"/>
-          </p:cNvPicPr>
+      <p:grpSp>
+        <p:nvGrpSpPr>
+          <p:cNvPr id="2" name="Grupo 1">
+            <a:extLst>
+              <a:ext uri="{FF2B5EF4-FFF2-40B4-BE49-F238E27FC236}">
+                <a16:creationId xmlns:a16="http://schemas.microsoft.com/office/drawing/2014/main" id="{B84559D8-4EA6-E606-0916-F774AEFC21C2}"/>
+              </a:ext>
+            </a:extLst>
+          </p:cNvPr>
+          <p:cNvGrpSpPr/>
           <p:nvPr/>
-        </p:nvPicPr>
-        <p:blipFill>
-          <a:blip r:embed="rId2"/>
-          <a:stretch>
-            <a:fillRect/>
-          </a:stretch>
-        </p:blipFill>
-        <p:spPr>
+        </p:nvGrpSpPr>
+        <p:grpSpPr>
           <a:xfrm>
-            <a:off x="4405133" y="1721974"/>
-            <a:ext cx="7096122" cy="3444046"/>
+            <a:off x="6886910" y="2210977"/>
+            <a:ext cx="4698135" cy="4485180"/>
+            <a:chOff x="989692" y="1991560"/>
+            <a:chExt cx="4698135" cy="4485180"/>
           </a:xfrm>
-          <a:prstGeom prst="rect">
-            <a:avLst/>
-          </a:prstGeom>
-        </p:spPr>
-      </p:pic>
-      <p:sp>
-        <p:nvSpPr>
-          <p:cNvPr id="7" name="Rectangle 6"/>
-          <p:cNvSpPr/>
+        </p:grpSpPr>
+        <p:pic>
+          <p:nvPicPr>
+            <p:cNvPr id="13" name="Picture 1">
+              <a:extLst>
+                <a:ext uri="{FF2B5EF4-FFF2-40B4-BE49-F238E27FC236}">
+                  <a16:creationId xmlns:a16="http://schemas.microsoft.com/office/drawing/2014/main" id="{C9A2F921-87F9-F696-BC27-AD71E9B14985}"/>
+                </a:ext>
+              </a:extLst>
+            </p:cNvPr>
+            <p:cNvPicPr>
+              <a:picLocks noChangeAspect="1"/>
+            </p:cNvPicPr>
+            <p:nvPr/>
+          </p:nvPicPr>
+          <p:blipFill>
+            <a:blip r:embed="rId2">
+              <a:extLst>
+                <a:ext uri="{28A0092B-C50C-407E-A947-70E740481C1C}">
+                  <a14:useLocalDpi xmlns:a14="http://schemas.microsoft.com/office/drawing/2010/main" val="0"/>
+                </a:ext>
+              </a:extLst>
+            </a:blip>
+            <a:stretch>
+              <a:fillRect/>
+            </a:stretch>
+          </p:blipFill>
+          <p:spPr>
+            <a:xfrm>
+              <a:off x="989692" y="2516687"/>
+              <a:ext cx="4698135" cy="3107773"/>
+            </a:xfrm>
+            <a:prstGeom prst="rect">
+              <a:avLst/>
+            </a:prstGeom>
+          </p:spPr>
+        </p:pic>
+        <p:sp>
+          <p:nvSpPr>
+            <p:cNvPr id="16" name="Subtitle 1">
+              <a:extLst>
+                <a:ext uri="{FF2B5EF4-FFF2-40B4-BE49-F238E27FC236}">
+                  <a16:creationId xmlns:a16="http://schemas.microsoft.com/office/drawing/2014/main" id="{AD0B28E0-D22E-F3BE-B975-F36DBFA0ECA1}"/>
+                </a:ext>
+              </a:extLst>
+            </p:cNvPr>
+            <p:cNvSpPr txBox="1">
+              <a:spLocks/>
+            </p:cNvSpPr>
+            <p:nvPr/>
+          </p:nvSpPr>
+          <p:spPr>
+            <a:xfrm>
+              <a:off x="2155339" y="1991560"/>
+              <a:ext cx="2366839" cy="525127"/>
+            </a:xfrm>
+            <a:prstGeom prst="rect">
+              <a:avLst/>
+            </a:prstGeom>
+          </p:spPr>
+          <p:txBody>
+            <a:bodyPr vert="horz" lIns="91440" tIns="45720" rIns="91440" bIns="45720" rtlCol="0">
+              <a:noAutofit/>
+            </a:bodyPr>
+            <a:lstStyle>
+              <a:lvl1pPr marL="0" indent="0" algn="ctr" defTabSz="914400" rtl="0" eaLnBrk="1" latinLnBrk="0" hangingPunct="1">
+                <a:lnSpc>
+                  <a:spcPct val="90000"/>
+                </a:lnSpc>
+                <a:spcBef>
+                  <a:spcPts val="1000"/>
+                </a:spcBef>
+                <a:buFont typeface="Arial" panose="020B0604020202020204" pitchFamily="34" charset="0"/>
+                <a:buNone/>
+                <a:defRPr sz="2400" kern="1200">
+                  <a:solidFill>
+                    <a:schemeClr val="tx1"/>
+                  </a:solidFill>
+                  <a:latin typeface="+mn-lt"/>
+                  <a:ea typeface="+mn-ea"/>
+                  <a:cs typeface="+mn-cs"/>
+                </a:defRPr>
+              </a:lvl1pPr>
+              <a:lvl2pPr marL="457200" indent="0" algn="ctr" defTabSz="914400" rtl="0" eaLnBrk="1" latinLnBrk="0" hangingPunct="1">
+                <a:lnSpc>
+                  <a:spcPct val="90000"/>
+                </a:lnSpc>
+                <a:spcBef>
+                  <a:spcPts val="500"/>
+                </a:spcBef>
+                <a:buFont typeface="Arial" panose="020B0604020202020204" pitchFamily="34" charset="0"/>
+                <a:buNone/>
+                <a:defRPr sz="2000" kern="1200">
+                  <a:solidFill>
+                    <a:schemeClr val="tx1"/>
+                  </a:solidFill>
+                  <a:latin typeface="+mn-lt"/>
+                  <a:ea typeface="+mn-ea"/>
+                  <a:cs typeface="+mn-cs"/>
+                </a:defRPr>
+              </a:lvl2pPr>
+              <a:lvl3pPr marL="914400" indent="0" algn="ctr" defTabSz="914400" rtl="0" eaLnBrk="1" latinLnBrk="0" hangingPunct="1">
+                <a:lnSpc>
+                  <a:spcPct val="90000"/>
+                </a:lnSpc>
+                <a:spcBef>
+                  <a:spcPts val="500"/>
+                </a:spcBef>
+                <a:buFont typeface="Arial" panose="020B0604020202020204" pitchFamily="34" charset="0"/>
+                <a:buNone/>
+                <a:defRPr sz="1800" kern="1200">
+                  <a:solidFill>
+                    <a:schemeClr val="tx1"/>
+                  </a:solidFill>
+                  <a:latin typeface="+mn-lt"/>
+                  <a:ea typeface="+mn-ea"/>
+                  <a:cs typeface="+mn-cs"/>
+                </a:defRPr>
+              </a:lvl3pPr>
+              <a:lvl4pPr marL="1371600" indent="0" algn="ctr" defTabSz="914400" rtl="0" eaLnBrk="1" latinLnBrk="0" hangingPunct="1">
+                <a:lnSpc>
+                  <a:spcPct val="90000"/>
+                </a:lnSpc>
+                <a:spcBef>
+                  <a:spcPts val="500"/>
+                </a:spcBef>
+                <a:buFont typeface="Arial" panose="020B0604020202020204" pitchFamily="34" charset="0"/>
+                <a:buNone/>
+                <a:defRPr sz="1600" kern="1200">
+                  <a:solidFill>
+                    <a:schemeClr val="tx1"/>
+                  </a:solidFill>
+                  <a:latin typeface="+mn-lt"/>
+                  <a:ea typeface="+mn-ea"/>
+                  <a:cs typeface="+mn-cs"/>
+                </a:defRPr>
+              </a:lvl4pPr>
+              <a:lvl5pPr marL="1828800" indent="0" algn="ctr" defTabSz="914400" rtl="0" eaLnBrk="1" latinLnBrk="0" hangingPunct="1">
+                <a:lnSpc>
+                  <a:spcPct val="90000"/>
+                </a:lnSpc>
+                <a:spcBef>
+                  <a:spcPts val="500"/>
+                </a:spcBef>
+                <a:buFont typeface="Arial" panose="020B0604020202020204" pitchFamily="34" charset="0"/>
+                <a:buNone/>
+                <a:defRPr sz="1600" kern="1200">
+                  <a:solidFill>
+                    <a:schemeClr val="tx1"/>
+                  </a:solidFill>
+                  <a:latin typeface="+mn-lt"/>
+                  <a:ea typeface="+mn-ea"/>
+                  <a:cs typeface="+mn-cs"/>
+                </a:defRPr>
+              </a:lvl5pPr>
+              <a:lvl6pPr marL="2286000" indent="0" algn="ctr" defTabSz="914400" rtl="0" eaLnBrk="1" latinLnBrk="0" hangingPunct="1">
+                <a:lnSpc>
+                  <a:spcPct val="90000"/>
+                </a:lnSpc>
+                <a:spcBef>
+                  <a:spcPts val="500"/>
+                </a:spcBef>
+                <a:buFont typeface="Arial" panose="020B0604020202020204" pitchFamily="34" charset="0"/>
+                <a:buNone/>
+                <a:defRPr sz="1600" kern="1200">
+                  <a:solidFill>
+                    <a:schemeClr val="tx1"/>
+                  </a:solidFill>
+                  <a:latin typeface="+mn-lt"/>
+                  <a:ea typeface="+mn-ea"/>
+                  <a:cs typeface="+mn-cs"/>
+                </a:defRPr>
+              </a:lvl6pPr>
+              <a:lvl7pPr marL="2743200" indent="0" algn="ctr" defTabSz="914400" rtl="0" eaLnBrk="1" latinLnBrk="0" hangingPunct="1">
+                <a:lnSpc>
+                  <a:spcPct val="90000"/>
+                </a:lnSpc>
+                <a:spcBef>
+                  <a:spcPts val="500"/>
+                </a:spcBef>
+                <a:buFont typeface="Arial" panose="020B0604020202020204" pitchFamily="34" charset="0"/>
+                <a:buNone/>
+                <a:defRPr sz="1600" kern="1200">
+                  <a:solidFill>
+                    <a:schemeClr val="tx1"/>
+                  </a:solidFill>
+                  <a:latin typeface="+mn-lt"/>
+                  <a:ea typeface="+mn-ea"/>
+                  <a:cs typeface="+mn-cs"/>
+                </a:defRPr>
+              </a:lvl7pPr>
+              <a:lvl8pPr marL="3200400" indent="0" algn="ctr" defTabSz="914400" rtl="0" eaLnBrk="1" latinLnBrk="0" hangingPunct="1">
+                <a:lnSpc>
+                  <a:spcPct val="90000"/>
+                </a:lnSpc>
+                <a:spcBef>
+                  <a:spcPts val="500"/>
+                </a:spcBef>
+                <a:buFont typeface="Arial" panose="020B0604020202020204" pitchFamily="34" charset="0"/>
+                <a:buNone/>
+                <a:defRPr sz="1600" kern="1200">
+                  <a:solidFill>
+                    <a:schemeClr val="tx1"/>
+                  </a:solidFill>
+                  <a:latin typeface="+mn-lt"/>
+                  <a:ea typeface="+mn-ea"/>
+                  <a:cs typeface="+mn-cs"/>
+                </a:defRPr>
+              </a:lvl8pPr>
+              <a:lvl9pPr marL="3657600" indent="0" algn="ctr" defTabSz="914400" rtl="0" eaLnBrk="1" latinLnBrk="0" hangingPunct="1">
+                <a:lnSpc>
+                  <a:spcPct val="90000"/>
+                </a:lnSpc>
+                <a:spcBef>
+                  <a:spcPts val="500"/>
+                </a:spcBef>
+                <a:buFont typeface="Arial" panose="020B0604020202020204" pitchFamily="34" charset="0"/>
+                <a:buNone/>
+                <a:defRPr sz="1600" kern="1200">
+                  <a:solidFill>
+                    <a:schemeClr val="tx1"/>
+                  </a:solidFill>
+                  <a:latin typeface="+mn-lt"/>
+                  <a:ea typeface="+mn-ea"/>
+                  <a:cs typeface="+mn-cs"/>
+                </a:defRPr>
+              </a:lvl9pPr>
+            </a:lstStyle>
+            <a:p>
+              <a:r>
+                <a:rPr lang="es-AR" sz="2800" dirty="0">
+                  <a:solidFill>
+                    <a:schemeClr val="bg1"/>
+                  </a:solidFill>
+                </a:rPr>
+                <a:t>Fine </a:t>
+              </a:r>
+              <a:r>
+                <a:rPr lang="es-AR" sz="2800" dirty="0" err="1">
+                  <a:solidFill>
+                    <a:schemeClr val="bg1"/>
+                  </a:solidFill>
+                </a:rPr>
+                <a:t>tuning</a:t>
+              </a:r>
+              <a:endParaRPr lang="es-AR" sz="2800" dirty="0">
+                <a:solidFill>
+                  <a:schemeClr val="bg1"/>
+                </a:solidFill>
+              </a:endParaRPr>
+            </a:p>
+          </p:txBody>
+        </p:sp>
+        <p:sp>
+          <p:nvSpPr>
+            <p:cNvPr id="18" name="Abrir llave 17">
+              <a:extLst>
+                <a:ext uri="{FF2B5EF4-FFF2-40B4-BE49-F238E27FC236}">
+                  <a16:creationId xmlns:a16="http://schemas.microsoft.com/office/drawing/2014/main" id="{E6AB87E9-25D4-491A-8C3E-94BD21E70872}"/>
+                </a:ext>
+              </a:extLst>
+            </p:cNvPr>
+            <p:cNvSpPr/>
+            <p:nvPr/>
+          </p:nvSpPr>
+          <p:spPr>
+            <a:xfrm rot="16200000">
+              <a:off x="3115799" y="4850874"/>
+              <a:ext cx="466924" cy="1861478"/>
+            </a:xfrm>
+            <a:prstGeom prst="leftBrace">
+              <a:avLst/>
+            </a:prstGeom>
+            <a:ln>
+              <a:solidFill>
+                <a:srgbClr val="FF0000"/>
+              </a:solidFill>
+            </a:ln>
+          </p:spPr>
+          <p:style>
+            <a:lnRef idx="3">
+              <a:schemeClr val="accent3"/>
+            </a:lnRef>
+            <a:fillRef idx="0">
+              <a:schemeClr val="accent3"/>
+            </a:fillRef>
+            <a:effectRef idx="2">
+              <a:schemeClr val="accent3"/>
+            </a:effectRef>
+            <a:fontRef idx="minor">
+              <a:schemeClr val="tx1"/>
+            </a:fontRef>
+          </p:style>
+          <p:txBody>
+            <a:bodyPr rtlCol="0" anchor="ctr"/>
+            <a:lstStyle/>
+            <a:p>
+              <a:pPr algn="ctr"/>
+              <a:endParaRPr lang="es-AR"/>
+            </a:p>
+          </p:txBody>
+        </p:sp>
+        <p:sp>
+          <p:nvSpPr>
+            <p:cNvPr id="20" name="CuadroTexto 19">
+              <a:extLst>
+                <a:ext uri="{FF2B5EF4-FFF2-40B4-BE49-F238E27FC236}">
+                  <a16:creationId xmlns:a16="http://schemas.microsoft.com/office/drawing/2014/main" id="{D36B6539-D238-981E-9681-58849C1CF412}"/>
+                </a:ext>
+              </a:extLst>
+            </p:cNvPr>
+            <p:cNvSpPr txBox="1"/>
+            <p:nvPr/>
+          </p:nvSpPr>
+          <p:spPr>
+            <a:xfrm>
+              <a:off x="2763763" y="6015075"/>
+              <a:ext cx="1758415" cy="461665"/>
+            </a:xfrm>
+            <a:prstGeom prst="rect">
+              <a:avLst/>
+            </a:prstGeom>
+            <a:noFill/>
+          </p:spPr>
+          <p:txBody>
+            <a:bodyPr wrap="square">
+              <a:spAutoFit/>
+            </a:bodyPr>
+            <a:lstStyle/>
+            <a:p>
+              <a:r>
+                <a:rPr lang="es-AR" sz="2400" dirty="0">
+                  <a:solidFill>
+                    <a:srgbClr val="FF0000"/>
+                  </a:solidFill>
+                </a:rPr>
+                <a:t>reentrenar</a:t>
+              </a:r>
+            </a:p>
+          </p:txBody>
+        </p:sp>
+      </p:grpSp>
+      <p:grpSp>
+        <p:nvGrpSpPr>
+          <p:cNvPr id="3" name="Grupo 2">
+            <a:extLst>
+              <a:ext uri="{FF2B5EF4-FFF2-40B4-BE49-F238E27FC236}">
+                <a16:creationId xmlns:a16="http://schemas.microsoft.com/office/drawing/2014/main" id="{D9CDA50A-CE57-62FE-6E87-F8AC8BE4D97A}"/>
+              </a:ext>
+            </a:extLst>
+          </p:cNvPr>
+          <p:cNvGrpSpPr/>
           <p:nvPr/>
-        </p:nvSpPr>
-        <p:spPr>
+        </p:nvGrpSpPr>
+        <p:grpSpPr>
           <a:xfrm>
-            <a:off x="335003" y="2196393"/>
-            <a:ext cx="4803667" cy="1938992"/>
+            <a:off x="748402" y="2103223"/>
+            <a:ext cx="4698135" cy="4485180"/>
+            <a:chOff x="6504175" y="1991560"/>
+            <a:chExt cx="4698135" cy="4485180"/>
           </a:xfrm>
-          <a:prstGeom prst="rect">
-            <a:avLst/>
-          </a:prstGeom>
-        </p:spPr>
-        <p:txBody>
-          <a:bodyPr wrap="square">
-            <a:spAutoFit/>
-          </a:bodyPr>
-          <a:lstStyle/>
-          <a:p>
-            <a:r>
-              <a:rPr lang="es-AR" sz="2400" dirty="0">
-                <a:solidFill>
-                  <a:schemeClr val="bg1"/>
-                </a:solidFill>
-              </a:rPr>
-              <a:t>- pocos datos</a:t>
-            </a:r>
-          </a:p>
-          <a:p>
-            <a:r>
-              <a:rPr lang="es-AR" sz="2400" dirty="0">
-                <a:solidFill>
-                  <a:schemeClr val="bg1"/>
-                </a:solidFill>
-              </a:rPr>
-              <a:t>- </a:t>
-            </a:r>
-            <a:r>
-              <a:rPr lang="es-AR" sz="2400" dirty="0" err="1">
-                <a:solidFill>
-                  <a:schemeClr val="bg1"/>
-                </a:solidFill>
-              </a:rPr>
-              <a:t>pre-trained</a:t>
-            </a:r>
-            <a:r>
-              <a:rPr lang="es-AR" sz="2400" dirty="0">
-                <a:solidFill>
-                  <a:schemeClr val="bg1"/>
-                </a:solidFill>
-              </a:rPr>
-              <a:t> </a:t>
-            </a:r>
-            <a:r>
-              <a:rPr lang="es-AR" sz="2400" dirty="0" err="1">
-                <a:solidFill>
-                  <a:schemeClr val="bg1"/>
-                </a:solidFill>
-              </a:rPr>
-              <a:t>models</a:t>
-            </a:r>
-            <a:endParaRPr lang="es-AR" sz="2400" dirty="0">
+        </p:grpSpPr>
+        <p:pic>
+          <p:nvPicPr>
+            <p:cNvPr id="15" name="Picture 1">
+              <a:extLst>
+                <a:ext uri="{FF2B5EF4-FFF2-40B4-BE49-F238E27FC236}">
+                  <a16:creationId xmlns:a16="http://schemas.microsoft.com/office/drawing/2014/main" id="{264D80DE-3DD3-6902-30C6-7B7D7BCA6D7F}"/>
+                </a:ext>
+              </a:extLst>
+            </p:cNvPr>
+            <p:cNvPicPr>
+              <a:picLocks noChangeAspect="1"/>
+            </p:cNvPicPr>
+            <p:nvPr/>
+          </p:nvPicPr>
+          <p:blipFill>
+            <a:blip r:embed="rId2">
+              <a:extLst>
+                <a:ext uri="{28A0092B-C50C-407E-A947-70E740481C1C}">
+                  <a14:useLocalDpi xmlns:a14="http://schemas.microsoft.com/office/drawing/2010/main" val="0"/>
+                </a:ext>
+              </a:extLst>
+            </a:blip>
+            <a:stretch>
+              <a:fillRect/>
+            </a:stretch>
+          </p:blipFill>
+          <p:spPr>
+            <a:xfrm>
+              <a:off x="6504175" y="2516687"/>
+              <a:ext cx="4698135" cy="3107773"/>
+            </a:xfrm>
+            <a:prstGeom prst="rect">
+              <a:avLst/>
+            </a:prstGeom>
+          </p:spPr>
+        </p:pic>
+        <p:sp>
+          <p:nvSpPr>
+            <p:cNvPr id="17" name="Subtitle 1">
+              <a:extLst>
+                <a:ext uri="{FF2B5EF4-FFF2-40B4-BE49-F238E27FC236}">
+                  <a16:creationId xmlns:a16="http://schemas.microsoft.com/office/drawing/2014/main" id="{6E44B1AE-5F03-28EE-5C2B-ABADEC460FE2}"/>
+                </a:ext>
+              </a:extLst>
+            </p:cNvPr>
+            <p:cNvSpPr txBox="1">
+              <a:spLocks/>
+            </p:cNvSpPr>
+            <p:nvPr/>
+          </p:nvSpPr>
+          <p:spPr>
+            <a:xfrm>
+              <a:off x="7481639" y="1991560"/>
+              <a:ext cx="2968284" cy="525127"/>
+            </a:xfrm>
+            <a:prstGeom prst="rect">
+              <a:avLst/>
+            </a:prstGeom>
+          </p:spPr>
+          <p:txBody>
+            <a:bodyPr vert="horz" lIns="91440" tIns="45720" rIns="91440" bIns="45720" rtlCol="0">
+              <a:noAutofit/>
+            </a:bodyPr>
+            <a:lstStyle>
+              <a:lvl1pPr marL="0" indent="0" algn="ctr" defTabSz="914400" rtl="0" eaLnBrk="1" latinLnBrk="0" hangingPunct="1">
+                <a:lnSpc>
+                  <a:spcPct val="90000"/>
+                </a:lnSpc>
+                <a:spcBef>
+                  <a:spcPts val="1000"/>
+                </a:spcBef>
+                <a:buFont typeface="Arial" panose="020B0604020202020204" pitchFamily="34" charset="0"/>
+                <a:buNone/>
+                <a:defRPr sz="2400" kern="1200">
+                  <a:solidFill>
+                    <a:schemeClr val="tx1"/>
+                  </a:solidFill>
+                  <a:latin typeface="+mn-lt"/>
+                  <a:ea typeface="+mn-ea"/>
+                  <a:cs typeface="+mn-cs"/>
+                </a:defRPr>
+              </a:lvl1pPr>
+              <a:lvl2pPr marL="457200" indent="0" algn="ctr" defTabSz="914400" rtl="0" eaLnBrk="1" latinLnBrk="0" hangingPunct="1">
+                <a:lnSpc>
+                  <a:spcPct val="90000"/>
+                </a:lnSpc>
+                <a:spcBef>
+                  <a:spcPts val="500"/>
+                </a:spcBef>
+                <a:buFont typeface="Arial" panose="020B0604020202020204" pitchFamily="34" charset="0"/>
+                <a:buNone/>
+                <a:defRPr sz="2000" kern="1200">
+                  <a:solidFill>
+                    <a:schemeClr val="tx1"/>
+                  </a:solidFill>
+                  <a:latin typeface="+mn-lt"/>
+                  <a:ea typeface="+mn-ea"/>
+                  <a:cs typeface="+mn-cs"/>
+                </a:defRPr>
+              </a:lvl2pPr>
+              <a:lvl3pPr marL="914400" indent="0" algn="ctr" defTabSz="914400" rtl="0" eaLnBrk="1" latinLnBrk="0" hangingPunct="1">
+                <a:lnSpc>
+                  <a:spcPct val="90000"/>
+                </a:lnSpc>
+                <a:spcBef>
+                  <a:spcPts val="500"/>
+                </a:spcBef>
+                <a:buFont typeface="Arial" panose="020B0604020202020204" pitchFamily="34" charset="0"/>
+                <a:buNone/>
+                <a:defRPr sz="1800" kern="1200">
+                  <a:solidFill>
+                    <a:schemeClr val="tx1"/>
+                  </a:solidFill>
+                  <a:latin typeface="+mn-lt"/>
+                  <a:ea typeface="+mn-ea"/>
+                  <a:cs typeface="+mn-cs"/>
+                </a:defRPr>
+              </a:lvl3pPr>
+              <a:lvl4pPr marL="1371600" indent="0" algn="ctr" defTabSz="914400" rtl="0" eaLnBrk="1" latinLnBrk="0" hangingPunct="1">
+                <a:lnSpc>
+                  <a:spcPct val="90000"/>
+                </a:lnSpc>
+                <a:spcBef>
+                  <a:spcPts val="500"/>
+                </a:spcBef>
+                <a:buFont typeface="Arial" panose="020B0604020202020204" pitchFamily="34" charset="0"/>
+                <a:buNone/>
+                <a:defRPr sz="1600" kern="1200">
+                  <a:solidFill>
+                    <a:schemeClr val="tx1"/>
+                  </a:solidFill>
+                  <a:latin typeface="+mn-lt"/>
+                  <a:ea typeface="+mn-ea"/>
+                  <a:cs typeface="+mn-cs"/>
+                </a:defRPr>
+              </a:lvl4pPr>
+              <a:lvl5pPr marL="1828800" indent="0" algn="ctr" defTabSz="914400" rtl="0" eaLnBrk="1" latinLnBrk="0" hangingPunct="1">
+                <a:lnSpc>
+                  <a:spcPct val="90000"/>
+                </a:lnSpc>
+                <a:spcBef>
+                  <a:spcPts val="500"/>
+                </a:spcBef>
+                <a:buFont typeface="Arial" panose="020B0604020202020204" pitchFamily="34" charset="0"/>
+                <a:buNone/>
+                <a:defRPr sz="1600" kern="1200">
+                  <a:solidFill>
+                    <a:schemeClr val="tx1"/>
+                  </a:solidFill>
+                  <a:latin typeface="+mn-lt"/>
+                  <a:ea typeface="+mn-ea"/>
+                  <a:cs typeface="+mn-cs"/>
+                </a:defRPr>
+              </a:lvl5pPr>
+              <a:lvl6pPr marL="2286000" indent="0" algn="ctr" defTabSz="914400" rtl="0" eaLnBrk="1" latinLnBrk="0" hangingPunct="1">
+                <a:lnSpc>
+                  <a:spcPct val="90000"/>
+                </a:lnSpc>
+                <a:spcBef>
+                  <a:spcPts val="500"/>
+                </a:spcBef>
+                <a:buFont typeface="Arial" panose="020B0604020202020204" pitchFamily="34" charset="0"/>
+                <a:buNone/>
+                <a:defRPr sz="1600" kern="1200">
+                  <a:solidFill>
+                    <a:schemeClr val="tx1"/>
+                  </a:solidFill>
+                  <a:latin typeface="+mn-lt"/>
+                  <a:ea typeface="+mn-ea"/>
+                  <a:cs typeface="+mn-cs"/>
+                </a:defRPr>
+              </a:lvl6pPr>
+              <a:lvl7pPr marL="2743200" indent="0" algn="ctr" defTabSz="914400" rtl="0" eaLnBrk="1" latinLnBrk="0" hangingPunct="1">
+                <a:lnSpc>
+                  <a:spcPct val="90000"/>
+                </a:lnSpc>
+                <a:spcBef>
+                  <a:spcPts val="500"/>
+                </a:spcBef>
+                <a:buFont typeface="Arial" panose="020B0604020202020204" pitchFamily="34" charset="0"/>
+                <a:buNone/>
+                <a:defRPr sz="1600" kern="1200">
+                  <a:solidFill>
+                    <a:schemeClr val="tx1"/>
+                  </a:solidFill>
+                  <a:latin typeface="+mn-lt"/>
+                  <a:ea typeface="+mn-ea"/>
+                  <a:cs typeface="+mn-cs"/>
+                </a:defRPr>
+              </a:lvl7pPr>
+              <a:lvl8pPr marL="3200400" indent="0" algn="ctr" defTabSz="914400" rtl="0" eaLnBrk="1" latinLnBrk="0" hangingPunct="1">
+                <a:lnSpc>
+                  <a:spcPct val="90000"/>
+                </a:lnSpc>
+                <a:spcBef>
+                  <a:spcPts val="500"/>
+                </a:spcBef>
+                <a:buFont typeface="Arial" panose="020B0604020202020204" pitchFamily="34" charset="0"/>
+                <a:buNone/>
+                <a:defRPr sz="1600" kern="1200">
+                  <a:solidFill>
+                    <a:schemeClr val="tx1"/>
+                  </a:solidFill>
+                  <a:latin typeface="+mn-lt"/>
+                  <a:ea typeface="+mn-ea"/>
+                  <a:cs typeface="+mn-cs"/>
+                </a:defRPr>
+              </a:lvl8pPr>
+              <a:lvl9pPr marL="3657600" indent="0" algn="ctr" defTabSz="914400" rtl="0" eaLnBrk="1" latinLnBrk="0" hangingPunct="1">
+                <a:lnSpc>
+                  <a:spcPct val="90000"/>
+                </a:lnSpc>
+                <a:spcBef>
+                  <a:spcPts val="500"/>
+                </a:spcBef>
+                <a:buFont typeface="Arial" panose="020B0604020202020204" pitchFamily="34" charset="0"/>
+                <a:buNone/>
+                <a:defRPr sz="1600" kern="1200">
+                  <a:solidFill>
+                    <a:schemeClr val="tx1"/>
+                  </a:solidFill>
+                  <a:latin typeface="+mn-lt"/>
+                  <a:ea typeface="+mn-ea"/>
+                  <a:cs typeface="+mn-cs"/>
+                </a:defRPr>
+              </a:lvl9pPr>
+            </a:lstStyle>
+            <a:p>
+              <a:r>
+                <a:rPr lang="es-AR" sz="2800" dirty="0" err="1">
+                  <a:solidFill>
+                    <a:schemeClr val="bg1"/>
+                  </a:solidFill>
+                </a:rPr>
+                <a:t>Feature</a:t>
+              </a:r>
+              <a:r>
+                <a:rPr lang="es-AR" sz="2800" dirty="0">
+                  <a:solidFill>
+                    <a:schemeClr val="bg1"/>
+                  </a:solidFill>
+                </a:rPr>
+                <a:t> extractor</a:t>
+              </a:r>
+            </a:p>
+          </p:txBody>
+        </p:sp>
+        <p:sp>
+          <p:nvSpPr>
+            <p:cNvPr id="21" name="Abrir llave 20">
+              <a:extLst>
+                <a:ext uri="{FF2B5EF4-FFF2-40B4-BE49-F238E27FC236}">
+                  <a16:creationId xmlns:a16="http://schemas.microsoft.com/office/drawing/2014/main" id="{E7BBE94A-759F-D4E2-7414-EB5CF7FFCA42}"/>
+                </a:ext>
+              </a:extLst>
+            </p:cNvPr>
+            <p:cNvSpPr/>
+            <p:nvPr/>
+          </p:nvSpPr>
+          <p:spPr>
+            <a:xfrm rot="16200000">
+              <a:off x="9231677" y="5367708"/>
+              <a:ext cx="466924" cy="827809"/>
+            </a:xfrm>
+            <a:prstGeom prst="leftBrace">
+              <a:avLst/>
+            </a:prstGeom>
+            <a:ln>
               <a:solidFill>
-                <a:schemeClr val="bg1"/>
+                <a:srgbClr val="FF0000"/>
               </a:solidFill>
-            </a:endParaRPr>
-          </a:p>
-          <a:p>
-            <a:r>
-              <a:rPr lang="es-AR" sz="2400" dirty="0">
-                <a:solidFill>
-                  <a:schemeClr val="bg1"/>
-                </a:solidFill>
-              </a:rPr>
-              <a:t>- </a:t>
-            </a:r>
-            <a:r>
-              <a:rPr lang="es-AR" sz="2400" dirty="0" err="1">
-                <a:solidFill>
-                  <a:schemeClr val="bg1"/>
-                </a:solidFill>
-              </a:rPr>
-              <a:t>pre-trained</a:t>
-            </a:r>
-            <a:r>
-              <a:rPr lang="es-AR" sz="2400" dirty="0">
-                <a:solidFill>
-                  <a:schemeClr val="bg1"/>
-                </a:solidFill>
-              </a:rPr>
-              <a:t> </a:t>
-            </a:r>
-            <a:r>
-              <a:rPr lang="es-AR" sz="2400" dirty="0" err="1">
-                <a:solidFill>
-                  <a:schemeClr val="bg1"/>
-                </a:solidFill>
-              </a:rPr>
-              <a:t>embeddings</a:t>
-            </a:r>
-            <a:endParaRPr lang="es-AR" sz="2400" dirty="0">
-              <a:solidFill>
-                <a:schemeClr val="bg1"/>
-              </a:solidFill>
-            </a:endParaRPr>
-          </a:p>
-          <a:p>
-            <a:r>
-              <a:rPr lang="es-AR" sz="2400" dirty="0">
-                <a:solidFill>
-                  <a:schemeClr val="bg1"/>
-                </a:solidFill>
-              </a:rPr>
-              <a:t>- </a:t>
-            </a:r>
-            <a:r>
-              <a:rPr lang="es-AR" sz="2400" dirty="0" err="1">
-                <a:solidFill>
-                  <a:schemeClr val="bg1"/>
-                </a:solidFill>
-              </a:rPr>
-              <a:t>Simulations</a:t>
-            </a:r>
-            <a:endParaRPr lang="es-AR" sz="2400" dirty="0">
-              <a:solidFill>
-                <a:schemeClr val="bg1"/>
-              </a:solidFill>
-            </a:endParaRPr>
-          </a:p>
-          <a:p>
-            <a:r>
-              <a:rPr lang="es-AR" sz="2400" dirty="0">
-                <a:solidFill>
-                  <a:schemeClr val="bg1"/>
-                </a:solidFill>
-              </a:rPr>
-              <a:t>- Cambio de dominio</a:t>
-            </a:r>
-          </a:p>
-        </p:txBody>
-      </p:sp>
+            </a:ln>
+          </p:spPr>
+          <p:style>
+            <a:lnRef idx="3">
+              <a:schemeClr val="accent3"/>
+            </a:lnRef>
+            <a:fillRef idx="0">
+              <a:schemeClr val="accent3"/>
+            </a:fillRef>
+            <a:effectRef idx="2">
+              <a:schemeClr val="accent3"/>
+            </a:effectRef>
+            <a:fontRef idx="minor">
+              <a:schemeClr val="tx1"/>
+            </a:fontRef>
+          </p:style>
+          <p:txBody>
+            <a:bodyPr rtlCol="0" anchor="ctr"/>
+            <a:lstStyle/>
+            <a:p>
+              <a:pPr algn="ctr"/>
+              <a:endParaRPr lang="es-AR"/>
+            </a:p>
+          </p:txBody>
+        </p:sp>
+        <p:sp>
+          <p:nvSpPr>
+            <p:cNvPr id="22" name="CuadroTexto 21">
+              <a:extLst>
+                <a:ext uri="{FF2B5EF4-FFF2-40B4-BE49-F238E27FC236}">
+                  <a16:creationId xmlns:a16="http://schemas.microsoft.com/office/drawing/2014/main" id="{0F152222-1E01-75F9-8635-810DDAA0A9B0}"/>
+                </a:ext>
+              </a:extLst>
+            </p:cNvPr>
+            <p:cNvSpPr txBox="1"/>
+            <p:nvPr/>
+          </p:nvSpPr>
+          <p:spPr>
+            <a:xfrm>
+              <a:off x="8822805" y="6015075"/>
+              <a:ext cx="1627118" cy="461665"/>
+            </a:xfrm>
+            <a:prstGeom prst="rect">
+              <a:avLst/>
+            </a:prstGeom>
+            <a:noFill/>
+          </p:spPr>
+          <p:txBody>
+            <a:bodyPr wrap="square">
+              <a:spAutoFit/>
+            </a:bodyPr>
+            <a:lstStyle/>
+            <a:p>
+              <a:r>
+                <a:rPr lang="es-AR" sz="2400" dirty="0">
+                  <a:solidFill>
+                    <a:srgbClr val="FF0000"/>
+                  </a:solidFill>
+                </a:rPr>
+                <a:t>reentrenar</a:t>
+              </a:r>
+            </a:p>
+          </p:txBody>
+        </p:sp>
+      </p:grpSp>
     </p:spTree>
     <p:extLst>
       <p:ext uri="{BB962C8B-B14F-4D97-AF65-F5344CB8AC3E}">
-        <p14:creationId xmlns:p14="http://schemas.microsoft.com/office/powerpoint/2010/main" val="2145966389"/>
+        <p14:creationId xmlns:p14="http://schemas.microsoft.com/office/powerpoint/2010/main" val="3761876668"/>
       </p:ext>
     </p:extLst>
   </p:cSld>

</xml_diff>